<commit_message>
nu funkar det att öppna en klass i eclipse från ppt
</commit_message>
<xml_diff>
--- a/groovyseminarie/dokument/groovyseminarium_source.pptx
+++ b/groovyseminarie/dokument/groovyseminarium_source.pptx
@@ -5,13 +5,15 @@
     <p:sldMasterId id="2147483648" r:id="rId1"/>
   </p:sldMasterIdLst>
   <p:sldIdLst>
-    <p:sldId id="260" r:id="rId2"/>
-    <p:sldId id="261" r:id="rId3"/>
-    <p:sldId id="258" r:id="rId4"/>
-    <p:sldId id="262" r:id="rId5"/>
-    <p:sldId id="256" r:id="rId6"/>
-    <p:sldId id="259" r:id="rId7"/>
-    <p:sldId id="257" r:id="rId8"/>
+    <p:sldId id="256" r:id="rId2"/>
+    <p:sldId id="260" r:id="rId3"/>
+    <p:sldId id="261" r:id="rId4"/>
+    <p:sldId id="258" r:id="rId5"/>
+    <p:sldId id="262" r:id="rId6"/>
+    <p:sldId id="263" r:id="rId7"/>
+    <p:sldId id="264" r:id="rId8"/>
+    <p:sldId id="259" r:id="rId9"/>
+    <p:sldId id="257" r:id="rId10"/>
   </p:sldIdLst>
   <p:sldSz cx="9144000" cy="6858000" type="screen4x3"/>
   <p:notesSz cx="6858000" cy="9144000"/>
@@ -295,7 +297,7 @@
             <a:fld id="{347BD319-C441-4740-BDB2-35E25C52CCE7}" type="datetimeFigureOut">
               <a:rPr lang="sv-SE" smtClean="0"/>
               <a:pPr/>
-              <a:t>2008-08-22</a:t>
+              <a:t>2008-08-25</a:t>
             </a:fld>
             <a:endParaRPr lang="sv-SE"/>
           </a:p>
@@ -462,7 +464,7 @@
             <a:fld id="{347BD319-C441-4740-BDB2-35E25C52CCE7}" type="datetimeFigureOut">
               <a:rPr lang="sv-SE" smtClean="0"/>
               <a:pPr/>
-              <a:t>2008-08-22</a:t>
+              <a:t>2008-08-25</a:t>
             </a:fld>
             <a:endParaRPr lang="sv-SE"/>
           </a:p>
@@ -639,7 +641,7 @@
             <a:fld id="{347BD319-C441-4740-BDB2-35E25C52CCE7}" type="datetimeFigureOut">
               <a:rPr lang="sv-SE" smtClean="0"/>
               <a:pPr/>
-              <a:t>2008-08-22</a:t>
+              <a:t>2008-08-25</a:t>
             </a:fld>
             <a:endParaRPr lang="sv-SE"/>
           </a:p>
@@ -806,7 +808,7 @@
             <a:fld id="{347BD319-C441-4740-BDB2-35E25C52CCE7}" type="datetimeFigureOut">
               <a:rPr lang="sv-SE" smtClean="0"/>
               <a:pPr/>
-              <a:t>2008-08-22</a:t>
+              <a:t>2008-08-25</a:t>
             </a:fld>
             <a:endParaRPr lang="sv-SE"/>
           </a:p>
@@ -1049,7 +1051,7 @@
             <a:fld id="{347BD319-C441-4740-BDB2-35E25C52CCE7}" type="datetimeFigureOut">
               <a:rPr lang="sv-SE" smtClean="0"/>
               <a:pPr/>
-              <a:t>2008-08-22</a:t>
+              <a:t>2008-08-25</a:t>
             </a:fld>
             <a:endParaRPr lang="sv-SE"/>
           </a:p>
@@ -1334,7 +1336,7 @@
             <a:fld id="{347BD319-C441-4740-BDB2-35E25C52CCE7}" type="datetimeFigureOut">
               <a:rPr lang="sv-SE" smtClean="0"/>
               <a:pPr/>
-              <a:t>2008-08-22</a:t>
+              <a:t>2008-08-25</a:t>
             </a:fld>
             <a:endParaRPr lang="sv-SE"/>
           </a:p>
@@ -1753,7 +1755,7 @@
             <a:fld id="{347BD319-C441-4740-BDB2-35E25C52CCE7}" type="datetimeFigureOut">
               <a:rPr lang="sv-SE" smtClean="0"/>
               <a:pPr/>
-              <a:t>2008-08-22</a:t>
+              <a:t>2008-08-25</a:t>
             </a:fld>
             <a:endParaRPr lang="sv-SE"/>
           </a:p>
@@ -1868,7 +1870,7 @@
             <a:fld id="{347BD319-C441-4740-BDB2-35E25C52CCE7}" type="datetimeFigureOut">
               <a:rPr lang="sv-SE" smtClean="0"/>
               <a:pPr/>
-              <a:t>2008-08-22</a:t>
+              <a:t>2008-08-25</a:t>
             </a:fld>
             <a:endParaRPr lang="sv-SE"/>
           </a:p>
@@ -1960,7 +1962,7 @@
             <a:fld id="{347BD319-C441-4740-BDB2-35E25C52CCE7}" type="datetimeFigureOut">
               <a:rPr lang="sv-SE" smtClean="0"/>
               <a:pPr/>
-              <a:t>2008-08-22</a:t>
+              <a:t>2008-08-25</a:t>
             </a:fld>
             <a:endParaRPr lang="sv-SE"/>
           </a:p>
@@ -2234,7 +2236,7 @@
             <a:fld id="{347BD319-C441-4740-BDB2-35E25C52CCE7}" type="datetimeFigureOut">
               <a:rPr lang="sv-SE" smtClean="0"/>
               <a:pPr/>
-              <a:t>2008-08-22</a:t>
+              <a:t>2008-08-25</a:t>
             </a:fld>
             <a:endParaRPr lang="sv-SE"/>
           </a:p>
@@ -2484,7 +2486,7 @@
             <a:fld id="{347BD319-C441-4740-BDB2-35E25C52CCE7}" type="datetimeFigureOut">
               <a:rPr lang="sv-SE" smtClean="0"/>
               <a:pPr/>
-              <a:t>2008-08-22</a:t>
+              <a:t>2008-08-25</a:t>
             </a:fld>
             <a:endParaRPr lang="sv-SE"/>
           </a:p>
@@ -2694,7 +2696,7 @@
             <a:fld id="{347BD319-C441-4740-BDB2-35E25C52CCE7}" type="datetimeFigureOut">
               <a:rPr lang="sv-SE" smtClean="0"/>
               <a:pPr/>
-              <a:t>2008-08-22</a:t>
+              <a:t>2008-08-25</a:t>
             </a:fld>
             <a:endParaRPr lang="sv-SE"/>
           </a:p>
@@ -3072,132 +3074,27 @@
             <a:spLocks noGrp="1"/>
           </p:cNvSpPr>
           <p:nvPr>
-            <p:ph type="title"/>
-          </p:nvPr>
-        </p:nvSpPr>
-        <p:spPr/>
-        <p:txBody>
-          <a:bodyPr/>
-          <a:lstStyle/>
-          <a:p>
+            <p:ph type="ctrTitle"/>
+          </p:nvPr>
+        </p:nvSpPr>
+        <p:spPr/>
+        <p:txBody>
+          <a:bodyPr/>
+          <a:lstStyle/>
+          <a:p>
+            <a:r>
+              <a:rPr lang="sv-SE" dirty="0" smtClean="0"/>
+              <a:t>[</a:t>
+            </a:r>
             <a:r>
               <a:rPr lang="sv-SE" dirty="0" err="1" smtClean="0"/>
-              <a:t>Groovy</a:t>
+              <a:t>helloWorld.groovy</a:t>
+            </a:r>
+            <a:r>
+              <a:rPr lang="sv-SE" dirty="0" smtClean="0"/>
+              <a:t>]</a:t>
             </a:r>
             <a:endParaRPr lang="sv-SE" dirty="0"/>
-          </a:p>
-        </p:txBody>
-      </p:sp>
-      <p:sp>
-        <p:nvSpPr>
-          <p:cNvPr id="3" name="Platshållare för innehåll 2"/>
-          <p:cNvSpPr>
-            <a:spLocks noGrp="1"/>
-          </p:cNvSpPr>
-          <p:nvPr>
-            <p:ph idx="1"/>
-          </p:nvPr>
-        </p:nvSpPr>
-        <p:spPr/>
-        <p:txBody>
-          <a:bodyPr>
-            <a:normAutofit fontScale="85000" lnSpcReduction="10000"/>
-          </a:bodyPr>
-          <a:lstStyle/>
-          <a:p>
-            <a:pPr>
-              <a:buNone/>
-            </a:pPr>
-            <a:r>
-              <a:rPr lang="en-US" i="1" dirty="0" smtClean="0"/>
-              <a:t>“…So </a:t>
-            </a:r>
-            <a:r>
-              <a:rPr lang="en-US" i="1" dirty="0" smtClean="0"/>
-              <a:t>I've been musing a little while if its time the Java platform had its own dynamic language designed from the ground up to </a:t>
-            </a:r>
-            <a:r>
-              <a:rPr lang="en-US" i="1" dirty="0" smtClean="0">
-                <a:solidFill>
-                  <a:srgbClr val="FF0000"/>
-                </a:solidFill>
-              </a:rPr>
-              <a:t>work real nice with existing code</a:t>
-            </a:r>
-            <a:r>
-              <a:rPr lang="en-US" i="1" dirty="0" smtClean="0"/>
-              <a:t>; creating/extending objects normal Java can use and vice versa. </a:t>
-            </a:r>
-            <a:r>
-              <a:rPr lang="en-US" i="1" dirty="0" smtClean="0">
-                <a:solidFill>
-                  <a:srgbClr val="FF0000"/>
-                </a:solidFill>
-              </a:rPr>
-              <a:t>Python/</a:t>
-            </a:r>
-            <a:r>
-              <a:rPr lang="en-US" i="1" dirty="0" err="1" smtClean="0">
-                <a:solidFill>
-                  <a:srgbClr val="FF0000"/>
-                </a:solidFill>
-              </a:rPr>
-              <a:t>Jython's</a:t>
-            </a:r>
-            <a:r>
-              <a:rPr lang="en-US" i="1" dirty="0" smtClean="0">
-                <a:solidFill>
-                  <a:srgbClr val="FF0000"/>
-                </a:solidFill>
-              </a:rPr>
-              <a:t> a pretty good base - add the nice stuff from Ruby</a:t>
-            </a:r>
-            <a:r>
-              <a:rPr lang="en-US" i="1" dirty="0" smtClean="0"/>
-              <a:t> and maybe sprinkle on some </a:t>
-            </a:r>
-            <a:r>
-              <a:rPr lang="en-US" i="1" dirty="0" smtClean="0">
-                <a:solidFill>
-                  <a:srgbClr val="FF0000"/>
-                </a:solidFill>
-              </a:rPr>
-              <a:t>AOP features</a:t>
-            </a:r>
-            <a:r>
-              <a:rPr lang="en-US" i="1" dirty="0" smtClean="0"/>
-              <a:t> and we could have a really </a:t>
-            </a:r>
-            <a:r>
-              <a:rPr lang="en-US" i="1" dirty="0" smtClean="0">
-                <a:solidFill>
-                  <a:srgbClr val="FF0000"/>
-                </a:solidFill>
-              </a:rPr>
-              <a:t>Groovy</a:t>
-            </a:r>
-            <a:r>
-              <a:rPr lang="en-US" i="1" dirty="0" smtClean="0"/>
-              <a:t> new language for scripting Java objects, writing test cases and who knows, even doing real development in it</a:t>
-            </a:r>
-            <a:r>
-              <a:rPr lang="en-US" i="1" dirty="0" smtClean="0"/>
-              <a:t>.”</a:t>
-            </a:r>
-          </a:p>
-          <a:p>
-            <a:pPr algn="r">
-              <a:buNone/>
-            </a:pPr>
-            <a:r>
-              <a:rPr lang="en-US" i="1" dirty="0" smtClean="0"/>
-              <a:t>- James </a:t>
-            </a:r>
-            <a:r>
-              <a:rPr lang="en-US" i="1" dirty="0" smtClean="0"/>
-              <a:t>Strachan 2003</a:t>
-            </a:r>
-            <a:endParaRPr lang="en-US" i="1" dirty="0" smtClean="0"/>
           </a:p>
         </p:txBody>
       </p:sp>
@@ -3249,47 +3146,129 @@
           <a:lstStyle/>
           <a:p>
             <a:r>
-              <a:rPr lang="sv-SE" dirty="0" smtClean="0"/>
-              <a:t>Historik</a:t>
-            </a:r>
-            <a:endParaRPr lang="sv-SE" dirty="0"/>
-          </a:p>
-        </p:txBody>
-      </p:sp>
-      <p:sp>
-        <p:nvSpPr>
-          <p:cNvPr id="3" name="Platshållare för innehåll 2"/>
-          <p:cNvSpPr>
-            <a:spLocks noGrp="1"/>
-          </p:cNvSpPr>
-          <p:nvPr>
-            <p:ph idx="1"/>
-          </p:nvPr>
-        </p:nvSpPr>
-        <p:spPr/>
-        <p:txBody>
-          <a:bodyPr/>
-          <a:lstStyle/>
-          <a:p>
-            <a:r>
-              <a:rPr lang="sv-SE" dirty="0" smtClean="0"/>
-              <a:t>Projektet lades på is 2004</a:t>
-            </a:r>
-          </a:p>
-          <a:p>
-            <a:r>
-              <a:rPr lang="sv-SE" dirty="0" smtClean="0"/>
-              <a:t>Ny grupp utvecklare tog över strax efter</a:t>
-            </a:r>
-          </a:p>
-          <a:p>
-            <a:r>
               <a:rPr lang="sv-SE" dirty="0" err="1" smtClean="0"/>
               <a:t>Groovy</a:t>
             </a:r>
-            <a:r>
-              <a:rPr lang="sv-SE" dirty="0" smtClean="0"/>
-              <a:t> version 1.0 släpptes 2:a Januari 2007</a:t>
+            <a:endParaRPr lang="sv-SE" dirty="0"/>
+          </a:p>
+        </p:txBody>
+      </p:sp>
+      <p:sp>
+        <p:nvSpPr>
+          <p:cNvPr id="3" name="Platshållare för innehåll 2"/>
+          <p:cNvSpPr>
+            <a:spLocks noGrp="1"/>
+          </p:cNvSpPr>
+          <p:nvPr>
+            <p:ph idx="1"/>
+          </p:nvPr>
+        </p:nvSpPr>
+        <p:spPr/>
+        <p:txBody>
+          <a:bodyPr>
+            <a:normAutofit fontScale="85000" lnSpcReduction="10000"/>
+          </a:bodyPr>
+          <a:lstStyle/>
+          <a:p>
+            <a:pPr>
+              <a:buNone/>
+            </a:pPr>
+            <a:r>
+              <a:rPr lang="en-US" i="1" dirty="0" smtClean="0"/>
+              <a:t>“…So I've been musing a little while if its time the Java platform had its own </a:t>
+            </a:r>
+            <a:r>
+              <a:rPr lang="en-US" i="1" dirty="0" smtClean="0">
+                <a:solidFill>
+                  <a:srgbClr val="FF0000"/>
+                </a:solidFill>
+              </a:rPr>
+              <a:t>dynamic language</a:t>
+            </a:r>
+            <a:r>
+              <a:rPr lang="en-US" i="1" dirty="0" smtClean="0"/>
+              <a:t> designed from the ground up to </a:t>
+            </a:r>
+            <a:r>
+              <a:rPr lang="en-US" i="1" dirty="0" smtClean="0">
+                <a:solidFill>
+                  <a:srgbClr val="FF0000"/>
+                </a:solidFill>
+              </a:rPr>
+              <a:t>work real nice with existing </a:t>
+            </a:r>
+            <a:r>
+              <a:rPr lang="en-US" i="1" smtClean="0">
+                <a:solidFill>
+                  <a:srgbClr val="FF0000"/>
+                </a:solidFill>
+              </a:rPr>
+              <a:t>[Java] code</a:t>
+            </a:r>
+            <a:r>
+              <a:rPr lang="en-US" i="1" dirty="0" smtClean="0"/>
+              <a:t>; creating/extending objects normal Java can use and vice versa. </a:t>
+            </a:r>
+            <a:r>
+              <a:rPr lang="en-US" i="1" dirty="0" smtClean="0">
+                <a:solidFill>
+                  <a:srgbClr val="FF0000"/>
+                </a:solidFill>
+              </a:rPr>
+              <a:t>Python/</a:t>
+            </a:r>
+            <a:r>
+              <a:rPr lang="en-US" i="1" dirty="0" err="1" smtClean="0">
+                <a:solidFill>
+                  <a:srgbClr val="FF0000"/>
+                </a:solidFill>
+              </a:rPr>
+              <a:t>Jython's</a:t>
+            </a:r>
+            <a:r>
+              <a:rPr lang="en-US" i="1" dirty="0" smtClean="0">
+                <a:solidFill>
+                  <a:srgbClr val="FF0000"/>
+                </a:solidFill>
+              </a:rPr>
+              <a:t> a pretty good base - add the nice stuff from Ruby</a:t>
+            </a:r>
+            <a:r>
+              <a:rPr lang="en-US" i="1" dirty="0" smtClean="0"/>
+              <a:t> and maybe sprinkle on some </a:t>
+            </a:r>
+            <a:r>
+              <a:rPr lang="en-US" i="1" dirty="0" smtClean="0">
+                <a:solidFill>
+                  <a:srgbClr val="FF0000"/>
+                </a:solidFill>
+              </a:rPr>
+              <a:t>AOP features</a:t>
+            </a:r>
+            <a:r>
+              <a:rPr lang="en-US" i="1" dirty="0" smtClean="0"/>
+              <a:t> and we could have a really </a:t>
+            </a:r>
+            <a:r>
+              <a:rPr lang="en-US" i="1" dirty="0" smtClean="0">
+                <a:solidFill>
+                  <a:srgbClr val="FF0000"/>
+                </a:solidFill>
+              </a:rPr>
+              <a:t>Groovy</a:t>
+            </a:r>
+            <a:r>
+              <a:rPr lang="en-US" i="1" dirty="0" smtClean="0"/>
+              <a:t> new language for scripting Java objects, writing test cases and who knows, even doing real development in it.”</a:t>
+            </a:r>
+          </a:p>
+          <a:p>
+            <a:pPr algn="r">
+              <a:buNone/>
+            </a:pPr>
+            <a:r>
+              <a:rPr lang="en-US" i="1" dirty="0" smtClean="0"/>
+              <a:t>- James Strachan 2003</a:t>
             </a:r>
           </a:p>
         </p:txBody>
@@ -3299,6 +3278,13 @@
   <p:clrMapOvr>
     <a:masterClrMapping/>
   </p:clrMapOvr>
+  <p:timing>
+    <p:tnLst>
+      <p:par>
+        <p:cTn id="1" dur="indefinite" restart="never" nodeType="tmRoot"/>
+      </p:par>
+    </p:tnLst>
+  </p:timing>
 </p:sld>
 </file>
 
@@ -3336,7 +3322,7 @@
           <a:p>
             <a:r>
               <a:rPr lang="sv-SE" dirty="0" smtClean="0"/>
-              <a:t>Fördelar med dynamiska språk</a:t>
+              <a:t>Historik</a:t>
             </a:r>
             <a:endParaRPr lang="sv-SE" dirty="0"/>
           </a:p>
@@ -3359,26 +3345,24 @@
           <a:p>
             <a:r>
               <a:rPr lang="sv-SE" dirty="0" smtClean="0"/>
-              <a:t>Istället för att generera kod kan man skapa den när programmet körs</a:t>
+              <a:t>Projektet lades på is 2004</a:t>
             </a:r>
           </a:p>
           <a:p>
             <a:r>
               <a:rPr lang="sv-SE" dirty="0" smtClean="0"/>
-              <a:t>Koden blir lättare att ändra</a:t>
-            </a:r>
-          </a:p>
-          <a:p>
+              <a:t>Ny grupp utvecklare tog över strax efter</a:t>
+            </a:r>
+          </a:p>
+          <a:p>
+            <a:r>
+              <a:rPr lang="sv-SE" dirty="0" err="1" smtClean="0"/>
+              <a:t>Groovy</a:t>
+            </a:r>
             <a:r>
               <a:rPr lang="sv-SE" dirty="0" smtClean="0"/>
-              <a:t>Möjlighet att ändra hur språket fungerar</a:t>
-            </a:r>
-          </a:p>
-          <a:p>
-            <a:pPr>
-              <a:buNone/>
-            </a:pPr>
-            <a:endParaRPr lang="sv-SE" dirty="0"/>
+              <a:t> version 1.0 släpptes 2:a Januari 2007</a:t>
+            </a:r>
           </a:p>
         </p:txBody>
       </p:sp>
@@ -3387,13 +3371,6 @@
   <p:clrMapOvr>
     <a:masterClrMapping/>
   </p:clrMapOvr>
-  <p:timing>
-    <p:tnLst>
-      <p:par>
-        <p:cTn id="1" dur="indefinite" restart="never" nodeType="tmRoot"/>
-      </p:par>
-    </p:tnLst>
-  </p:timing>
 </p:sld>
 </file>
 
@@ -3431,7 +3408,7 @@
           <a:p>
             <a:r>
               <a:rPr lang="sv-SE" dirty="0" smtClean="0"/>
-              <a:t>Nackdelar med dynamiska språk</a:t>
+              <a:t>Fördelar med dynamiska språk</a:t>
             </a:r>
             <a:endParaRPr lang="sv-SE" dirty="0"/>
           </a:p>
@@ -3454,22 +3431,25 @@
           <a:p>
             <a:r>
               <a:rPr lang="sv-SE" dirty="0" smtClean="0"/>
-              <a:t>Kräver testning</a:t>
+              <a:t>Istället för att generera kod kan man skapa den när programmet körs</a:t>
             </a:r>
           </a:p>
           <a:p>
             <a:r>
               <a:rPr lang="sv-SE" dirty="0" smtClean="0"/>
-              <a:t>Risk att </a:t>
-            </a:r>
-            <a:r>
-              <a:rPr lang="sv-SE" smtClean="0"/>
-              <a:t>någon skriver </a:t>
-            </a:r>
+              <a:t>Koden blir lättare att ändra</a:t>
+            </a:r>
+          </a:p>
+          <a:p>
             <a:r>
               <a:rPr lang="sv-SE" dirty="0" smtClean="0"/>
-              <a:t>”oläslig” kod</a:t>
-            </a:r>
+              <a:t>Möjlighet att ändra hur språket fungerar</a:t>
+            </a:r>
+          </a:p>
+          <a:p>
+            <a:pPr>
+              <a:buNone/>
+            </a:pPr>
             <a:endParaRPr lang="sv-SE" dirty="0"/>
           </a:p>
         </p:txBody>
@@ -3479,6 +3459,13 @@
   <p:clrMapOvr>
     <a:masterClrMapping/>
   </p:clrMapOvr>
+  <p:timing>
+    <p:tnLst>
+      <p:par>
+        <p:cTn id="1" dur="indefinite" restart="never" nodeType="tmRoot"/>
+      </p:par>
+    </p:tnLst>
+  </p:timing>
 </p:sld>
 </file>
 
@@ -3506,7 +3493,7 @@
             <a:spLocks noGrp="1"/>
           </p:cNvSpPr>
           <p:nvPr>
-            <p:ph type="ctrTitle"/>
+            <p:ph type="title"/>
           </p:nvPr>
         </p:nvSpPr>
         <p:spPr/>
@@ -3516,15 +3503,36 @@
           <a:p>
             <a:r>
               <a:rPr lang="sv-SE" dirty="0" smtClean="0"/>
-              <a:t>[</a:t>
-            </a:r>
-            <a:r>
-              <a:rPr lang="sv-SE" dirty="0" err="1" smtClean="0"/>
-              <a:t>helloWorld.groovy</a:t>
-            </a:r>
+              <a:t>Nackdelar med dynamiska språk</a:t>
+            </a:r>
+            <a:endParaRPr lang="sv-SE" dirty="0"/>
+          </a:p>
+        </p:txBody>
+      </p:sp>
+      <p:sp>
+        <p:nvSpPr>
+          <p:cNvPr id="3" name="Platshållare för innehåll 2"/>
+          <p:cNvSpPr>
+            <a:spLocks noGrp="1"/>
+          </p:cNvSpPr>
+          <p:nvPr>
+            <p:ph idx="1"/>
+          </p:nvPr>
+        </p:nvSpPr>
+        <p:spPr/>
+        <p:txBody>
+          <a:bodyPr/>
+          <a:lstStyle/>
+          <a:p>
             <a:r>
               <a:rPr lang="sv-SE" dirty="0" smtClean="0"/>
-              <a:t>]</a:t>
+              <a:t>Kräver testning</a:t>
+            </a:r>
+          </a:p>
+          <a:p>
+            <a:r>
+              <a:rPr lang="sv-SE" dirty="0" smtClean="0"/>
+              <a:t>Risk att någon skriver ”oläslig” kod</a:t>
             </a:r>
             <a:endParaRPr lang="sv-SE" dirty="0"/>
           </a:p>
@@ -3535,13 +3543,6 @@
   <p:clrMapOvr>
     <a:masterClrMapping/>
   </p:clrMapOvr>
-  <p:timing>
-    <p:tnLst>
-      <p:par>
-        <p:cTn id="1" dur="indefinite" restart="never" nodeType="tmRoot"/>
-      </p:par>
-    </p:tnLst>
-  </p:timing>
 </p:sld>
 </file>
 
@@ -3574,6 +3575,250 @@
         </p:nvSpPr>
         <p:spPr/>
         <p:txBody>
+          <a:bodyPr>
+            <a:normAutofit fontScale="90000"/>
+          </a:bodyPr>
+          <a:lstStyle/>
+          <a:p>
+            <a:r>
+              <a:rPr lang="sv-SE" dirty="0" smtClean="0"/>
+              <a:t>Det finns ca 150 språk som kan köras på </a:t>
+            </a:r>
+            <a:r>
+              <a:rPr lang="sv-SE" dirty="0" err="1" smtClean="0"/>
+              <a:t>java-plattformen</a:t>
+            </a:r>
+            <a:r>
+              <a:rPr lang="sv-SE" dirty="0" smtClean="0"/>
+              <a:t>, till exempel:</a:t>
+            </a:r>
+          </a:p>
+        </p:txBody>
+      </p:sp>
+      <p:sp>
+        <p:nvSpPr>
+          <p:cNvPr id="3" name="Platshållare för innehåll 2"/>
+          <p:cNvSpPr>
+            <a:spLocks noGrp="1"/>
+          </p:cNvSpPr>
+          <p:nvPr>
+            <p:ph idx="1"/>
+          </p:nvPr>
+        </p:nvSpPr>
+        <p:spPr/>
+        <p:txBody>
+          <a:bodyPr/>
+          <a:lstStyle/>
+          <a:p>
+            <a:r>
+              <a:rPr lang="sv-SE" dirty="0" smtClean="0"/>
+              <a:t>Ruby (</a:t>
+            </a:r>
+            <a:r>
+              <a:rPr lang="sv-SE" dirty="0" err="1" smtClean="0"/>
+              <a:t>jRuby</a:t>
+            </a:r>
+            <a:r>
+              <a:rPr lang="sv-SE" dirty="0" smtClean="0"/>
+              <a:t>)</a:t>
+            </a:r>
+          </a:p>
+          <a:p>
+            <a:r>
+              <a:rPr lang="sv-SE" dirty="0" err="1" smtClean="0"/>
+              <a:t>Python</a:t>
+            </a:r>
+            <a:r>
+              <a:rPr lang="sv-SE" dirty="0" smtClean="0"/>
+              <a:t> (</a:t>
+            </a:r>
+            <a:r>
+              <a:rPr lang="sv-SE" dirty="0" err="1" smtClean="0"/>
+              <a:t>Jython</a:t>
+            </a:r>
+            <a:r>
+              <a:rPr lang="sv-SE" dirty="0" smtClean="0"/>
+              <a:t>)</a:t>
+            </a:r>
+          </a:p>
+          <a:p>
+            <a:r>
+              <a:rPr lang="sv-SE" dirty="0" err="1" smtClean="0"/>
+              <a:t>BeanShell</a:t>
+            </a:r>
+            <a:endParaRPr lang="sv-SE" dirty="0" smtClean="0"/>
+          </a:p>
+          <a:p>
+            <a:r>
+              <a:rPr lang="sv-SE" dirty="0" smtClean="0"/>
+              <a:t>JavaScript</a:t>
+            </a:r>
+          </a:p>
+          <a:p>
+            <a:r>
+              <a:rPr lang="sv-SE" dirty="0" smtClean="0"/>
+              <a:t>…</a:t>
+            </a:r>
+            <a:endParaRPr lang="sv-SE" dirty="0"/>
+          </a:p>
+        </p:txBody>
+      </p:sp>
+    </p:spTree>
+  </p:cSld>
+  <p:clrMapOvr>
+    <a:masterClrMapping/>
+  </p:clrMapOvr>
+</p:sld>
+</file>
+
+<file path=ppt/slides/slide7.xml><?xml version="1.0" encoding="utf-8"?>
+<p:sld xmlns:a="http://schemas.openxmlformats.org/drawingml/2006/main" xmlns:r="http://schemas.openxmlformats.org/officeDocument/2006/relationships" xmlns:p="http://schemas.openxmlformats.org/presentationml/2006/main">
+  <p:cSld>
+    <p:spTree>
+      <p:nvGrpSpPr>
+        <p:cNvPr id="1" name=""/>
+        <p:cNvGrpSpPr/>
+        <p:nvPr/>
+      </p:nvGrpSpPr>
+      <p:grpSpPr>
+        <a:xfrm>
+          <a:off x="0" y="0"/>
+          <a:ext cx="0" cy="0"/>
+          <a:chOff x="0" y="0"/>
+          <a:chExt cx="0" cy="0"/>
+        </a:xfrm>
+      </p:grpSpPr>
+      <p:sp>
+        <p:nvSpPr>
+          <p:cNvPr id="2" name="Rubrik 1"/>
+          <p:cNvSpPr>
+            <a:spLocks noGrp="1"/>
+          </p:cNvSpPr>
+          <p:nvPr>
+            <p:ph type="title"/>
+          </p:nvPr>
+        </p:nvSpPr>
+        <p:spPr/>
+        <p:txBody>
+          <a:bodyPr/>
+          <a:lstStyle/>
+          <a:p>
+            <a:r>
+              <a:rPr lang="sv-SE" dirty="0" smtClean="0"/>
+              <a:t>Fördelar med </a:t>
+            </a:r>
+            <a:r>
+              <a:rPr lang="sv-SE" dirty="0" err="1" smtClean="0"/>
+              <a:t>Groovy</a:t>
+            </a:r>
+            <a:endParaRPr lang="sv-SE" dirty="0"/>
+          </a:p>
+        </p:txBody>
+      </p:sp>
+      <p:sp>
+        <p:nvSpPr>
+          <p:cNvPr id="3" name="Platshållare för innehåll 2"/>
+          <p:cNvSpPr>
+            <a:spLocks noGrp="1"/>
+          </p:cNvSpPr>
+          <p:nvPr>
+            <p:ph idx="1"/>
+          </p:nvPr>
+        </p:nvSpPr>
+        <p:spPr/>
+        <p:txBody>
+          <a:bodyPr/>
+          <a:lstStyle/>
+          <a:p>
+            <a:r>
+              <a:rPr lang="sv-SE" dirty="0" smtClean="0"/>
+              <a:t>Enkelt att lära för en Javaprogrammerare</a:t>
+            </a:r>
+          </a:p>
+          <a:p>
+            <a:r>
+              <a:rPr lang="sv-SE" dirty="0" smtClean="0"/>
+              <a:t>Helt kompatibelt med existerande Javaprojekt</a:t>
+            </a:r>
+          </a:p>
+          <a:p>
+            <a:r>
+              <a:rPr lang="sv-SE" dirty="0" err="1" smtClean="0"/>
+              <a:t>Groovy</a:t>
+            </a:r>
+            <a:r>
+              <a:rPr lang="sv-SE" dirty="0" smtClean="0"/>
+              <a:t> ÄR Java – kompileras till .</a:t>
+            </a:r>
+            <a:r>
+              <a:rPr lang="sv-SE" dirty="0" err="1" smtClean="0"/>
+              <a:t>class-filer</a:t>
+            </a:r>
+            <a:endParaRPr lang="sv-SE" dirty="0" smtClean="0"/>
+          </a:p>
+          <a:p>
+            <a:r>
+              <a:rPr lang="sv-SE" dirty="0" smtClean="0"/>
+              <a:t>Lätt att börja med, man kan skriva Java istället om man är osäker på </a:t>
+            </a:r>
+            <a:r>
+              <a:rPr lang="sv-SE" dirty="0" err="1" smtClean="0"/>
+              <a:t>Groovy-syntax</a:t>
+            </a:r>
+            <a:endParaRPr lang="sv-SE" dirty="0" smtClean="0"/>
+          </a:p>
+          <a:p>
+            <a:r>
+              <a:rPr lang="sv-SE" dirty="0" smtClean="0"/>
+              <a:t>Dynamiskt</a:t>
+            </a:r>
+          </a:p>
+          <a:p>
+            <a:r>
+              <a:rPr lang="sv-SE" dirty="0" smtClean="0"/>
+              <a:t>Utökar JDK för att förenkla utveckling</a:t>
+            </a:r>
+            <a:endParaRPr lang="sv-SE" dirty="0"/>
+          </a:p>
+        </p:txBody>
+      </p:sp>
+    </p:spTree>
+  </p:cSld>
+  <p:clrMapOvr>
+    <a:masterClrMapping/>
+  </p:clrMapOvr>
+</p:sld>
+</file>
+
+<file path=ppt/slides/slide8.xml><?xml version="1.0" encoding="utf-8"?>
+<p:sld xmlns:a="http://schemas.openxmlformats.org/drawingml/2006/main" xmlns:r="http://schemas.openxmlformats.org/officeDocument/2006/relationships" xmlns:p="http://schemas.openxmlformats.org/presentationml/2006/main">
+  <p:cSld>
+    <p:spTree>
+      <p:nvGrpSpPr>
+        <p:cNvPr id="1" name=""/>
+        <p:cNvGrpSpPr/>
+        <p:nvPr/>
+      </p:nvGrpSpPr>
+      <p:grpSpPr>
+        <a:xfrm>
+          <a:off x="0" y="0"/>
+          <a:ext cx="0" cy="0"/>
+          <a:chOff x="0" y="0"/>
+          <a:chExt cx="0" cy="0"/>
+        </a:xfrm>
+      </p:grpSpPr>
+      <p:sp>
+        <p:nvSpPr>
+          <p:cNvPr id="2" name="Rubrik 1"/>
+          <p:cNvSpPr>
+            <a:spLocks noGrp="1"/>
+          </p:cNvSpPr>
+          <p:nvPr>
+            <p:ph type="title"/>
+          </p:nvPr>
+        </p:nvSpPr>
+        <p:spPr/>
+        <p:txBody>
           <a:bodyPr/>
           <a:lstStyle/>
           <a:p>
@@ -3615,7 +3860,7 @@
 </p:sld>
 </file>
 
-<file path=ppt/slides/slide7.xml><?xml version="1.0" encoding="utf-8"?>
+<file path=ppt/slides/slide9.xml><?xml version="1.0" encoding="utf-8"?>
 <p:sld xmlns:a="http://schemas.openxmlformats.org/drawingml/2006/main" xmlns:r="http://schemas.openxmlformats.org/officeDocument/2006/relationships" xmlns:p="http://schemas.openxmlformats.org/presentationml/2006/main">
   <p:cSld>
     <p:spTree>

</xml_diff>

<commit_message>
lagt till lite text
</commit_message>
<xml_diff>
--- a/groovyseminarie/dokument/groovyseminarium_source.pptx
+++ b/groovyseminarie/dokument/groovyseminarium_source.pptx
@@ -5,15 +5,20 @@
     <p:sldMasterId id="2147483648" r:id="rId1"/>
   </p:sldMasterIdLst>
   <p:sldIdLst>
-    <p:sldId id="256" r:id="rId2"/>
-    <p:sldId id="260" r:id="rId3"/>
-    <p:sldId id="261" r:id="rId4"/>
+    <p:sldId id="260" r:id="rId2"/>
+    <p:sldId id="261" r:id="rId3"/>
+    <p:sldId id="270" r:id="rId4"/>
     <p:sldId id="258" r:id="rId5"/>
     <p:sldId id="262" r:id="rId6"/>
     <p:sldId id="263" r:id="rId7"/>
     <p:sldId id="264" r:id="rId8"/>
-    <p:sldId id="259" r:id="rId9"/>
-    <p:sldId id="257" r:id="rId10"/>
+    <p:sldId id="256" r:id="rId9"/>
+    <p:sldId id="269" r:id="rId10"/>
+    <p:sldId id="259" r:id="rId11"/>
+    <p:sldId id="265" r:id="rId12"/>
+    <p:sldId id="268" r:id="rId13"/>
+    <p:sldId id="266" r:id="rId14"/>
+    <p:sldId id="257" r:id="rId15"/>
   </p:sldIdLst>
   <p:sldSz cx="9144000" cy="6858000" type="screen4x3"/>
   <p:notesSz cx="6858000" cy="9144000"/>
@@ -3074,25 +3079,855 @@
             <a:spLocks noGrp="1"/>
           </p:cNvSpPr>
           <p:nvPr>
-            <p:ph type="ctrTitle"/>
-          </p:nvPr>
-        </p:nvSpPr>
-        <p:spPr/>
-        <p:txBody>
-          <a:bodyPr/>
-          <a:lstStyle/>
-          <a:p>
+            <p:ph type="title"/>
+          </p:nvPr>
+        </p:nvSpPr>
+        <p:spPr/>
+        <p:txBody>
+          <a:bodyPr/>
+          <a:lstStyle/>
+          <a:p>
+            <a:r>
+              <a:rPr lang="sv-SE" dirty="0" err="1" smtClean="0"/>
+              <a:t>Groovy</a:t>
+            </a:r>
+            <a:endParaRPr lang="sv-SE" dirty="0"/>
+          </a:p>
+        </p:txBody>
+      </p:sp>
+      <p:sp>
+        <p:nvSpPr>
+          <p:cNvPr id="3" name="Platshållare för innehåll 2"/>
+          <p:cNvSpPr>
+            <a:spLocks noGrp="1"/>
+          </p:cNvSpPr>
+          <p:nvPr>
+            <p:ph idx="1"/>
+          </p:nvPr>
+        </p:nvSpPr>
+        <p:spPr/>
+        <p:txBody>
+          <a:bodyPr>
+            <a:normAutofit fontScale="85000" lnSpcReduction="10000"/>
+          </a:bodyPr>
+          <a:lstStyle/>
+          <a:p>
+            <a:pPr>
+              <a:buNone/>
+            </a:pPr>
+            <a:r>
+              <a:rPr lang="en-US" i="1" dirty="0" smtClean="0"/>
+              <a:t>“…So I've been musing a little while if its time the Java platform had its own </a:t>
+            </a:r>
+            <a:r>
+              <a:rPr lang="en-US" i="1" dirty="0" smtClean="0">
+                <a:solidFill>
+                  <a:srgbClr val="FF0000"/>
+                </a:solidFill>
+              </a:rPr>
+              <a:t>dynamic language</a:t>
+            </a:r>
+            <a:r>
+              <a:rPr lang="en-US" i="1" dirty="0" smtClean="0"/>
+              <a:t> designed from the ground up to </a:t>
+            </a:r>
+            <a:r>
+              <a:rPr lang="en-US" i="1" dirty="0" smtClean="0">
+                <a:solidFill>
+                  <a:srgbClr val="FF0000"/>
+                </a:solidFill>
+              </a:rPr>
+              <a:t>work real nice with existing [Java] code</a:t>
+            </a:r>
+            <a:r>
+              <a:rPr lang="en-US" i="1" dirty="0" smtClean="0"/>
+              <a:t>; creating/extending objects normal Java can use and vice versa. </a:t>
+            </a:r>
+            <a:r>
+              <a:rPr lang="en-US" i="1" dirty="0" smtClean="0">
+                <a:solidFill>
+                  <a:srgbClr val="FF0000"/>
+                </a:solidFill>
+              </a:rPr>
+              <a:t>Python/</a:t>
+            </a:r>
+            <a:r>
+              <a:rPr lang="en-US" i="1" dirty="0" err="1" smtClean="0">
+                <a:solidFill>
+                  <a:srgbClr val="FF0000"/>
+                </a:solidFill>
+              </a:rPr>
+              <a:t>Jython's</a:t>
+            </a:r>
+            <a:r>
+              <a:rPr lang="en-US" i="1" dirty="0" smtClean="0">
+                <a:solidFill>
+                  <a:srgbClr val="FF0000"/>
+                </a:solidFill>
+              </a:rPr>
+              <a:t> a pretty good base - add the nice stuff from Ruby</a:t>
+            </a:r>
+            <a:r>
+              <a:rPr lang="en-US" i="1" dirty="0" smtClean="0"/>
+              <a:t> and maybe sprinkle on some </a:t>
+            </a:r>
+            <a:r>
+              <a:rPr lang="en-US" i="1" dirty="0" smtClean="0">
+                <a:solidFill>
+                  <a:srgbClr val="FF0000"/>
+                </a:solidFill>
+              </a:rPr>
+              <a:t>AOP features</a:t>
+            </a:r>
+            <a:r>
+              <a:rPr lang="en-US" i="1" dirty="0" smtClean="0"/>
+              <a:t> and we could have a really </a:t>
+            </a:r>
+            <a:r>
+              <a:rPr lang="en-US" i="1" dirty="0" smtClean="0">
+                <a:solidFill>
+                  <a:srgbClr val="FF0000"/>
+                </a:solidFill>
+              </a:rPr>
+              <a:t>Groovy</a:t>
+            </a:r>
+            <a:r>
+              <a:rPr lang="en-US" i="1" dirty="0" smtClean="0"/>
+              <a:t> new language for scripting Java objects, writing test cases and who knows, even doing real development in it.”</a:t>
+            </a:r>
+          </a:p>
+          <a:p>
+            <a:pPr algn="r">
+              <a:buNone/>
+            </a:pPr>
+            <a:r>
+              <a:rPr lang="en-US" i="1" dirty="0" smtClean="0"/>
+              <a:t>- James Strachan 2003</a:t>
+            </a:r>
+          </a:p>
+        </p:txBody>
+      </p:sp>
+    </p:spTree>
+  </p:cSld>
+  <p:clrMapOvr>
+    <a:masterClrMapping/>
+  </p:clrMapOvr>
+  <p:timing>
+    <p:tnLst>
+      <p:par>
+        <p:cTn id="1" dur="indefinite" restart="never" nodeType="tmRoot"/>
+      </p:par>
+    </p:tnLst>
+  </p:timing>
+</p:sld>
+</file>
+
+<file path=ppt/slides/slide10.xml><?xml version="1.0" encoding="utf-8"?>
+<p:sld xmlns:a="http://schemas.openxmlformats.org/drawingml/2006/main" xmlns:r="http://schemas.openxmlformats.org/officeDocument/2006/relationships" xmlns:p="http://schemas.openxmlformats.org/presentationml/2006/main">
+  <p:cSld>
+    <p:spTree>
+      <p:nvGrpSpPr>
+        <p:cNvPr id="1" name=""/>
+        <p:cNvGrpSpPr/>
+        <p:nvPr/>
+      </p:nvGrpSpPr>
+      <p:grpSpPr>
+        <a:xfrm>
+          <a:off x="0" y="0"/>
+          <a:ext cx="0" cy="0"/>
+          <a:chOff x="0" y="0"/>
+          <a:chExt cx="0" cy="0"/>
+        </a:xfrm>
+      </p:grpSpPr>
+      <p:sp>
+        <p:nvSpPr>
+          <p:cNvPr id="2" name="Rubrik 1"/>
+          <p:cNvSpPr>
+            <a:spLocks noGrp="1"/>
+          </p:cNvSpPr>
+          <p:nvPr>
+            <p:ph type="title"/>
+          </p:nvPr>
+        </p:nvSpPr>
+        <p:spPr/>
+        <p:txBody>
+          <a:bodyPr/>
+          <a:lstStyle/>
+          <a:p>
+            <a:r>
+              <a:rPr lang="sv-SE" dirty="0" smtClean="0"/>
+              <a:t>GPL(General </a:t>
+            </a:r>
+            <a:r>
+              <a:rPr lang="sv-SE" dirty="0" err="1" smtClean="0"/>
+              <a:t>Purpose</a:t>
+            </a:r>
+            <a:r>
+              <a:rPr lang="sv-SE" dirty="0" smtClean="0"/>
+              <a:t> Languages)</a:t>
+            </a:r>
+            <a:endParaRPr lang="sv-SE" dirty="0"/>
+          </a:p>
+        </p:txBody>
+      </p:sp>
+      <p:sp>
+        <p:nvSpPr>
+          <p:cNvPr id="3" name="Platshållare för innehåll 2"/>
+          <p:cNvSpPr>
+            <a:spLocks noGrp="1"/>
+          </p:cNvSpPr>
+          <p:nvPr>
+            <p:ph idx="1"/>
+          </p:nvPr>
+        </p:nvSpPr>
+        <p:spPr/>
+        <p:txBody>
+          <a:bodyPr/>
+          <a:lstStyle/>
+          <a:p>
+            <a:r>
+              <a:rPr lang="sv-SE" dirty="0" smtClean="0"/>
+              <a:t>Java, C, .NET och liknande språk kallas GPL</a:t>
+            </a:r>
+            <a:r>
+              <a:rPr lang="sv-SE" dirty="0" smtClean="0"/>
+              <a:t>, General </a:t>
+            </a:r>
+            <a:r>
+              <a:rPr lang="sv-SE" dirty="0" err="1" smtClean="0"/>
+              <a:t>Purpose</a:t>
+            </a:r>
+            <a:r>
+              <a:rPr lang="sv-SE" dirty="0" smtClean="0"/>
+              <a:t> </a:t>
+            </a:r>
+            <a:r>
+              <a:rPr lang="sv-SE" dirty="0" smtClean="0"/>
+              <a:t>Languages. </a:t>
+            </a:r>
+            <a:endParaRPr lang="sv-SE" dirty="0" smtClean="0"/>
+          </a:p>
+          <a:p>
+            <a:r>
+              <a:rPr lang="sv-SE" dirty="0" smtClean="0"/>
+              <a:t>Har en generell syntax, oberoende av område.</a:t>
+            </a:r>
+          </a:p>
+          <a:p>
+            <a:r>
+              <a:rPr lang="sv-SE" dirty="0" smtClean="0"/>
+              <a:t>Allt går att göra, men det är sällan det enklaste/snabbaste sättet</a:t>
+            </a:r>
+            <a:endParaRPr lang="sv-SE" dirty="0"/>
+          </a:p>
+        </p:txBody>
+      </p:sp>
+    </p:spTree>
+  </p:cSld>
+  <p:clrMapOvr>
+    <a:masterClrMapping/>
+  </p:clrMapOvr>
+  <p:timing>
+    <p:tnLst>
+      <p:par>
+        <p:cTn id="1" dur="indefinite" restart="never" nodeType="tmRoot"/>
+      </p:par>
+    </p:tnLst>
+  </p:timing>
+</p:sld>
+</file>
+
+<file path=ppt/slides/slide11.xml><?xml version="1.0" encoding="utf-8"?>
+<p:sld xmlns:a="http://schemas.openxmlformats.org/drawingml/2006/main" xmlns:r="http://schemas.openxmlformats.org/officeDocument/2006/relationships" xmlns:p="http://schemas.openxmlformats.org/presentationml/2006/main">
+  <p:cSld>
+    <p:spTree>
+      <p:nvGrpSpPr>
+        <p:cNvPr id="1" name=""/>
+        <p:cNvGrpSpPr/>
+        <p:nvPr/>
+      </p:nvGrpSpPr>
+      <p:grpSpPr>
+        <a:xfrm>
+          <a:off x="0" y="0"/>
+          <a:ext cx="0" cy="0"/>
+          <a:chOff x="0" y="0"/>
+          <a:chExt cx="0" cy="0"/>
+        </a:xfrm>
+      </p:grpSpPr>
+      <p:sp>
+        <p:nvSpPr>
+          <p:cNvPr id="2" name="Rubrik 1"/>
+          <p:cNvSpPr>
+            <a:spLocks noGrp="1"/>
+          </p:cNvSpPr>
+          <p:nvPr>
+            <p:ph type="title"/>
+          </p:nvPr>
+        </p:nvSpPr>
+        <p:spPr/>
+        <p:txBody>
+          <a:bodyPr/>
+          <a:lstStyle/>
+          <a:p>
+            <a:r>
+              <a:rPr lang="sv-SE" dirty="0" smtClean="0"/>
+              <a:t>DSL (</a:t>
+            </a:r>
+            <a:r>
+              <a:rPr lang="sv-SE" dirty="0" err="1" smtClean="0"/>
+              <a:t>Domain</a:t>
+            </a:r>
+            <a:r>
+              <a:rPr lang="sv-SE" dirty="0" smtClean="0"/>
+              <a:t> </a:t>
+            </a:r>
+            <a:r>
+              <a:rPr lang="sv-SE" dirty="0" err="1" smtClean="0"/>
+              <a:t>Specific</a:t>
+            </a:r>
+            <a:r>
+              <a:rPr lang="sv-SE" dirty="0" smtClean="0"/>
+              <a:t> Languages)</a:t>
+            </a:r>
+            <a:endParaRPr lang="sv-SE" dirty="0"/>
+          </a:p>
+        </p:txBody>
+      </p:sp>
+      <p:sp>
+        <p:nvSpPr>
+          <p:cNvPr id="3" name="Platshållare för innehåll 2"/>
+          <p:cNvSpPr>
+            <a:spLocks noGrp="1"/>
+          </p:cNvSpPr>
+          <p:nvPr>
+            <p:ph idx="1"/>
+          </p:nvPr>
+        </p:nvSpPr>
+        <p:spPr/>
+        <p:txBody>
+          <a:bodyPr/>
+          <a:lstStyle/>
+          <a:p>
+            <a:r>
+              <a:rPr lang="sv-SE" dirty="0" smtClean="0"/>
+              <a:t>Språket är designat utifrån domänen det används i.</a:t>
+            </a:r>
+          </a:p>
+          <a:p>
+            <a:r>
+              <a:rPr lang="sv-SE" dirty="0" smtClean="0"/>
+              <a:t>Exempel på befintliga </a:t>
+            </a:r>
+            <a:r>
+              <a:rPr lang="sv-SE" dirty="0" err="1" smtClean="0"/>
+              <a:t>DSL:s</a:t>
+            </a:r>
+            <a:r>
+              <a:rPr lang="sv-SE" dirty="0" smtClean="0"/>
+              <a:t>:</a:t>
+            </a:r>
+          </a:p>
+          <a:p>
+            <a:pPr lvl="1"/>
+            <a:r>
+              <a:rPr lang="sv-SE" dirty="0" smtClean="0"/>
+              <a:t>SQL</a:t>
+            </a:r>
+          </a:p>
+          <a:p>
+            <a:pPr lvl="1"/>
+            <a:r>
+              <a:rPr lang="sv-SE" dirty="0" smtClean="0"/>
+              <a:t>HTML</a:t>
+            </a:r>
+          </a:p>
+          <a:p>
+            <a:pPr lvl="1"/>
+            <a:r>
+              <a:rPr lang="sv-SE" dirty="0" smtClean="0"/>
+              <a:t>ANT</a:t>
+            </a:r>
+          </a:p>
+          <a:p>
+            <a:pPr lvl="1"/>
+            <a:r>
+              <a:rPr lang="sv-SE" dirty="0" smtClean="0"/>
+              <a:t>CSS</a:t>
+            </a:r>
+            <a:endParaRPr lang="sv-SE" dirty="0"/>
+          </a:p>
+        </p:txBody>
+      </p:sp>
+    </p:spTree>
+  </p:cSld>
+  <p:clrMapOvr>
+    <a:masterClrMapping/>
+  </p:clrMapOvr>
+  <p:timing>
+    <p:tnLst>
+      <p:par>
+        <p:cTn id="1" dur="indefinite" restart="never" nodeType="tmRoot"/>
+      </p:par>
+    </p:tnLst>
+  </p:timing>
+</p:sld>
+</file>
+
+<file path=ppt/slides/slide12.xml><?xml version="1.0" encoding="utf-8"?>
+<p:sld xmlns:a="http://schemas.openxmlformats.org/drawingml/2006/main" xmlns:r="http://schemas.openxmlformats.org/officeDocument/2006/relationships" xmlns:p="http://schemas.openxmlformats.org/presentationml/2006/main">
+  <p:cSld>
+    <p:spTree>
+      <p:nvGrpSpPr>
+        <p:cNvPr id="1" name=""/>
+        <p:cNvGrpSpPr/>
+        <p:nvPr/>
+      </p:nvGrpSpPr>
+      <p:grpSpPr>
+        <a:xfrm>
+          <a:off x="0" y="0"/>
+          <a:ext cx="0" cy="0"/>
+          <a:chOff x="0" y="0"/>
+          <a:chExt cx="0" cy="0"/>
+        </a:xfrm>
+      </p:grpSpPr>
+      <p:sp>
+        <p:nvSpPr>
+          <p:cNvPr id="2" name="Rubrik 1"/>
+          <p:cNvSpPr>
+            <a:spLocks noGrp="1"/>
+          </p:cNvSpPr>
+          <p:nvPr>
+            <p:ph type="title"/>
+          </p:nvPr>
+        </p:nvSpPr>
+        <p:spPr/>
+        <p:txBody>
+          <a:bodyPr>
+            <a:normAutofit/>
+          </a:bodyPr>
+          <a:lstStyle/>
+          <a:p>
+            <a:r>
+              <a:rPr lang="sv-SE" dirty="0" smtClean="0"/>
+              <a:t>Fördelar med DSL</a:t>
+            </a:r>
+            <a:endParaRPr lang="sv-SE" dirty="0"/>
+          </a:p>
+        </p:txBody>
+      </p:sp>
+      <p:sp>
+        <p:nvSpPr>
+          <p:cNvPr id="3" name="Platshållare för innehåll 2"/>
+          <p:cNvSpPr>
+            <a:spLocks noGrp="1"/>
+          </p:cNvSpPr>
+          <p:nvPr>
+            <p:ph idx="1"/>
+          </p:nvPr>
+        </p:nvSpPr>
+        <p:spPr/>
+        <p:txBody>
+          <a:bodyPr/>
+          <a:lstStyle/>
+          <a:p>
+            <a:r>
+              <a:rPr lang="sv-SE" dirty="0" smtClean="0"/>
+              <a:t>Koden blir lättläst</a:t>
+            </a:r>
+          </a:p>
+          <a:p>
+            <a:r>
+              <a:rPr lang="sv-SE" dirty="0" smtClean="0"/>
+              <a:t>Går snabbare att utveckla i ett språk som ligger nära problemdomänen</a:t>
+            </a:r>
+          </a:p>
+          <a:p>
+            <a:r>
+              <a:rPr lang="sv-SE" dirty="0" smtClean="0"/>
+              <a:t>Lätt att kommunicera med beställare och användare</a:t>
+            </a:r>
+          </a:p>
+          <a:p>
+            <a:r>
+              <a:rPr lang="sv-SE" dirty="0" smtClean="0"/>
+              <a:t>Lätt att skriva enhetstester</a:t>
+            </a:r>
+            <a:endParaRPr lang="sv-SE" dirty="0"/>
+          </a:p>
+        </p:txBody>
+      </p:sp>
+    </p:spTree>
+  </p:cSld>
+  <p:clrMapOvr>
+    <a:masterClrMapping/>
+  </p:clrMapOvr>
+  <p:timing>
+    <p:tnLst>
+      <p:par>
+        <p:cTn id="1" dur="indefinite" restart="never" nodeType="tmRoot"/>
+      </p:par>
+    </p:tnLst>
+  </p:timing>
+</p:sld>
+</file>
+
+<file path=ppt/slides/slide13.xml><?xml version="1.0" encoding="utf-8"?>
+<p:sld xmlns:a="http://schemas.openxmlformats.org/drawingml/2006/main" xmlns:r="http://schemas.openxmlformats.org/officeDocument/2006/relationships" xmlns:p="http://schemas.openxmlformats.org/presentationml/2006/main">
+  <p:cSld>
+    <p:spTree>
+      <p:nvGrpSpPr>
+        <p:cNvPr id="1" name=""/>
+        <p:cNvGrpSpPr/>
+        <p:nvPr/>
+      </p:nvGrpSpPr>
+      <p:grpSpPr>
+        <a:xfrm>
+          <a:off x="0" y="0"/>
+          <a:ext cx="0" cy="0"/>
+          <a:chOff x="0" y="0"/>
+          <a:chExt cx="0" cy="0"/>
+        </a:xfrm>
+      </p:grpSpPr>
+      <p:sp>
+        <p:nvSpPr>
+          <p:cNvPr id="2" name="Rubrik 1"/>
+          <p:cNvSpPr>
+            <a:spLocks noGrp="1"/>
+          </p:cNvSpPr>
+          <p:nvPr>
+            <p:ph type="title"/>
+          </p:nvPr>
+        </p:nvSpPr>
+        <p:spPr/>
+        <p:txBody>
+          <a:bodyPr/>
+          <a:lstStyle/>
+          <a:p>
+            <a:r>
+              <a:rPr lang="sv-SE" dirty="0" smtClean="0"/>
+              <a:t>DSL i </a:t>
+            </a:r>
+            <a:r>
+              <a:rPr lang="sv-SE" dirty="0" err="1" smtClean="0"/>
+              <a:t>Groovy</a:t>
+            </a:r>
+            <a:endParaRPr lang="sv-SE" dirty="0"/>
+          </a:p>
+        </p:txBody>
+      </p:sp>
+      <p:sp>
+        <p:nvSpPr>
+          <p:cNvPr id="3" name="Platshållare för innehåll 2"/>
+          <p:cNvSpPr>
+            <a:spLocks noGrp="1"/>
+          </p:cNvSpPr>
+          <p:nvPr>
+            <p:ph idx="1"/>
+          </p:nvPr>
+        </p:nvSpPr>
+        <p:spPr/>
+        <p:txBody>
+          <a:bodyPr>
+            <a:normAutofit/>
+          </a:bodyPr>
+          <a:lstStyle/>
+          <a:p>
+            <a:r>
+              <a:rPr lang="sv-SE" dirty="0" smtClean="0"/>
+              <a:t>I </a:t>
+            </a:r>
+            <a:r>
+              <a:rPr lang="sv-SE" dirty="0" err="1" smtClean="0"/>
+              <a:t>Groovy</a:t>
+            </a:r>
+            <a:r>
+              <a:rPr lang="sv-SE" dirty="0" smtClean="0"/>
+              <a:t> kan man skapa sina egna </a:t>
+            </a:r>
+            <a:r>
+              <a:rPr lang="sv-SE" dirty="0" err="1" smtClean="0"/>
+              <a:t>DSL:s</a:t>
+            </a:r>
+            <a:endParaRPr lang="sv-SE" dirty="0" smtClean="0"/>
+          </a:p>
+          <a:p>
+            <a:r>
+              <a:rPr lang="sv-SE" dirty="0" smtClean="0"/>
+              <a:t>Exempel:</a:t>
+            </a:r>
+          </a:p>
+          <a:p>
+            <a:pPr lvl="1"/>
+            <a:r>
+              <a:rPr lang="sv-SE" dirty="0" smtClean="0">
+                <a:latin typeface="Courier New" pitchFamily="49" charset="0"/>
+                <a:cs typeface="Courier New" pitchFamily="49" charset="0"/>
+              </a:rPr>
+              <a:t>4.days.ago</a:t>
+            </a:r>
+          </a:p>
+          <a:p>
+            <a:pPr lvl="1"/>
+            <a:r>
+              <a:rPr lang="sv-SE" sz="2400" dirty="0" err="1" smtClean="0">
+                <a:latin typeface="Courier New" pitchFamily="49" charset="0"/>
+                <a:cs typeface="Courier New" pitchFamily="49" charset="0"/>
+              </a:rPr>
+              <a:t>Order.pizza</a:t>
+            </a:r>
+            <a:r>
+              <a:rPr lang="sv-SE" sz="2400" dirty="0" smtClean="0">
+                <a:latin typeface="Courier New" pitchFamily="49" charset="0"/>
+                <a:cs typeface="Courier New" pitchFamily="49" charset="0"/>
+              </a:rPr>
+              <a:t>{ </a:t>
+            </a:r>
+            <a:endParaRPr lang="sv-SE" sz="2400" dirty="0" smtClean="0">
+              <a:latin typeface="Courier New" pitchFamily="49" charset="0"/>
+              <a:cs typeface="Courier New" pitchFamily="49" charset="0"/>
+            </a:endParaRPr>
+          </a:p>
+          <a:p>
+            <a:pPr>
+              <a:buNone/>
+            </a:pPr>
+            <a:r>
+              <a:rPr lang="sv-SE" sz="2400" dirty="0" smtClean="0">
+                <a:latin typeface="Courier New" pitchFamily="49" charset="0"/>
+                <a:cs typeface="Courier New" pitchFamily="49" charset="0"/>
+              </a:rPr>
+              <a:t>		</a:t>
+            </a:r>
+            <a:r>
+              <a:rPr lang="sv-SE" sz="2400" dirty="0" err="1" smtClean="0">
+                <a:latin typeface="Courier New" pitchFamily="49" charset="0"/>
+                <a:cs typeface="Courier New" pitchFamily="49" charset="0"/>
+              </a:rPr>
+              <a:t>size</a:t>
+            </a:r>
+            <a:r>
+              <a:rPr lang="sv-SE" sz="2400" dirty="0" smtClean="0">
+                <a:latin typeface="Courier New" pitchFamily="49" charset="0"/>
+                <a:cs typeface="Courier New" pitchFamily="49" charset="0"/>
+              </a:rPr>
+              <a:t> </a:t>
+            </a:r>
+            <a:r>
+              <a:rPr lang="sv-SE" sz="2400" dirty="0" err="1" smtClean="0">
+                <a:latin typeface="Courier New" pitchFamily="49" charset="0"/>
+                <a:cs typeface="Courier New" pitchFamily="49" charset="0"/>
+              </a:rPr>
+              <a:t>large</a:t>
+            </a:r>
+            <a:endParaRPr lang="sv-SE" sz="2400" dirty="0" smtClean="0">
+              <a:latin typeface="Courier New" pitchFamily="49" charset="0"/>
+              <a:cs typeface="Courier New" pitchFamily="49" charset="0"/>
+            </a:endParaRPr>
+          </a:p>
+          <a:p>
+            <a:pPr>
+              <a:buNone/>
+            </a:pPr>
+            <a:r>
+              <a:rPr lang="sv-SE" sz="2400" dirty="0" smtClean="0">
+                <a:latin typeface="Courier New" pitchFamily="49" charset="0"/>
+                <a:cs typeface="Courier New" pitchFamily="49" charset="0"/>
+              </a:rPr>
+              <a:t>		</a:t>
+            </a:r>
+            <a:r>
+              <a:rPr lang="sv-SE" sz="2400" dirty="0" err="1" smtClean="0">
+                <a:latin typeface="Courier New" pitchFamily="49" charset="0"/>
+                <a:cs typeface="Courier New" pitchFamily="49" charset="0"/>
+              </a:rPr>
+              <a:t>topping</a:t>
+            </a:r>
+            <a:r>
+              <a:rPr lang="sv-SE" sz="2400" dirty="0" smtClean="0">
+                <a:latin typeface="Courier New" pitchFamily="49" charset="0"/>
+                <a:cs typeface="Courier New" pitchFamily="49" charset="0"/>
+              </a:rPr>
+              <a:t> </a:t>
+            </a:r>
+            <a:r>
+              <a:rPr lang="sv-SE" sz="2400" dirty="0" err="1" smtClean="0">
+                <a:latin typeface="Courier New" pitchFamily="49" charset="0"/>
+                <a:cs typeface="Courier New" pitchFamily="49" charset="0"/>
+              </a:rPr>
+              <a:t>olives</a:t>
+            </a:r>
+            <a:r>
+              <a:rPr lang="sv-SE" sz="2400" dirty="0" smtClean="0">
+                <a:latin typeface="Courier New" pitchFamily="49" charset="0"/>
+                <a:cs typeface="Courier New" pitchFamily="49" charset="0"/>
+              </a:rPr>
+              <a:t>, </a:t>
+            </a:r>
+            <a:r>
+              <a:rPr lang="sv-SE" sz="2400" dirty="0" err="1" smtClean="0">
+                <a:latin typeface="Courier New" pitchFamily="49" charset="0"/>
+                <a:cs typeface="Courier New" pitchFamily="49" charset="0"/>
+              </a:rPr>
+              <a:t>pepper</a:t>
+            </a:r>
+            <a:r>
+              <a:rPr lang="sv-SE" sz="2400" dirty="0" smtClean="0">
+                <a:latin typeface="Courier New" pitchFamily="49" charset="0"/>
+                <a:cs typeface="Courier New" pitchFamily="49" charset="0"/>
+              </a:rPr>
+              <a:t>, salami</a:t>
+            </a:r>
+          </a:p>
+          <a:p>
+            <a:pPr>
+              <a:buNone/>
+            </a:pPr>
+            <a:r>
+              <a:rPr lang="sv-SE" sz="2400" dirty="0" smtClean="0">
+                <a:latin typeface="Courier New" pitchFamily="49" charset="0"/>
+                <a:cs typeface="Courier New" pitchFamily="49" charset="0"/>
+              </a:rPr>
+              <a:t>		adress </a:t>
+            </a:r>
+            <a:r>
+              <a:rPr lang="sv-SE" sz="2400" dirty="0" smtClean="0">
+                <a:latin typeface="Courier New" pitchFamily="49" charset="0"/>
+                <a:cs typeface="Courier New" pitchFamily="49" charset="0"/>
+              </a:rPr>
+              <a:t>"Gamla brogatan 11"</a:t>
+            </a:r>
+          </a:p>
+          <a:p>
+            <a:pPr>
+              <a:buNone/>
+            </a:pPr>
+            <a:r>
+              <a:rPr lang="sv-SE" sz="2400" dirty="0" smtClean="0">
+                <a:latin typeface="Courier New" pitchFamily="49" charset="0"/>
+                <a:cs typeface="Courier New" pitchFamily="49" charset="0"/>
+              </a:rPr>
+              <a:t>		</a:t>
+            </a:r>
+            <a:r>
+              <a:rPr lang="sv-SE" sz="2400" dirty="0" err="1" smtClean="0">
+                <a:latin typeface="Courier New" pitchFamily="49" charset="0"/>
+                <a:cs typeface="Courier New" pitchFamily="49" charset="0"/>
+              </a:rPr>
+              <a:t>payment</a:t>
+            </a:r>
+            <a:r>
+              <a:rPr lang="sv-SE" sz="2400" dirty="0" smtClean="0">
+                <a:latin typeface="Courier New" pitchFamily="49" charset="0"/>
+                <a:cs typeface="Courier New" pitchFamily="49" charset="0"/>
+              </a:rPr>
+              <a:t> </a:t>
+            </a:r>
+            <a:r>
+              <a:rPr lang="sv-SE" sz="2400" dirty="0" smtClean="0">
+                <a:latin typeface="Courier New" pitchFamily="49" charset="0"/>
+                <a:cs typeface="Courier New" pitchFamily="49" charset="0"/>
+              </a:rPr>
+              <a:t>visa, ’1234-1234-1234-1234</a:t>
+            </a:r>
+          </a:p>
+          <a:p>
+            <a:pPr>
+              <a:buNone/>
+            </a:pPr>
+            <a:r>
+              <a:rPr lang="sv-SE" sz="2400" dirty="0" smtClean="0">
+                <a:latin typeface="Courier New" pitchFamily="49" charset="0"/>
+                <a:cs typeface="Courier New" pitchFamily="49" charset="0"/>
+              </a:rPr>
+              <a:t>	}</a:t>
+            </a:r>
+            <a:endParaRPr lang="sv-SE" sz="2400" dirty="0">
+              <a:latin typeface="Courier New" pitchFamily="49" charset="0"/>
+              <a:cs typeface="Courier New" pitchFamily="49" charset="0"/>
+            </a:endParaRPr>
+          </a:p>
+        </p:txBody>
+      </p:sp>
+    </p:spTree>
+  </p:cSld>
+  <p:clrMapOvr>
+    <a:masterClrMapping/>
+  </p:clrMapOvr>
+  <p:timing>
+    <p:tnLst>
+      <p:par>
+        <p:cTn id="1" dur="indefinite" restart="never" nodeType="tmRoot"/>
+      </p:par>
+    </p:tnLst>
+  </p:timing>
+</p:sld>
+</file>
+
+<file path=ppt/slides/slide14.xml><?xml version="1.0" encoding="utf-8"?>
+<p:sld xmlns:a="http://schemas.openxmlformats.org/drawingml/2006/main" xmlns:r="http://schemas.openxmlformats.org/officeDocument/2006/relationships" xmlns:p="http://schemas.openxmlformats.org/presentationml/2006/main">
+  <p:cSld>
+    <p:spTree>
+      <p:nvGrpSpPr>
+        <p:cNvPr id="1" name=""/>
+        <p:cNvGrpSpPr/>
+        <p:nvPr/>
+      </p:nvGrpSpPr>
+      <p:grpSpPr>
+        <a:xfrm>
+          <a:off x="0" y="0"/>
+          <a:ext cx="0" cy="0"/>
+          <a:chOff x="0" y="0"/>
+          <a:chExt cx="0" cy="0"/>
+        </a:xfrm>
+      </p:grpSpPr>
+      <p:sp>
+        <p:nvSpPr>
+          <p:cNvPr id="2" name="Rubrik 1"/>
+          <p:cNvSpPr>
+            <a:spLocks noGrp="1"/>
+          </p:cNvSpPr>
+          <p:nvPr>
+            <p:ph type="title"/>
+          </p:nvPr>
+        </p:nvSpPr>
+        <p:spPr/>
+        <p:txBody>
+          <a:bodyPr/>
+          <a:lstStyle/>
+          <a:p>
+            <a:r>
+              <a:rPr lang="sv-SE" dirty="0" smtClean="0"/>
+              <a:t>En rubrik som inte ska bytas, sida 2</a:t>
+            </a:r>
+            <a:endParaRPr lang="sv-SE" dirty="0"/>
+          </a:p>
+        </p:txBody>
+      </p:sp>
+      <p:sp>
+        <p:nvSpPr>
+          <p:cNvPr id="3" name="Platshållare för innehåll 2"/>
+          <p:cNvSpPr>
+            <a:spLocks noGrp="1"/>
+          </p:cNvSpPr>
+          <p:nvPr>
+            <p:ph idx="1"/>
+          </p:nvPr>
+        </p:nvSpPr>
+        <p:spPr/>
+        <p:txBody>
+          <a:bodyPr/>
+          <a:lstStyle/>
+          <a:p>
+            <a:pPr>
+              <a:buNone/>
+            </a:pPr>
             <a:r>
               <a:rPr lang="sv-SE" dirty="0" smtClean="0"/>
               <a:t>[</a:t>
             </a:r>
             <a:r>
-              <a:rPr lang="sv-SE" dirty="0" err="1" smtClean="0"/>
-              <a:t>helloWorld.groovy</a:t>
-            </a:r>
-            <a:r>
-              <a:rPr lang="sv-SE" dirty="0" smtClean="0"/>
-              <a:t>]</a:t>
+              <a:rPr lang="sv-SE" smtClean="0"/>
+              <a:t>helloWorld.java]</a:t>
             </a:r>
             <a:endParaRPr lang="sv-SE" dirty="0"/>
           </a:p>
@@ -3146,129 +3981,61 @@
           <a:lstStyle/>
           <a:p>
             <a:r>
+              <a:rPr lang="sv-SE" dirty="0" smtClean="0"/>
+              <a:t>Historik</a:t>
+            </a:r>
+            <a:endParaRPr lang="sv-SE" dirty="0"/>
+          </a:p>
+        </p:txBody>
+      </p:sp>
+      <p:sp>
+        <p:nvSpPr>
+          <p:cNvPr id="3" name="Platshållare för innehåll 2"/>
+          <p:cNvSpPr>
+            <a:spLocks noGrp="1"/>
+          </p:cNvSpPr>
+          <p:nvPr>
+            <p:ph idx="1"/>
+          </p:nvPr>
+        </p:nvSpPr>
+        <p:spPr/>
+        <p:txBody>
+          <a:bodyPr/>
+          <a:lstStyle/>
+          <a:p>
+            <a:endParaRPr lang="sv-SE" dirty="0" smtClean="0"/>
+          </a:p>
+          <a:p>
+            <a:r>
+              <a:rPr lang="sv-SE" dirty="0" smtClean="0"/>
+              <a:t>Startades under 2003</a:t>
+            </a:r>
+          </a:p>
+          <a:p>
+            <a:r>
+              <a:rPr lang="sv-SE" dirty="0" smtClean="0"/>
+              <a:t>Lades </a:t>
+            </a:r>
+            <a:r>
+              <a:rPr lang="sv-SE" dirty="0" smtClean="0"/>
+              <a:t>på is 2004</a:t>
+            </a:r>
+            <a:endParaRPr lang="sv-SE" dirty="0" smtClean="0"/>
+          </a:p>
+          <a:p>
+            <a:r>
+              <a:rPr lang="sv-SE" dirty="0" smtClean="0"/>
+              <a:t>Ny grupp utvecklare tog över strax efter</a:t>
+            </a:r>
+          </a:p>
+          <a:p>
+            <a:r>
               <a:rPr lang="sv-SE" dirty="0" err="1" smtClean="0"/>
               <a:t>Groovy</a:t>
             </a:r>
-            <a:endParaRPr lang="sv-SE" dirty="0"/>
-          </a:p>
-        </p:txBody>
-      </p:sp>
-      <p:sp>
-        <p:nvSpPr>
-          <p:cNvPr id="3" name="Platshållare för innehåll 2"/>
-          <p:cNvSpPr>
-            <a:spLocks noGrp="1"/>
-          </p:cNvSpPr>
-          <p:nvPr>
-            <p:ph idx="1"/>
-          </p:nvPr>
-        </p:nvSpPr>
-        <p:spPr/>
-        <p:txBody>
-          <a:bodyPr>
-            <a:normAutofit fontScale="85000" lnSpcReduction="10000"/>
-          </a:bodyPr>
-          <a:lstStyle/>
-          <a:p>
-            <a:pPr>
-              <a:buNone/>
-            </a:pPr>
-            <a:r>
-              <a:rPr lang="en-US" i="1" dirty="0" smtClean="0"/>
-              <a:t>“…So I've been musing a little while if its time the Java platform had its own </a:t>
-            </a:r>
-            <a:r>
-              <a:rPr lang="en-US" i="1" dirty="0" smtClean="0">
-                <a:solidFill>
-                  <a:srgbClr val="FF0000"/>
-                </a:solidFill>
-              </a:rPr>
-              <a:t>dynamic language</a:t>
-            </a:r>
-            <a:r>
-              <a:rPr lang="en-US" i="1" dirty="0" smtClean="0"/>
-              <a:t> designed from the ground up to </a:t>
-            </a:r>
-            <a:r>
-              <a:rPr lang="en-US" i="1" dirty="0" smtClean="0">
-                <a:solidFill>
-                  <a:srgbClr val="FF0000"/>
-                </a:solidFill>
-              </a:rPr>
-              <a:t>work real nice with existing </a:t>
-            </a:r>
-            <a:r>
-              <a:rPr lang="en-US" i="1" smtClean="0">
-                <a:solidFill>
-                  <a:srgbClr val="FF0000"/>
-                </a:solidFill>
-              </a:rPr>
-              <a:t>[Java] code</a:t>
-            </a:r>
-            <a:r>
-              <a:rPr lang="en-US" i="1" dirty="0" smtClean="0"/>
-              <a:t>; creating/extending objects normal Java can use and vice versa. </a:t>
-            </a:r>
-            <a:r>
-              <a:rPr lang="en-US" i="1" dirty="0" smtClean="0">
-                <a:solidFill>
-                  <a:srgbClr val="FF0000"/>
-                </a:solidFill>
-              </a:rPr>
-              <a:t>Python/</a:t>
-            </a:r>
-            <a:r>
-              <a:rPr lang="en-US" i="1" dirty="0" err="1" smtClean="0">
-                <a:solidFill>
-                  <a:srgbClr val="FF0000"/>
-                </a:solidFill>
-              </a:rPr>
-              <a:t>Jython's</a:t>
-            </a:r>
-            <a:r>
-              <a:rPr lang="en-US" i="1" dirty="0" smtClean="0">
-                <a:solidFill>
-                  <a:srgbClr val="FF0000"/>
-                </a:solidFill>
-              </a:rPr>
-              <a:t> a pretty good base - add the nice stuff from Ruby</a:t>
-            </a:r>
-            <a:r>
-              <a:rPr lang="en-US" i="1" dirty="0" smtClean="0"/>
-              <a:t> and maybe sprinkle on some </a:t>
-            </a:r>
-            <a:r>
-              <a:rPr lang="en-US" i="1" dirty="0" smtClean="0">
-                <a:solidFill>
-                  <a:srgbClr val="FF0000"/>
-                </a:solidFill>
-              </a:rPr>
-              <a:t>AOP features</a:t>
-            </a:r>
-            <a:r>
-              <a:rPr lang="en-US" i="1" dirty="0" smtClean="0"/>
-              <a:t> and we could have a really </a:t>
-            </a:r>
-            <a:r>
-              <a:rPr lang="en-US" i="1" dirty="0" smtClean="0">
-                <a:solidFill>
-                  <a:srgbClr val="FF0000"/>
-                </a:solidFill>
-              </a:rPr>
-              <a:t>Groovy</a:t>
-            </a:r>
-            <a:r>
-              <a:rPr lang="en-US" i="1" dirty="0" smtClean="0"/>
-              <a:t> new language for scripting Java objects, writing test cases and who knows, even doing real development in it.”</a:t>
-            </a:r>
-          </a:p>
-          <a:p>
-            <a:pPr algn="r">
-              <a:buNone/>
-            </a:pPr>
-            <a:r>
-              <a:rPr lang="en-US" i="1" dirty="0" smtClean="0"/>
-              <a:t>- James Strachan 2003</a:t>
+            <a:r>
+              <a:rPr lang="sv-SE" dirty="0" smtClean="0"/>
+              <a:t> version 1.0 släpptes 2:a Januari 2007</a:t>
             </a:r>
           </a:p>
         </p:txBody>
@@ -3322,7 +4089,7 @@
           <a:p>
             <a:r>
               <a:rPr lang="sv-SE" dirty="0" smtClean="0"/>
-              <a:t>Historik</a:t>
+              <a:t>Dynamiska språk</a:t>
             </a:r>
             <a:endParaRPr lang="sv-SE" dirty="0"/>
           </a:p>
@@ -3344,25 +4111,40 @@
           <a:lstStyle/>
           <a:p>
             <a:r>
-              <a:rPr lang="sv-SE" dirty="0" smtClean="0"/>
-              <a:t>Projektet lades på is 2004</a:t>
-            </a:r>
-          </a:p>
-          <a:p>
-            <a:r>
-              <a:rPr lang="sv-SE" dirty="0" smtClean="0"/>
-              <a:t>Ny grupp utvecklare tog över strax efter</a:t>
-            </a:r>
-          </a:p>
-          <a:p>
+              <a:rPr lang="en-US" dirty="0" smtClean="0"/>
+              <a:t>Dynamic programming language is a term used broadly in computer science to describe a class of high level programming languages that execute at runtime many common behaviors that other languages might perform during </a:t>
+            </a:r>
+            <a:r>
+              <a:rPr lang="en-US" dirty="0" smtClean="0"/>
+              <a:t>compilation</a:t>
+            </a:r>
+            <a:r>
+              <a:rPr lang="sv-SE" dirty="0" smtClean="0"/>
+              <a:t>, </a:t>
+            </a:r>
             <a:r>
               <a:rPr lang="sv-SE" dirty="0" err="1" smtClean="0"/>
-              <a:t>Groovy</a:t>
-            </a:r>
-            <a:r>
-              <a:rPr lang="sv-SE" dirty="0" smtClean="0"/>
-              <a:t> version 1.0 släpptes 2:a Januari 2007</a:t>
-            </a:r>
+              <a:t>if</a:t>
+            </a:r>
+            <a:r>
+              <a:rPr lang="sv-SE" dirty="0" smtClean="0"/>
+              <a:t> at </a:t>
+            </a:r>
+            <a:r>
+              <a:rPr lang="sv-SE" dirty="0" smtClean="0"/>
+              <a:t>all.</a:t>
+            </a:r>
+          </a:p>
+          <a:p>
+            <a:r>
+              <a:rPr lang="sv-SE" dirty="0" smtClean="0"/>
+              <a:t>Många, men inte alla, dynamiska språk har </a:t>
+            </a:r>
+            <a:r>
+              <a:rPr lang="sv-SE" smtClean="0"/>
+              <a:t>dynamisk typning</a:t>
+            </a:r>
+            <a:endParaRPr lang="sv-SE" dirty="0"/>
           </a:p>
         </p:txBody>
       </p:sp>
@@ -3443,8 +4225,46 @@
           <a:p>
             <a:r>
               <a:rPr lang="sv-SE" dirty="0" smtClean="0"/>
-              <a:t>Möjlighet att ändra hur språket fungerar</a:t>
-            </a:r>
+              <a:t>Möjlighet att ändra hur språket </a:t>
+            </a:r>
+            <a:r>
+              <a:rPr lang="sv-SE" dirty="0" smtClean="0"/>
+              <a:t>fungerar</a:t>
+            </a:r>
+          </a:p>
+          <a:p>
+            <a:pPr lvl="1"/>
+            <a:r>
+              <a:rPr lang="sv-SE" dirty="0" smtClean="0"/>
+              <a:t>Lägg till metoder i vilka klasser vi vill, även om vi saknar källkod</a:t>
+            </a:r>
+          </a:p>
+          <a:p>
+            <a:pPr lvl="1"/>
+            <a:r>
+              <a:rPr lang="sv-SE" dirty="0" smtClean="0"/>
+              <a:t>Skapa DSL (</a:t>
+            </a:r>
+            <a:r>
+              <a:rPr lang="sv-SE" dirty="0" err="1" smtClean="0"/>
+              <a:t>Domain</a:t>
+            </a:r>
+            <a:r>
+              <a:rPr lang="sv-SE" dirty="0" smtClean="0"/>
+              <a:t> </a:t>
+            </a:r>
+            <a:r>
+              <a:rPr lang="sv-SE" dirty="0" err="1" smtClean="0"/>
+              <a:t>Specific</a:t>
+            </a:r>
+            <a:r>
+              <a:rPr lang="sv-SE" dirty="0" smtClean="0"/>
+              <a:t> Language)</a:t>
+            </a:r>
+          </a:p>
+          <a:p>
+            <a:pPr lvl="1"/>
+            <a:endParaRPr lang="sv-SE" dirty="0" smtClean="0"/>
           </a:p>
           <a:p>
             <a:pPr>
@@ -3543,6 +4363,13 @@
   <p:clrMapOvr>
     <a:masterClrMapping/>
   </p:clrMapOvr>
+  <p:timing>
+    <p:tnLst>
+      <p:par>
+        <p:cTn id="1" dur="indefinite" restart="never" nodeType="tmRoot"/>
+      </p:par>
+    </p:tnLst>
+  </p:timing>
 </p:sld>
 </file>
 
@@ -3668,6 +4495,13 @@
   <p:clrMapOvr>
     <a:masterClrMapping/>
   </p:clrMapOvr>
+  <p:timing>
+    <p:tnLst>
+      <p:par>
+        <p:cTn id="1" dur="indefinite" restart="never" nodeType="tmRoot"/>
+      </p:par>
+    </p:tnLst>
+  </p:timing>
 </p:sld>
 </file>
 
@@ -3787,6 +4621,13 @@
   <p:clrMapOvr>
     <a:masterClrMapping/>
   </p:clrMapOvr>
+  <p:timing>
+    <p:tnLst>
+      <p:par>
+        <p:cTn id="1" dur="indefinite" restart="never" nodeType="tmRoot"/>
+      </p:par>
+    </p:tnLst>
+  </p:timing>
 </p:sld>
 </file>
 
@@ -3814,34 +4655,27 @@
             <a:spLocks noGrp="1"/>
           </p:cNvSpPr>
           <p:nvPr>
-            <p:ph type="title"/>
-          </p:nvPr>
-        </p:nvSpPr>
-        <p:spPr/>
-        <p:txBody>
-          <a:bodyPr/>
-          <a:lstStyle/>
-          <a:p>
-            <a:endParaRPr lang="sv-SE"/>
-          </a:p>
-        </p:txBody>
-      </p:sp>
-      <p:sp>
-        <p:nvSpPr>
-          <p:cNvPr id="3" name="Platshållare för innehåll 2"/>
-          <p:cNvSpPr>
-            <a:spLocks noGrp="1"/>
-          </p:cNvSpPr>
-          <p:nvPr>
-            <p:ph idx="1"/>
-          </p:nvPr>
-        </p:nvSpPr>
-        <p:spPr/>
-        <p:txBody>
-          <a:bodyPr/>
-          <a:lstStyle/>
-          <a:p>
-            <a:endParaRPr lang="sv-SE"/>
+            <p:ph type="ctrTitle"/>
+          </p:nvPr>
+        </p:nvSpPr>
+        <p:spPr/>
+        <p:txBody>
+          <a:bodyPr/>
+          <a:lstStyle/>
+          <a:p>
+            <a:r>
+              <a:rPr lang="sv-SE" dirty="0" smtClean="0"/>
+              <a:t>[</a:t>
+            </a:r>
+            <a:r>
+              <a:rPr lang="sv-SE" dirty="0" err="1" smtClean="0"/>
+              <a:t>helloWorld.groovy</a:t>
+            </a:r>
+            <a:r>
+              <a:rPr lang="sv-SE" dirty="0" smtClean="0"/>
+              <a:t>]</a:t>
+            </a:r>
+            <a:endParaRPr lang="sv-SE" dirty="0"/>
           </a:p>
         </p:txBody>
       </p:sp>
@@ -3894,7 +4728,7 @@
           <a:p>
             <a:r>
               <a:rPr lang="sv-SE" dirty="0" smtClean="0"/>
-              <a:t>En rubrik som inte ska bytas, sida 2</a:t>
+              <a:t>Metaprogrammering</a:t>
             </a:r>
             <a:endParaRPr lang="sv-SE" dirty="0"/>
           </a:p>
@@ -3915,16 +4749,73 @@
           <a:bodyPr/>
           <a:lstStyle/>
           <a:p>
-            <a:pPr>
-              <a:buNone/>
-            </a:pPr>
-            <a:r>
-              <a:rPr lang="sv-SE" dirty="0" smtClean="0"/>
-              <a:t>[</a:t>
-            </a:r>
-            <a:r>
-              <a:rPr lang="sv-SE" smtClean="0"/>
-              <a:t>helloWorld.java]</a:t>
+            <a:r>
+              <a:rPr lang="sv-SE" dirty="0" smtClean="0"/>
+              <a:t>Program som ändrar program, inklusive sig själv</a:t>
+            </a:r>
+          </a:p>
+          <a:p>
+            <a:r>
+              <a:rPr lang="sv-SE" dirty="0" smtClean="0"/>
+              <a:t>Skapa klasser och metoder medan programmet körs</a:t>
+            </a:r>
+          </a:p>
+          <a:p>
+            <a:r>
+              <a:rPr lang="sv-SE" dirty="0" smtClean="0"/>
+              <a:t>Skapa </a:t>
+            </a:r>
+            <a:r>
+              <a:rPr lang="sv-SE" dirty="0" err="1" smtClean="0"/>
+              <a:t>mock-objekt</a:t>
+            </a:r>
+            <a:r>
+              <a:rPr lang="sv-SE" dirty="0" smtClean="0"/>
+              <a:t> </a:t>
+            </a:r>
+          </a:p>
+          <a:p>
+            <a:r>
+              <a:rPr lang="sv-SE" dirty="0" smtClean="0"/>
+              <a:t>Testa klasser som är tight kopplade</a:t>
+            </a:r>
+          </a:p>
+          <a:p>
+            <a:r>
+              <a:rPr lang="sv-SE" dirty="0" smtClean="0"/>
+              <a:t>Skapa </a:t>
+            </a:r>
+            <a:r>
+              <a:rPr lang="sv-SE" dirty="0" err="1" smtClean="0"/>
+              <a:t>DSL:s</a:t>
+            </a:r>
+            <a:r>
+              <a:rPr lang="sv-SE" dirty="0" smtClean="0"/>
+              <a:t> (</a:t>
+            </a:r>
+            <a:r>
+              <a:rPr lang="sv-SE" dirty="0" err="1" smtClean="0"/>
+              <a:t>Domain</a:t>
+            </a:r>
+            <a:r>
+              <a:rPr lang="sv-SE" dirty="0" smtClean="0"/>
+              <a:t> </a:t>
+            </a:r>
+            <a:r>
+              <a:rPr lang="sv-SE" dirty="0" err="1" smtClean="0"/>
+              <a:t>specific</a:t>
+            </a:r>
+            <a:r>
+              <a:rPr lang="sv-SE" dirty="0" smtClean="0"/>
+              <a:t> </a:t>
+            </a:r>
+            <a:r>
+              <a:rPr lang="sv-SE" dirty="0" err="1" smtClean="0"/>
+              <a:t>languages</a:t>
+            </a:r>
+            <a:r>
+              <a:rPr lang="sv-SE" dirty="0" smtClean="0"/>
+              <a:t>)</a:t>
             </a:r>
             <a:endParaRPr lang="sv-SE" dirty="0"/>
           </a:p>
@@ -3935,13 +4826,6 @@
   <p:clrMapOvr>
     <a:masterClrMapping/>
   </p:clrMapOvr>
-  <p:timing>
-    <p:tnLst>
-      <p:par>
-        <p:cTn id="1" dur="indefinite" restart="never" nodeType="tmRoot"/>
-      </p:par>
-    </p:tnLst>
-  </p:timing>
 </p:sld>
 </file>
 

</xml_diff>

<commit_message>
tagit bort filnamn och paket ur den genererade powerpointen
</commit_message>
<xml_diff>
--- a/groovyseminarie/dokument/groovyseminarium_source.pptx
+++ b/groovyseminarie/dokument/groovyseminarium_source.pptx
@@ -5,20 +5,22 @@
     <p:sldMasterId id="2147483648" r:id="rId1"/>
   </p:sldMasterIdLst>
   <p:sldIdLst>
-    <p:sldId id="260" r:id="rId2"/>
-    <p:sldId id="261" r:id="rId3"/>
-    <p:sldId id="270" r:id="rId4"/>
-    <p:sldId id="258" r:id="rId5"/>
-    <p:sldId id="262" r:id="rId6"/>
-    <p:sldId id="263" r:id="rId7"/>
-    <p:sldId id="264" r:id="rId8"/>
-    <p:sldId id="256" r:id="rId9"/>
-    <p:sldId id="269" r:id="rId10"/>
-    <p:sldId id="259" r:id="rId11"/>
-    <p:sldId id="265" r:id="rId12"/>
-    <p:sldId id="268" r:id="rId13"/>
-    <p:sldId id="266" r:id="rId14"/>
-    <p:sldId id="257" r:id="rId15"/>
+    <p:sldId id="279" r:id="rId2"/>
+    <p:sldId id="260" r:id="rId3"/>
+    <p:sldId id="261" r:id="rId4"/>
+    <p:sldId id="270" r:id="rId5"/>
+    <p:sldId id="258" r:id="rId6"/>
+    <p:sldId id="271" r:id="rId7"/>
+    <p:sldId id="272" r:id="rId8"/>
+    <p:sldId id="273" r:id="rId9"/>
+    <p:sldId id="278" r:id="rId10"/>
+    <p:sldId id="276" r:id="rId11"/>
+    <p:sldId id="277" r:id="rId12"/>
+    <p:sldId id="275" r:id="rId13"/>
+    <p:sldId id="263" r:id="rId14"/>
+    <p:sldId id="264" r:id="rId15"/>
+    <p:sldId id="256" r:id="rId16"/>
+    <p:sldId id="257" r:id="rId17"/>
   </p:sldIdLst>
   <p:sldSz cx="9144000" cy="6858000" type="screen4x3"/>
   <p:notesSz cx="6858000" cy="9144000"/>
@@ -3087,123 +3089,41 @@
           <a:bodyPr/>
           <a:lstStyle/>
           <a:p>
+            <a:endParaRPr lang="sv-SE" dirty="0"/>
+          </a:p>
+        </p:txBody>
+      </p:sp>
+      <p:sp>
+        <p:nvSpPr>
+          <p:cNvPr id="3" name="Platshållare för innehåll 2"/>
+          <p:cNvSpPr>
+            <a:spLocks noGrp="1"/>
+          </p:cNvSpPr>
+          <p:nvPr>
+            <p:ph idx="1"/>
+          </p:nvPr>
+        </p:nvSpPr>
+        <p:spPr/>
+        <p:txBody>
+          <a:bodyPr/>
+          <a:lstStyle/>
+          <a:p>
+            <a:pPr>
+              <a:buNone/>
+            </a:pPr>
+            <a:r>
+              <a:rPr lang="sv-SE" dirty="0" smtClean="0"/>
+              <a:t>[</a:t>
+            </a:r>
             <a:r>
               <a:rPr lang="sv-SE" dirty="0" err="1" smtClean="0"/>
-              <a:t>Groovy</a:t>
+              <a:t>helloWorld.groovy</a:t>
+            </a:r>
+            <a:r>
+              <a:rPr lang="sv-SE" dirty="0" smtClean="0"/>
+              <a:t>]</a:t>
             </a:r>
             <a:endParaRPr lang="sv-SE" dirty="0"/>
-          </a:p>
-        </p:txBody>
-      </p:sp>
-      <p:sp>
-        <p:nvSpPr>
-          <p:cNvPr id="3" name="Platshållare för innehåll 2"/>
-          <p:cNvSpPr>
-            <a:spLocks noGrp="1"/>
-          </p:cNvSpPr>
-          <p:nvPr>
-            <p:ph idx="1"/>
-          </p:nvPr>
-        </p:nvSpPr>
-        <p:spPr/>
-        <p:txBody>
-          <a:bodyPr>
-            <a:normAutofit fontScale="85000" lnSpcReduction="10000"/>
-          </a:bodyPr>
-          <a:lstStyle/>
-          <a:p>
-            <a:pPr>
-              <a:buNone/>
-            </a:pPr>
-            <a:r>
-              <a:rPr lang="en-US" i="1" dirty="0" smtClean="0"/>
-              <a:t>“…So I've been musing a little while if its time the Java platform had its own </a:t>
-            </a:r>
-            <a:r>
-              <a:rPr lang="en-US" i="1" dirty="0" smtClean="0">
-                <a:solidFill>
-                  <a:srgbClr val="FF0000"/>
-                </a:solidFill>
-              </a:rPr>
-              <a:t>dynamic language</a:t>
-            </a:r>
-            <a:r>
-              <a:rPr lang="en-US" i="1" dirty="0" smtClean="0"/>
-              <a:t> designed from the ground up to </a:t>
-            </a:r>
-            <a:r>
-              <a:rPr lang="en-US" i="1" dirty="0" smtClean="0">
-                <a:solidFill>
-                  <a:srgbClr val="FF0000"/>
-                </a:solidFill>
-              </a:rPr>
-              <a:t>work real nice with existing [Java] code</a:t>
-            </a:r>
-            <a:r>
-              <a:rPr lang="en-US" i="1" dirty="0" smtClean="0"/>
-              <a:t>; creating/extending objects normal Java can use and vice versa. </a:t>
-            </a:r>
-            <a:r>
-              <a:rPr lang="en-US" i="1" dirty="0" smtClean="0">
-                <a:solidFill>
-                  <a:srgbClr val="FF0000"/>
-                </a:solidFill>
-              </a:rPr>
-              <a:t>Python/</a:t>
-            </a:r>
-            <a:r>
-              <a:rPr lang="en-US" i="1" dirty="0" err="1" smtClean="0">
-                <a:solidFill>
-                  <a:srgbClr val="FF0000"/>
-                </a:solidFill>
-              </a:rPr>
-              <a:t>Jython's</a:t>
-            </a:r>
-            <a:r>
-              <a:rPr lang="en-US" i="1" dirty="0" smtClean="0">
-                <a:solidFill>
-                  <a:srgbClr val="FF0000"/>
-                </a:solidFill>
-              </a:rPr>
-              <a:t> a pretty good base - add the nice stuff from Ruby</a:t>
-            </a:r>
-            <a:r>
-              <a:rPr lang="en-US" i="1" dirty="0" smtClean="0"/>
-              <a:t> and maybe sprinkle on some </a:t>
-            </a:r>
-            <a:r>
-              <a:rPr lang="en-US" i="1" dirty="0" smtClean="0">
-                <a:solidFill>
-                  <a:srgbClr val="FF0000"/>
-                </a:solidFill>
-              </a:rPr>
-              <a:t>AOP features</a:t>
-            </a:r>
-            <a:r>
-              <a:rPr lang="en-US" i="1" dirty="0" smtClean="0"/>
-              <a:t> and we could have a really </a:t>
-            </a:r>
-            <a:r>
-              <a:rPr lang="en-US" i="1" dirty="0" smtClean="0">
-                <a:solidFill>
-                  <a:srgbClr val="FF0000"/>
-                </a:solidFill>
-              </a:rPr>
-              <a:t>Groovy</a:t>
-            </a:r>
-            <a:r>
-              <a:rPr lang="en-US" i="1" dirty="0" smtClean="0"/>
-              <a:t> new language for scripting Java objects, writing test cases and who knows, even doing real development in it.”</a:t>
-            </a:r>
-          </a:p>
-          <a:p>
-            <a:pPr algn="r">
-              <a:buNone/>
-            </a:pPr>
-            <a:r>
-              <a:rPr lang="en-US" i="1" dirty="0" smtClean="0"/>
-              <a:t>- James Strachan 2003</a:t>
-            </a:r>
           </a:p>
         </p:txBody>
       </p:sp>
@@ -3212,13 +3132,6 @@
   <p:clrMapOvr>
     <a:masterClrMapping/>
   </p:clrMapOvr>
-  <p:timing>
-    <p:tnLst>
-      <p:par>
-        <p:cTn id="1" dur="indefinite" restart="never" nodeType="tmRoot"/>
-      </p:par>
-    </p:tnLst>
-  </p:timing>
 </p:sld>
 </file>
 
@@ -3256,15 +3169,7 @@
           <a:p>
             <a:r>
               <a:rPr lang="sv-SE" dirty="0" smtClean="0"/>
-              <a:t>GPL(General </a:t>
-            </a:r>
-            <a:r>
-              <a:rPr lang="sv-SE" dirty="0" err="1" smtClean="0"/>
-              <a:t>Purpose</a:t>
-            </a:r>
-            <a:r>
-              <a:rPr lang="sv-SE" dirty="0" smtClean="0"/>
-              <a:t> Languages)</a:t>
+              <a:t>Extern DSL</a:t>
             </a:r>
             <a:endParaRPr lang="sv-SE" dirty="0"/>
           </a:p>
@@ -3287,38 +3192,44 @@
           <a:p>
             <a:r>
               <a:rPr lang="sv-SE" dirty="0" smtClean="0"/>
-              <a:t>Java, C, .NET och liknande språk kallas GPL</a:t>
-            </a:r>
-            <a:r>
-              <a:rPr lang="sv-SE" dirty="0" smtClean="0"/>
-              <a:t>, General </a:t>
-            </a:r>
-            <a:r>
-              <a:rPr lang="sv-SE" dirty="0" err="1" smtClean="0"/>
-              <a:t>Purpose</a:t>
-            </a:r>
-            <a:r>
-              <a:rPr lang="sv-SE" dirty="0" smtClean="0"/>
-              <a:t> </a:t>
-            </a:r>
-            <a:r>
-              <a:rPr lang="sv-SE" dirty="0" smtClean="0"/>
-              <a:t>Languages. </a:t>
+              <a:t>Definierar ett helt nytt språk</a:t>
+            </a:r>
+          </a:p>
+          <a:p>
+            <a:r>
+              <a:rPr lang="sv-SE" dirty="0" smtClean="0"/>
+              <a:t>Exempel:</a:t>
             </a:r>
             <a:endParaRPr lang="sv-SE" dirty="0" smtClean="0"/>
           </a:p>
           <a:p>
-            <a:r>
-              <a:rPr lang="sv-SE" dirty="0" smtClean="0"/>
-              <a:t>Har en generell syntax, oberoende av område.</a:t>
-            </a:r>
-          </a:p>
-          <a:p>
-            <a:r>
-              <a:rPr lang="sv-SE" dirty="0" smtClean="0"/>
-              <a:t>Allt går att göra, men det är sällan det enklaste/snabbaste sättet</a:t>
-            </a:r>
-            <a:endParaRPr lang="sv-SE" dirty="0"/>
+            <a:pPr lvl="1"/>
+            <a:r>
+              <a:rPr lang="sv-SE" dirty="0" smtClean="0"/>
+              <a:t>SQL</a:t>
+            </a:r>
+          </a:p>
+          <a:p>
+            <a:pPr lvl="1"/>
+            <a:r>
+              <a:rPr lang="sv-SE" dirty="0" smtClean="0"/>
+              <a:t>HTML</a:t>
+            </a:r>
+          </a:p>
+          <a:p>
+            <a:pPr lvl="1"/>
+            <a:r>
+              <a:rPr lang="sv-SE" dirty="0" smtClean="0"/>
+              <a:t>ANT</a:t>
+            </a:r>
+          </a:p>
+          <a:p>
+            <a:pPr lvl="1"/>
+            <a:r>
+              <a:rPr lang="sv-SE" dirty="0" smtClean="0"/>
+              <a:t>CSS</a:t>
+            </a:r>
+            <a:endParaRPr lang="sv-SE" dirty="0" smtClean="0"/>
           </a:p>
         </p:txBody>
       </p:sp>
@@ -3327,13 +3238,6 @@
   <p:clrMapOvr>
     <a:masterClrMapping/>
   </p:clrMapOvr>
-  <p:timing>
-    <p:tnLst>
-      <p:par>
-        <p:cTn id="1" dur="indefinite" restart="never" nodeType="tmRoot"/>
-      </p:par>
-    </p:tnLst>
-  </p:timing>
 </p:sld>
 </file>
 
@@ -3371,23 +3275,7 @@
           <a:p>
             <a:r>
               <a:rPr lang="sv-SE" dirty="0" smtClean="0"/>
-              <a:t>DSL (</a:t>
-            </a:r>
-            <a:r>
-              <a:rPr lang="sv-SE" dirty="0" err="1" smtClean="0"/>
-              <a:t>Domain</a:t>
-            </a:r>
-            <a:r>
-              <a:rPr lang="sv-SE" dirty="0" smtClean="0"/>
-              <a:t> </a:t>
-            </a:r>
-            <a:r>
-              <a:rPr lang="sv-SE" dirty="0" err="1" smtClean="0"/>
-              <a:t>Specific</a:t>
-            </a:r>
-            <a:r>
-              <a:rPr lang="sv-SE" dirty="0" smtClean="0"/>
-              <a:t> Languages)</a:t>
+              <a:t>Intern DSL</a:t>
             </a:r>
             <a:endParaRPr lang="sv-SE" dirty="0"/>
           </a:p>
@@ -3410,13 +3298,7 @@
           <a:p>
             <a:r>
               <a:rPr lang="sv-SE" dirty="0" smtClean="0"/>
-              <a:t>Språket är designat utifrån domänen det används i.</a:t>
-            </a:r>
-          </a:p>
-          <a:p>
-            <a:r>
-              <a:rPr lang="sv-SE" dirty="0" smtClean="0"/>
-              <a:t>Exempel på befintliga </a:t>
+              <a:t>Även interna </a:t>
             </a:r>
             <a:r>
               <a:rPr lang="sv-SE" dirty="0" err="1" smtClean="0"/>
@@ -3424,37 +3306,14 @@
             </a:r>
             <a:r>
               <a:rPr lang="sv-SE" dirty="0" smtClean="0"/>
-              <a:t>:</a:t>
-            </a:r>
-          </a:p>
-          <a:p>
-            <a:pPr lvl="1"/>
-            <a:r>
-              <a:rPr lang="sv-SE" dirty="0" smtClean="0"/>
-              <a:t>SQL</a:t>
-            </a:r>
-          </a:p>
-          <a:p>
-            <a:pPr lvl="1"/>
-            <a:r>
-              <a:rPr lang="sv-SE" dirty="0" smtClean="0"/>
-              <a:t>HTML</a:t>
-            </a:r>
-          </a:p>
-          <a:p>
-            <a:pPr lvl="1"/>
-            <a:r>
-              <a:rPr lang="sv-SE" dirty="0" smtClean="0"/>
-              <a:t>ANT</a:t>
-            </a:r>
-          </a:p>
-          <a:p>
-            <a:pPr lvl="1"/>
-            <a:r>
-              <a:rPr lang="sv-SE" dirty="0" smtClean="0"/>
-              <a:t>CSS</a:t>
-            </a:r>
-            <a:endParaRPr lang="sv-SE" dirty="0"/>
+              <a:t> definierar ett nytt språk, men används i befintligt språk.</a:t>
+            </a:r>
+          </a:p>
+          <a:p>
+            <a:r>
+              <a:rPr lang="sv-SE" dirty="0" smtClean="0"/>
+              <a:t>Syntaxen måste följa det underliggande språket</a:t>
+            </a:r>
           </a:p>
         </p:txBody>
       </p:sp>
@@ -3463,13 +3322,6 @@
   <p:clrMapOvr>
     <a:masterClrMapping/>
   </p:clrMapOvr>
-  <p:timing>
-    <p:tnLst>
-      <p:par>
-        <p:cTn id="1" dur="indefinite" restart="never" nodeType="tmRoot"/>
-      </p:par>
-    </p:tnLst>
-  </p:timing>
 </p:sld>
 </file>
 
@@ -3502,57 +3354,226 @@
         </p:nvSpPr>
         <p:spPr/>
         <p:txBody>
+          <a:bodyPr/>
+          <a:lstStyle/>
+          <a:p>
+            <a:r>
+              <a:rPr lang="sv-SE" dirty="0" smtClean="0"/>
+              <a:t>DSL i </a:t>
+            </a:r>
+            <a:r>
+              <a:rPr lang="sv-SE" dirty="0" err="1" smtClean="0"/>
+              <a:t>Groovy</a:t>
+            </a:r>
+            <a:endParaRPr lang="sv-SE" dirty="0"/>
+          </a:p>
+        </p:txBody>
+      </p:sp>
+      <p:sp>
+        <p:nvSpPr>
+          <p:cNvPr id="3" name="Platshållare för innehåll 2"/>
+          <p:cNvSpPr>
+            <a:spLocks noGrp="1"/>
+          </p:cNvSpPr>
+          <p:nvPr>
+            <p:ph idx="1"/>
+          </p:nvPr>
+        </p:nvSpPr>
+        <p:spPr/>
+        <p:txBody>
           <a:bodyPr>
             <a:normAutofit/>
           </a:bodyPr>
           <a:lstStyle/>
           <a:p>
-            <a:r>
-              <a:rPr lang="sv-SE" dirty="0" smtClean="0"/>
-              <a:t>Fördelar med DSL</a:t>
-            </a:r>
-            <a:endParaRPr lang="sv-SE" dirty="0"/>
-          </a:p>
-        </p:txBody>
-      </p:sp>
-      <p:sp>
-        <p:nvSpPr>
-          <p:cNvPr id="3" name="Platshållare för innehåll 2"/>
-          <p:cNvSpPr>
-            <a:spLocks noGrp="1"/>
-          </p:cNvSpPr>
-          <p:nvPr>
-            <p:ph idx="1"/>
-          </p:nvPr>
-        </p:nvSpPr>
-        <p:spPr/>
-        <p:txBody>
-          <a:bodyPr/>
-          <a:lstStyle/>
-          <a:p>
-            <a:r>
-              <a:rPr lang="sv-SE" dirty="0" smtClean="0"/>
-              <a:t>Koden blir lättläst</a:t>
-            </a:r>
-          </a:p>
-          <a:p>
-            <a:r>
-              <a:rPr lang="sv-SE" dirty="0" smtClean="0"/>
-              <a:t>Går snabbare att utveckla i ett språk som ligger nära problemdomänen</a:t>
-            </a:r>
-          </a:p>
-          <a:p>
-            <a:r>
-              <a:rPr lang="sv-SE" dirty="0" smtClean="0"/>
-              <a:t>Lätt att kommunicera med beställare och användare</a:t>
-            </a:r>
-          </a:p>
-          <a:p>
-            <a:r>
-              <a:rPr lang="sv-SE" dirty="0" smtClean="0"/>
-              <a:t>Lätt att skriva enhetstester</a:t>
-            </a:r>
-            <a:endParaRPr lang="sv-SE" dirty="0"/>
+            <a:pPr lvl="1"/>
+            <a:r>
+              <a:rPr lang="sv-SE" dirty="0" smtClean="0">
+                <a:latin typeface="Courier New" pitchFamily="49" charset="0"/>
+                <a:cs typeface="Courier New" pitchFamily="49" charset="0"/>
+              </a:rPr>
+              <a:t>4.days.ago</a:t>
+            </a:r>
+          </a:p>
+          <a:p>
+            <a:pPr lvl="1"/>
+            <a:r>
+              <a:rPr lang="sv-SE" sz="2400" dirty="0" err="1" smtClean="0">
+                <a:latin typeface="Courier New" pitchFamily="49" charset="0"/>
+                <a:cs typeface="Courier New" pitchFamily="49" charset="0"/>
+              </a:rPr>
+              <a:t>Order.pizza</a:t>
+            </a:r>
+            <a:r>
+              <a:rPr lang="sv-SE" sz="2400" dirty="0" smtClean="0">
+                <a:latin typeface="Courier New" pitchFamily="49" charset="0"/>
+                <a:cs typeface="Courier New" pitchFamily="49" charset="0"/>
+              </a:rPr>
+              <a:t>{ </a:t>
+            </a:r>
+            <a:endParaRPr lang="sv-SE" sz="2400" dirty="0" smtClean="0">
+              <a:latin typeface="Courier New" pitchFamily="49" charset="0"/>
+              <a:cs typeface="Courier New" pitchFamily="49" charset="0"/>
+            </a:endParaRPr>
+          </a:p>
+          <a:p>
+            <a:pPr>
+              <a:buNone/>
+            </a:pPr>
+            <a:r>
+              <a:rPr lang="sv-SE" sz="2400" dirty="0" smtClean="0">
+                <a:latin typeface="Courier New" pitchFamily="49" charset="0"/>
+                <a:cs typeface="Courier New" pitchFamily="49" charset="0"/>
+              </a:rPr>
+              <a:t>		</a:t>
+            </a:r>
+            <a:r>
+              <a:rPr lang="sv-SE" sz="2400" dirty="0" err="1" smtClean="0">
+                <a:latin typeface="Courier New" pitchFamily="49" charset="0"/>
+                <a:cs typeface="Courier New" pitchFamily="49" charset="0"/>
+              </a:rPr>
+              <a:t>size</a:t>
+            </a:r>
+            <a:r>
+              <a:rPr lang="sv-SE" sz="2400" dirty="0" smtClean="0">
+                <a:latin typeface="Courier New" pitchFamily="49" charset="0"/>
+                <a:cs typeface="Courier New" pitchFamily="49" charset="0"/>
+              </a:rPr>
+              <a:t> </a:t>
+            </a:r>
+            <a:r>
+              <a:rPr lang="sv-SE" sz="2400" dirty="0" err="1" smtClean="0">
+                <a:latin typeface="Courier New" pitchFamily="49" charset="0"/>
+                <a:cs typeface="Courier New" pitchFamily="49" charset="0"/>
+              </a:rPr>
+              <a:t>large</a:t>
+            </a:r>
+            <a:endParaRPr lang="sv-SE" sz="2400" dirty="0" smtClean="0">
+              <a:latin typeface="Courier New" pitchFamily="49" charset="0"/>
+              <a:cs typeface="Courier New" pitchFamily="49" charset="0"/>
+            </a:endParaRPr>
+          </a:p>
+          <a:p>
+            <a:pPr>
+              <a:buNone/>
+            </a:pPr>
+            <a:r>
+              <a:rPr lang="sv-SE" sz="2400" dirty="0" smtClean="0">
+                <a:latin typeface="Courier New" pitchFamily="49" charset="0"/>
+                <a:cs typeface="Courier New" pitchFamily="49" charset="0"/>
+              </a:rPr>
+              <a:t>		</a:t>
+            </a:r>
+            <a:r>
+              <a:rPr lang="sv-SE" sz="2400" dirty="0" err="1" smtClean="0">
+                <a:latin typeface="Courier New" pitchFamily="49" charset="0"/>
+                <a:cs typeface="Courier New" pitchFamily="49" charset="0"/>
+              </a:rPr>
+              <a:t>topping</a:t>
+            </a:r>
+            <a:r>
+              <a:rPr lang="sv-SE" sz="2400" dirty="0" smtClean="0">
+                <a:latin typeface="Courier New" pitchFamily="49" charset="0"/>
+                <a:cs typeface="Courier New" pitchFamily="49" charset="0"/>
+              </a:rPr>
+              <a:t> </a:t>
+            </a:r>
+            <a:r>
+              <a:rPr lang="sv-SE" sz="2400" dirty="0" err="1" smtClean="0">
+                <a:latin typeface="Courier New" pitchFamily="49" charset="0"/>
+                <a:cs typeface="Courier New" pitchFamily="49" charset="0"/>
+              </a:rPr>
+              <a:t>olives</a:t>
+            </a:r>
+            <a:r>
+              <a:rPr lang="sv-SE" sz="2400" dirty="0" smtClean="0">
+                <a:latin typeface="Courier New" pitchFamily="49" charset="0"/>
+                <a:cs typeface="Courier New" pitchFamily="49" charset="0"/>
+              </a:rPr>
+              <a:t>, </a:t>
+            </a:r>
+            <a:r>
+              <a:rPr lang="sv-SE" sz="2400" dirty="0" err="1" smtClean="0">
+                <a:latin typeface="Courier New" pitchFamily="49" charset="0"/>
+                <a:cs typeface="Courier New" pitchFamily="49" charset="0"/>
+              </a:rPr>
+              <a:t>pepper</a:t>
+            </a:r>
+            <a:r>
+              <a:rPr lang="sv-SE" sz="2400" dirty="0" smtClean="0">
+                <a:latin typeface="Courier New" pitchFamily="49" charset="0"/>
+                <a:cs typeface="Courier New" pitchFamily="49" charset="0"/>
+              </a:rPr>
+              <a:t>, salami</a:t>
+            </a:r>
+          </a:p>
+          <a:p>
+            <a:pPr>
+              <a:buNone/>
+            </a:pPr>
+            <a:r>
+              <a:rPr lang="sv-SE" sz="2400" dirty="0" smtClean="0">
+                <a:latin typeface="Courier New" pitchFamily="49" charset="0"/>
+                <a:cs typeface="Courier New" pitchFamily="49" charset="0"/>
+              </a:rPr>
+              <a:t>		adress </a:t>
+            </a:r>
+            <a:r>
+              <a:rPr lang="sv-SE" sz="2400" dirty="0" smtClean="0">
+                <a:latin typeface="Courier New" pitchFamily="49" charset="0"/>
+                <a:cs typeface="Courier New" pitchFamily="49" charset="0"/>
+              </a:rPr>
+              <a:t>"Gamla brogatan 11"</a:t>
+            </a:r>
+          </a:p>
+          <a:p>
+            <a:pPr>
+              <a:buNone/>
+            </a:pPr>
+            <a:r>
+              <a:rPr lang="sv-SE" sz="2400" dirty="0" smtClean="0">
+                <a:latin typeface="Courier New" pitchFamily="49" charset="0"/>
+                <a:cs typeface="Courier New" pitchFamily="49" charset="0"/>
+              </a:rPr>
+              <a:t>		</a:t>
+            </a:r>
+            <a:r>
+              <a:rPr lang="sv-SE" sz="2400" dirty="0" err="1" smtClean="0">
+                <a:latin typeface="Courier New" pitchFamily="49" charset="0"/>
+                <a:cs typeface="Courier New" pitchFamily="49" charset="0"/>
+              </a:rPr>
+              <a:t>payment</a:t>
+            </a:r>
+            <a:r>
+              <a:rPr lang="sv-SE" sz="2400" dirty="0" smtClean="0">
+                <a:latin typeface="Courier New" pitchFamily="49" charset="0"/>
+                <a:cs typeface="Courier New" pitchFamily="49" charset="0"/>
+              </a:rPr>
+              <a:t> </a:t>
+            </a:r>
+            <a:r>
+              <a:rPr lang="sv-SE" sz="2400" dirty="0" smtClean="0">
+                <a:latin typeface="Courier New" pitchFamily="49" charset="0"/>
+                <a:cs typeface="Courier New" pitchFamily="49" charset="0"/>
+              </a:rPr>
+              <a:t>visa, ’1234-1234-1234-1234</a:t>
+            </a:r>
+          </a:p>
+          <a:p>
+            <a:pPr>
+              <a:buNone/>
+            </a:pPr>
+            <a:r>
+              <a:rPr lang="sv-SE" sz="2400" dirty="0" smtClean="0">
+                <a:latin typeface="Courier New" pitchFamily="49" charset="0"/>
+                <a:cs typeface="Courier New" pitchFamily="49" charset="0"/>
+              </a:rPr>
+              <a:t>	}</a:t>
+            </a:r>
+            <a:endParaRPr lang="sv-SE" sz="2400" dirty="0">
+              <a:latin typeface="Courier New" pitchFamily="49" charset="0"/>
+              <a:cs typeface="Courier New" pitchFamily="49" charset="0"/>
+            </a:endParaRPr>
           </a:p>
         </p:txBody>
       </p:sp>
@@ -3600,251 +3621,91 @@
         </p:nvSpPr>
         <p:spPr/>
         <p:txBody>
-          <a:bodyPr/>
-          <a:lstStyle/>
-          <a:p>
-            <a:r>
-              <a:rPr lang="sv-SE" dirty="0" smtClean="0"/>
-              <a:t>DSL i </a:t>
+          <a:bodyPr>
+            <a:normAutofit fontScale="90000"/>
+          </a:bodyPr>
+          <a:lstStyle/>
+          <a:p>
+            <a:r>
+              <a:rPr lang="sv-SE" dirty="0" smtClean="0"/>
+              <a:t>Det finns ca 150 språk som kan köras på </a:t>
             </a:r>
             <a:r>
               <a:rPr lang="sv-SE" dirty="0" err="1" smtClean="0"/>
-              <a:t>Groovy</a:t>
+              <a:t>java-plattformen</a:t>
+            </a:r>
+            <a:r>
+              <a:rPr lang="sv-SE" dirty="0" smtClean="0"/>
+              <a:t>, till exempel:</a:t>
+            </a:r>
+          </a:p>
+        </p:txBody>
+      </p:sp>
+      <p:sp>
+        <p:nvSpPr>
+          <p:cNvPr id="3" name="Platshållare för innehåll 2"/>
+          <p:cNvSpPr>
+            <a:spLocks noGrp="1"/>
+          </p:cNvSpPr>
+          <p:nvPr>
+            <p:ph idx="1"/>
+          </p:nvPr>
+        </p:nvSpPr>
+        <p:spPr/>
+        <p:txBody>
+          <a:bodyPr/>
+          <a:lstStyle/>
+          <a:p>
+            <a:r>
+              <a:rPr lang="sv-SE" dirty="0" smtClean="0"/>
+              <a:t>Ruby (</a:t>
+            </a:r>
+            <a:r>
+              <a:rPr lang="sv-SE" dirty="0" err="1" smtClean="0"/>
+              <a:t>jRuby</a:t>
+            </a:r>
+            <a:r>
+              <a:rPr lang="sv-SE" dirty="0" smtClean="0"/>
+              <a:t>)</a:t>
+            </a:r>
+          </a:p>
+          <a:p>
+            <a:r>
+              <a:rPr lang="sv-SE" dirty="0" err="1" smtClean="0"/>
+              <a:t>Python</a:t>
+            </a:r>
+            <a:r>
+              <a:rPr lang="sv-SE" dirty="0" smtClean="0"/>
+              <a:t> (</a:t>
+            </a:r>
+            <a:r>
+              <a:rPr lang="sv-SE" dirty="0" err="1" smtClean="0"/>
+              <a:t>Jython</a:t>
+            </a:r>
+            <a:r>
+              <a:rPr lang="sv-SE" dirty="0" smtClean="0"/>
+              <a:t>)</a:t>
+            </a:r>
+          </a:p>
+          <a:p>
+            <a:r>
+              <a:rPr lang="sv-SE" dirty="0" err="1" smtClean="0"/>
+              <a:t>BeanShell</a:t>
+            </a:r>
+            <a:endParaRPr lang="sv-SE" dirty="0" smtClean="0"/>
+          </a:p>
+          <a:p>
+            <a:r>
+              <a:rPr lang="sv-SE" dirty="0" smtClean="0"/>
+              <a:t>JavaScript</a:t>
+            </a:r>
+          </a:p>
+          <a:p>
+            <a:r>
+              <a:rPr lang="sv-SE" dirty="0" smtClean="0"/>
+              <a:t>…</a:t>
             </a:r>
             <a:endParaRPr lang="sv-SE" dirty="0"/>
-          </a:p>
-        </p:txBody>
-      </p:sp>
-      <p:sp>
-        <p:nvSpPr>
-          <p:cNvPr id="3" name="Platshållare för innehåll 2"/>
-          <p:cNvSpPr>
-            <a:spLocks noGrp="1"/>
-          </p:cNvSpPr>
-          <p:nvPr>
-            <p:ph idx="1"/>
-          </p:nvPr>
-        </p:nvSpPr>
-        <p:spPr/>
-        <p:txBody>
-          <a:bodyPr>
-            <a:normAutofit/>
-          </a:bodyPr>
-          <a:lstStyle/>
-          <a:p>
-            <a:r>
-              <a:rPr lang="sv-SE" dirty="0" smtClean="0"/>
-              <a:t>I </a:t>
-            </a:r>
-            <a:r>
-              <a:rPr lang="sv-SE" dirty="0" err="1" smtClean="0"/>
-              <a:t>Groovy</a:t>
-            </a:r>
-            <a:r>
-              <a:rPr lang="sv-SE" dirty="0" smtClean="0"/>
-              <a:t> kan man skapa sina egna </a:t>
-            </a:r>
-            <a:r>
-              <a:rPr lang="sv-SE" dirty="0" err="1" smtClean="0"/>
-              <a:t>DSL:s</a:t>
-            </a:r>
-            <a:endParaRPr lang="sv-SE" dirty="0" smtClean="0"/>
-          </a:p>
-          <a:p>
-            <a:r>
-              <a:rPr lang="sv-SE" dirty="0" smtClean="0"/>
-              <a:t>Exempel:</a:t>
-            </a:r>
-          </a:p>
-          <a:p>
-            <a:pPr lvl="1"/>
-            <a:r>
-              <a:rPr lang="sv-SE" dirty="0" smtClean="0">
-                <a:latin typeface="Courier New" pitchFamily="49" charset="0"/>
-                <a:cs typeface="Courier New" pitchFamily="49" charset="0"/>
-              </a:rPr>
-              <a:t>4.days.ago</a:t>
-            </a:r>
-          </a:p>
-          <a:p>
-            <a:pPr lvl="1"/>
-            <a:r>
-              <a:rPr lang="sv-SE" sz="2400" dirty="0" err="1" smtClean="0">
-                <a:latin typeface="Courier New" pitchFamily="49" charset="0"/>
-                <a:cs typeface="Courier New" pitchFamily="49" charset="0"/>
-              </a:rPr>
-              <a:t>Order.pizza</a:t>
-            </a:r>
-            <a:r>
-              <a:rPr lang="sv-SE" sz="2400" dirty="0" smtClean="0">
-                <a:latin typeface="Courier New" pitchFamily="49" charset="0"/>
-                <a:cs typeface="Courier New" pitchFamily="49" charset="0"/>
-              </a:rPr>
-              <a:t>{ </a:t>
-            </a:r>
-            <a:endParaRPr lang="sv-SE" sz="2400" dirty="0" smtClean="0">
-              <a:latin typeface="Courier New" pitchFamily="49" charset="0"/>
-              <a:cs typeface="Courier New" pitchFamily="49" charset="0"/>
-            </a:endParaRPr>
-          </a:p>
-          <a:p>
-            <a:pPr>
-              <a:buNone/>
-            </a:pPr>
-            <a:r>
-              <a:rPr lang="sv-SE" sz="2400" dirty="0" smtClean="0">
-                <a:latin typeface="Courier New" pitchFamily="49" charset="0"/>
-                <a:cs typeface="Courier New" pitchFamily="49" charset="0"/>
-              </a:rPr>
-              <a:t>		</a:t>
-            </a:r>
-            <a:r>
-              <a:rPr lang="sv-SE" sz="2400" dirty="0" err="1" smtClean="0">
-                <a:latin typeface="Courier New" pitchFamily="49" charset="0"/>
-                <a:cs typeface="Courier New" pitchFamily="49" charset="0"/>
-              </a:rPr>
-              <a:t>size</a:t>
-            </a:r>
-            <a:r>
-              <a:rPr lang="sv-SE" sz="2400" dirty="0" smtClean="0">
-                <a:latin typeface="Courier New" pitchFamily="49" charset="0"/>
-                <a:cs typeface="Courier New" pitchFamily="49" charset="0"/>
-              </a:rPr>
-              <a:t> </a:t>
-            </a:r>
-            <a:r>
-              <a:rPr lang="sv-SE" sz="2400" dirty="0" err="1" smtClean="0">
-                <a:latin typeface="Courier New" pitchFamily="49" charset="0"/>
-                <a:cs typeface="Courier New" pitchFamily="49" charset="0"/>
-              </a:rPr>
-              <a:t>large</a:t>
-            </a:r>
-            <a:endParaRPr lang="sv-SE" sz="2400" dirty="0" smtClean="0">
-              <a:latin typeface="Courier New" pitchFamily="49" charset="0"/>
-              <a:cs typeface="Courier New" pitchFamily="49" charset="0"/>
-            </a:endParaRPr>
-          </a:p>
-          <a:p>
-            <a:pPr>
-              <a:buNone/>
-            </a:pPr>
-            <a:r>
-              <a:rPr lang="sv-SE" sz="2400" dirty="0" smtClean="0">
-                <a:latin typeface="Courier New" pitchFamily="49" charset="0"/>
-                <a:cs typeface="Courier New" pitchFamily="49" charset="0"/>
-              </a:rPr>
-              <a:t>		</a:t>
-            </a:r>
-            <a:r>
-              <a:rPr lang="sv-SE" sz="2400" dirty="0" err="1" smtClean="0">
-                <a:latin typeface="Courier New" pitchFamily="49" charset="0"/>
-                <a:cs typeface="Courier New" pitchFamily="49" charset="0"/>
-              </a:rPr>
-              <a:t>topping</a:t>
-            </a:r>
-            <a:r>
-              <a:rPr lang="sv-SE" sz="2400" dirty="0" smtClean="0">
-                <a:latin typeface="Courier New" pitchFamily="49" charset="0"/>
-                <a:cs typeface="Courier New" pitchFamily="49" charset="0"/>
-              </a:rPr>
-              <a:t> </a:t>
-            </a:r>
-            <a:r>
-              <a:rPr lang="sv-SE" sz="2400" dirty="0" err="1" smtClean="0">
-                <a:latin typeface="Courier New" pitchFamily="49" charset="0"/>
-                <a:cs typeface="Courier New" pitchFamily="49" charset="0"/>
-              </a:rPr>
-              <a:t>olives</a:t>
-            </a:r>
-            <a:r>
-              <a:rPr lang="sv-SE" sz="2400" dirty="0" smtClean="0">
-                <a:latin typeface="Courier New" pitchFamily="49" charset="0"/>
-                <a:cs typeface="Courier New" pitchFamily="49" charset="0"/>
-              </a:rPr>
-              <a:t>, </a:t>
-            </a:r>
-            <a:r>
-              <a:rPr lang="sv-SE" sz="2400" dirty="0" err="1" smtClean="0">
-                <a:latin typeface="Courier New" pitchFamily="49" charset="0"/>
-                <a:cs typeface="Courier New" pitchFamily="49" charset="0"/>
-              </a:rPr>
-              <a:t>pepper</a:t>
-            </a:r>
-            <a:r>
-              <a:rPr lang="sv-SE" sz="2400" dirty="0" smtClean="0">
-                <a:latin typeface="Courier New" pitchFamily="49" charset="0"/>
-                <a:cs typeface="Courier New" pitchFamily="49" charset="0"/>
-              </a:rPr>
-              <a:t>, salami</a:t>
-            </a:r>
-          </a:p>
-          <a:p>
-            <a:pPr>
-              <a:buNone/>
-            </a:pPr>
-            <a:r>
-              <a:rPr lang="sv-SE" sz="2400" dirty="0" smtClean="0">
-                <a:latin typeface="Courier New" pitchFamily="49" charset="0"/>
-                <a:cs typeface="Courier New" pitchFamily="49" charset="0"/>
-              </a:rPr>
-              <a:t>		adress </a:t>
-            </a:r>
-            <a:r>
-              <a:rPr lang="sv-SE" sz="2400" dirty="0" smtClean="0">
-                <a:latin typeface="Courier New" pitchFamily="49" charset="0"/>
-                <a:cs typeface="Courier New" pitchFamily="49" charset="0"/>
-              </a:rPr>
-              <a:t>"Gamla brogatan 11"</a:t>
-            </a:r>
-          </a:p>
-          <a:p>
-            <a:pPr>
-              <a:buNone/>
-            </a:pPr>
-            <a:r>
-              <a:rPr lang="sv-SE" sz="2400" dirty="0" smtClean="0">
-                <a:latin typeface="Courier New" pitchFamily="49" charset="0"/>
-                <a:cs typeface="Courier New" pitchFamily="49" charset="0"/>
-              </a:rPr>
-              <a:t>		</a:t>
-            </a:r>
-            <a:r>
-              <a:rPr lang="sv-SE" sz="2400" dirty="0" err="1" smtClean="0">
-                <a:latin typeface="Courier New" pitchFamily="49" charset="0"/>
-                <a:cs typeface="Courier New" pitchFamily="49" charset="0"/>
-              </a:rPr>
-              <a:t>payment</a:t>
-            </a:r>
-            <a:r>
-              <a:rPr lang="sv-SE" sz="2400" dirty="0" smtClean="0">
-                <a:latin typeface="Courier New" pitchFamily="49" charset="0"/>
-                <a:cs typeface="Courier New" pitchFamily="49" charset="0"/>
-              </a:rPr>
-              <a:t> </a:t>
-            </a:r>
-            <a:r>
-              <a:rPr lang="sv-SE" sz="2400" dirty="0" smtClean="0">
-                <a:latin typeface="Courier New" pitchFamily="49" charset="0"/>
-                <a:cs typeface="Courier New" pitchFamily="49" charset="0"/>
-              </a:rPr>
-              <a:t>visa, ’1234-1234-1234-1234</a:t>
-            </a:r>
-          </a:p>
-          <a:p>
-            <a:pPr>
-              <a:buNone/>
-            </a:pPr>
-            <a:r>
-              <a:rPr lang="sv-SE" sz="2400" dirty="0" smtClean="0">
-                <a:latin typeface="Courier New" pitchFamily="49" charset="0"/>
-                <a:cs typeface="Courier New" pitchFamily="49" charset="0"/>
-              </a:rPr>
-              <a:t>	}</a:t>
-            </a:r>
-            <a:endParaRPr lang="sv-SE" sz="2400" dirty="0">
-              <a:latin typeface="Courier New" pitchFamily="49" charset="0"/>
-              <a:cs typeface="Courier New" pitchFamily="49" charset="0"/>
-            </a:endParaRPr>
           </a:p>
         </p:txBody>
       </p:sp>
@@ -3897,6 +3758,195 @@
           <a:p>
             <a:r>
               <a:rPr lang="sv-SE" dirty="0" smtClean="0"/>
+              <a:t>Fördelar med </a:t>
+            </a:r>
+            <a:r>
+              <a:rPr lang="sv-SE" dirty="0" err="1" smtClean="0"/>
+              <a:t>Groovy</a:t>
+            </a:r>
+            <a:endParaRPr lang="sv-SE" dirty="0"/>
+          </a:p>
+        </p:txBody>
+      </p:sp>
+      <p:sp>
+        <p:nvSpPr>
+          <p:cNvPr id="3" name="Platshållare för innehåll 2"/>
+          <p:cNvSpPr>
+            <a:spLocks noGrp="1"/>
+          </p:cNvSpPr>
+          <p:nvPr>
+            <p:ph idx="1"/>
+          </p:nvPr>
+        </p:nvSpPr>
+        <p:spPr/>
+        <p:txBody>
+          <a:bodyPr/>
+          <a:lstStyle/>
+          <a:p>
+            <a:r>
+              <a:rPr lang="sv-SE" dirty="0" smtClean="0"/>
+              <a:t>Enkelt att lära för en Javaprogrammerare</a:t>
+            </a:r>
+          </a:p>
+          <a:p>
+            <a:r>
+              <a:rPr lang="sv-SE" dirty="0" smtClean="0"/>
+              <a:t>Helt kompatibelt med existerande Javaprojekt</a:t>
+            </a:r>
+          </a:p>
+          <a:p>
+            <a:r>
+              <a:rPr lang="sv-SE" dirty="0" err="1" smtClean="0"/>
+              <a:t>Groovy</a:t>
+            </a:r>
+            <a:r>
+              <a:rPr lang="sv-SE" dirty="0" smtClean="0"/>
+              <a:t> ÄR Java – kompileras till .</a:t>
+            </a:r>
+            <a:r>
+              <a:rPr lang="sv-SE" dirty="0" err="1" smtClean="0"/>
+              <a:t>class-filer</a:t>
+            </a:r>
+            <a:endParaRPr lang="sv-SE" dirty="0" smtClean="0"/>
+          </a:p>
+          <a:p>
+            <a:r>
+              <a:rPr lang="sv-SE" dirty="0" smtClean="0"/>
+              <a:t>Lätt att börja med, man kan skriva Java istället om man är osäker på </a:t>
+            </a:r>
+            <a:r>
+              <a:rPr lang="sv-SE" dirty="0" err="1" smtClean="0"/>
+              <a:t>Groovy-syntax</a:t>
+            </a:r>
+            <a:endParaRPr lang="sv-SE" dirty="0" smtClean="0"/>
+          </a:p>
+          <a:p>
+            <a:r>
+              <a:rPr lang="sv-SE" dirty="0" smtClean="0"/>
+              <a:t>Dynamiskt</a:t>
+            </a:r>
+          </a:p>
+          <a:p>
+            <a:r>
+              <a:rPr lang="sv-SE" dirty="0" smtClean="0"/>
+              <a:t>Utökar JDK för att förenkla utveckling</a:t>
+            </a:r>
+            <a:endParaRPr lang="sv-SE" dirty="0"/>
+          </a:p>
+        </p:txBody>
+      </p:sp>
+    </p:spTree>
+  </p:cSld>
+  <p:clrMapOvr>
+    <a:masterClrMapping/>
+  </p:clrMapOvr>
+  <p:timing>
+    <p:tnLst>
+      <p:par>
+        <p:cTn id="1" dur="indefinite" restart="never" nodeType="tmRoot"/>
+      </p:par>
+    </p:tnLst>
+  </p:timing>
+</p:sld>
+</file>
+
+<file path=ppt/slides/slide15.xml><?xml version="1.0" encoding="utf-8"?>
+<p:sld xmlns:a="http://schemas.openxmlformats.org/drawingml/2006/main" xmlns:r="http://schemas.openxmlformats.org/officeDocument/2006/relationships" xmlns:p="http://schemas.openxmlformats.org/presentationml/2006/main">
+  <p:cSld>
+    <p:spTree>
+      <p:nvGrpSpPr>
+        <p:cNvPr id="1" name=""/>
+        <p:cNvGrpSpPr/>
+        <p:nvPr/>
+      </p:nvGrpSpPr>
+      <p:grpSpPr>
+        <a:xfrm>
+          <a:off x="0" y="0"/>
+          <a:ext cx="0" cy="0"/>
+          <a:chOff x="0" y="0"/>
+          <a:chExt cx="0" cy="0"/>
+        </a:xfrm>
+      </p:grpSpPr>
+      <p:sp>
+        <p:nvSpPr>
+          <p:cNvPr id="2" name="Rubrik 1"/>
+          <p:cNvSpPr>
+            <a:spLocks noGrp="1"/>
+          </p:cNvSpPr>
+          <p:nvPr>
+            <p:ph type="ctrTitle"/>
+          </p:nvPr>
+        </p:nvSpPr>
+        <p:spPr/>
+        <p:txBody>
+          <a:bodyPr/>
+          <a:lstStyle/>
+          <a:p>
+            <a:r>
+              <a:rPr lang="sv-SE" dirty="0" smtClean="0"/>
+              <a:t>[</a:t>
+            </a:r>
+            <a:r>
+              <a:rPr lang="sv-SE" dirty="0" err="1" smtClean="0"/>
+              <a:t>helloWorld.groovy</a:t>
+            </a:r>
+            <a:r>
+              <a:rPr lang="sv-SE" dirty="0" smtClean="0"/>
+              <a:t>]</a:t>
+            </a:r>
+            <a:endParaRPr lang="sv-SE" dirty="0"/>
+          </a:p>
+        </p:txBody>
+      </p:sp>
+    </p:spTree>
+  </p:cSld>
+  <p:clrMapOvr>
+    <a:masterClrMapping/>
+  </p:clrMapOvr>
+  <p:timing>
+    <p:tnLst>
+      <p:par>
+        <p:cTn id="1" dur="indefinite" restart="never" nodeType="tmRoot"/>
+      </p:par>
+    </p:tnLst>
+  </p:timing>
+</p:sld>
+</file>
+
+<file path=ppt/slides/slide16.xml><?xml version="1.0" encoding="utf-8"?>
+<p:sld xmlns:a="http://schemas.openxmlformats.org/drawingml/2006/main" xmlns:r="http://schemas.openxmlformats.org/officeDocument/2006/relationships" xmlns:p="http://schemas.openxmlformats.org/presentationml/2006/main">
+  <p:cSld>
+    <p:spTree>
+      <p:nvGrpSpPr>
+        <p:cNvPr id="1" name=""/>
+        <p:cNvGrpSpPr/>
+        <p:nvPr/>
+      </p:nvGrpSpPr>
+      <p:grpSpPr>
+        <a:xfrm>
+          <a:off x="0" y="0"/>
+          <a:ext cx="0" cy="0"/>
+          <a:chOff x="0" y="0"/>
+          <a:chExt cx="0" cy="0"/>
+        </a:xfrm>
+      </p:grpSpPr>
+      <p:sp>
+        <p:nvSpPr>
+          <p:cNvPr id="2" name="Rubrik 1"/>
+          <p:cNvSpPr>
+            <a:spLocks noGrp="1"/>
+          </p:cNvSpPr>
+          <p:nvPr>
+            <p:ph type="title"/>
+          </p:nvPr>
+        </p:nvSpPr>
+        <p:spPr/>
+        <p:txBody>
+          <a:bodyPr/>
+          <a:lstStyle/>
+          <a:p>
+            <a:r>
+              <a:rPr lang="sv-SE" dirty="0" smtClean="0"/>
               <a:t>En rubrik som inte ska bytas, sida 2</a:t>
             </a:r>
             <a:endParaRPr lang="sv-SE" dirty="0"/>
@@ -3981,61 +4031,121 @@
           <a:lstStyle/>
           <a:p>
             <a:r>
-              <a:rPr lang="sv-SE" dirty="0" smtClean="0"/>
-              <a:t>Historik</a:t>
-            </a:r>
-            <a:endParaRPr lang="sv-SE" dirty="0"/>
-          </a:p>
-        </p:txBody>
-      </p:sp>
-      <p:sp>
-        <p:nvSpPr>
-          <p:cNvPr id="3" name="Platshållare för innehåll 2"/>
-          <p:cNvSpPr>
-            <a:spLocks noGrp="1"/>
-          </p:cNvSpPr>
-          <p:nvPr>
-            <p:ph idx="1"/>
-          </p:nvPr>
-        </p:nvSpPr>
-        <p:spPr/>
-        <p:txBody>
-          <a:bodyPr/>
-          <a:lstStyle/>
-          <a:p>
-            <a:endParaRPr lang="sv-SE" dirty="0" smtClean="0"/>
-          </a:p>
-          <a:p>
-            <a:r>
-              <a:rPr lang="sv-SE" dirty="0" smtClean="0"/>
-              <a:t>Startades under 2003</a:t>
-            </a:r>
-          </a:p>
-          <a:p>
-            <a:r>
-              <a:rPr lang="sv-SE" dirty="0" smtClean="0"/>
-              <a:t>Lades </a:t>
-            </a:r>
-            <a:r>
-              <a:rPr lang="sv-SE" dirty="0" smtClean="0"/>
-              <a:t>på is 2004</a:t>
-            </a:r>
-            <a:endParaRPr lang="sv-SE" dirty="0" smtClean="0"/>
-          </a:p>
-          <a:p>
-            <a:r>
-              <a:rPr lang="sv-SE" dirty="0" smtClean="0"/>
-              <a:t>Ny grupp utvecklare tog över strax efter</a:t>
-            </a:r>
-          </a:p>
-          <a:p>
-            <a:r>
               <a:rPr lang="sv-SE" dirty="0" err="1" smtClean="0"/>
               <a:t>Groovy</a:t>
             </a:r>
-            <a:r>
-              <a:rPr lang="sv-SE" dirty="0" smtClean="0"/>
-              <a:t> version 1.0 släpptes 2:a Januari 2007</a:t>
+            <a:endParaRPr lang="sv-SE" dirty="0"/>
+          </a:p>
+        </p:txBody>
+      </p:sp>
+      <p:sp>
+        <p:nvSpPr>
+          <p:cNvPr id="3" name="Platshållare för innehåll 2"/>
+          <p:cNvSpPr>
+            <a:spLocks noGrp="1"/>
+          </p:cNvSpPr>
+          <p:nvPr>
+            <p:ph idx="1"/>
+          </p:nvPr>
+        </p:nvSpPr>
+        <p:spPr/>
+        <p:txBody>
+          <a:bodyPr>
+            <a:normAutofit fontScale="85000" lnSpcReduction="10000"/>
+          </a:bodyPr>
+          <a:lstStyle/>
+          <a:p>
+            <a:pPr>
+              <a:buNone/>
+            </a:pPr>
+            <a:r>
+              <a:rPr lang="en-US" i="1" dirty="0" smtClean="0"/>
+              <a:t>“…So I've been musing a little while if its time the Java platform had its own </a:t>
+            </a:r>
+            <a:r>
+              <a:rPr lang="en-US" i="1" dirty="0" smtClean="0">
+                <a:solidFill>
+                  <a:srgbClr val="FF0000"/>
+                </a:solidFill>
+              </a:rPr>
+              <a:t>dynamic language</a:t>
+            </a:r>
+            <a:r>
+              <a:rPr lang="en-US" i="1" dirty="0" smtClean="0"/>
+              <a:t> designed from the ground up to </a:t>
+            </a:r>
+            <a:r>
+              <a:rPr lang="en-US" i="1" dirty="0" smtClean="0">
+                <a:solidFill>
+                  <a:srgbClr val="FF0000"/>
+                </a:solidFill>
+              </a:rPr>
+              <a:t>work real nice with existing [Java] code</a:t>
+            </a:r>
+            <a:r>
+              <a:rPr lang="en-US" i="1" dirty="0" smtClean="0"/>
+              <a:t>; creating/extending objects normal Java can use and vice versa. </a:t>
+            </a:r>
+            <a:r>
+              <a:rPr lang="en-US" i="1" dirty="0" smtClean="0">
+                <a:solidFill>
+                  <a:srgbClr val="FF0000"/>
+                </a:solidFill>
+              </a:rPr>
+              <a:t>Python/</a:t>
+            </a:r>
+            <a:r>
+              <a:rPr lang="en-US" i="1" dirty="0" err="1" smtClean="0">
+                <a:solidFill>
+                  <a:srgbClr val="FF0000"/>
+                </a:solidFill>
+              </a:rPr>
+              <a:t>Jython's</a:t>
+            </a:r>
+            <a:r>
+              <a:rPr lang="en-US" i="1" dirty="0" smtClean="0">
+                <a:solidFill>
+                  <a:srgbClr val="FF0000"/>
+                </a:solidFill>
+              </a:rPr>
+              <a:t> a pretty good base - add the nice stuff from Ruby</a:t>
+            </a:r>
+            <a:r>
+              <a:rPr lang="en-US" i="1" dirty="0" smtClean="0"/>
+              <a:t> and maybe sprinkle on some </a:t>
+            </a:r>
+            <a:r>
+              <a:rPr lang="en-US" i="1" dirty="0" smtClean="0">
+                <a:solidFill>
+                  <a:srgbClr val="FF0000"/>
+                </a:solidFill>
+              </a:rPr>
+              <a:t>AOP features</a:t>
+            </a:r>
+            <a:r>
+              <a:rPr lang="en-US" i="1" dirty="0" smtClean="0"/>
+              <a:t> and we could have a really </a:t>
+            </a:r>
+            <a:r>
+              <a:rPr lang="en-US" i="1" dirty="0" smtClean="0">
+                <a:solidFill>
+                  <a:srgbClr val="FF0000"/>
+                </a:solidFill>
+              </a:rPr>
+              <a:t>Groovy</a:t>
+            </a:r>
+            <a:r>
+              <a:rPr lang="en-US" i="1" dirty="0" smtClean="0"/>
+              <a:t> new language for scripting Java objects, writing test cases and who knows, even doing real development in it.”</a:t>
+            </a:r>
+          </a:p>
+          <a:p>
+            <a:pPr algn="r">
+              <a:buNone/>
+            </a:pPr>
+            <a:r>
+              <a:rPr lang="en-US" i="1" dirty="0" smtClean="0"/>
+              <a:t>- James Strachan 2003</a:t>
             </a:r>
           </a:p>
         </p:txBody>
@@ -4089,7 +4199,7 @@
           <a:p>
             <a:r>
               <a:rPr lang="sv-SE" dirty="0" smtClean="0"/>
-              <a:t>Dynamiska språk</a:t>
+              <a:t>Historik</a:t>
             </a:r>
             <a:endParaRPr lang="sv-SE" dirty="0"/>
           </a:p>
@@ -4110,41 +4220,55 @@
           <a:bodyPr/>
           <a:lstStyle/>
           <a:p>
-            <a:r>
-              <a:rPr lang="en-US" dirty="0" smtClean="0"/>
-              <a:t>Dynamic programming language is a term used broadly in computer science to describe a class of high level programming languages that execute at runtime many common behaviors that other languages might perform during </a:t>
-            </a:r>
-            <a:r>
-              <a:rPr lang="en-US" dirty="0" smtClean="0"/>
-              <a:t>compilation</a:t>
-            </a:r>
-            <a:r>
-              <a:rPr lang="sv-SE" dirty="0" smtClean="0"/>
-              <a:t>, </a:t>
-            </a:r>
+            <a:endParaRPr lang="sv-SE" dirty="0" smtClean="0"/>
+          </a:p>
+          <a:p>
+            <a:r>
+              <a:rPr lang="sv-SE" dirty="0" smtClean="0"/>
+              <a:t>Startades under 2003</a:t>
+            </a:r>
+          </a:p>
+          <a:p>
+            <a:r>
+              <a:rPr lang="sv-SE" dirty="0" smtClean="0"/>
+              <a:t>Lades </a:t>
+            </a:r>
+            <a:r>
+              <a:rPr lang="sv-SE" dirty="0" smtClean="0"/>
+              <a:t>på is 2004</a:t>
+            </a:r>
+            <a:endParaRPr lang="sv-SE" dirty="0" smtClean="0"/>
+          </a:p>
+          <a:p>
+            <a:r>
+              <a:rPr lang="sv-SE" dirty="0" smtClean="0"/>
+              <a:t>Ny grupp utvecklare tog över strax efter</a:t>
+            </a:r>
+          </a:p>
+          <a:p>
             <a:r>
               <a:rPr lang="sv-SE" dirty="0" err="1" smtClean="0"/>
-              <a:t>if</a:t>
-            </a:r>
-            <a:r>
-              <a:rPr lang="sv-SE" dirty="0" smtClean="0"/>
-              <a:t> at </a:t>
-            </a:r>
-            <a:r>
-              <a:rPr lang="sv-SE" dirty="0" smtClean="0"/>
-              <a:t>all.</a:t>
-            </a:r>
-          </a:p>
-          <a:p>
-            <a:r>
-              <a:rPr lang="sv-SE" dirty="0" smtClean="0"/>
-              <a:t>Många, men inte alla, dynamiska språk har </a:t>
-            </a:r>
-            <a:r>
-              <a:rPr lang="sv-SE" smtClean="0"/>
-              <a:t>dynamisk typning</a:t>
-            </a:r>
-            <a:endParaRPr lang="sv-SE" dirty="0"/>
+              <a:t>Groovy</a:t>
+            </a:r>
+            <a:r>
+              <a:rPr lang="sv-SE" dirty="0" smtClean="0"/>
+              <a:t> version 1.0 släpptes 2:a Januari </a:t>
+            </a:r>
+            <a:r>
+              <a:rPr lang="sv-SE" dirty="0" smtClean="0"/>
+              <a:t>2007</a:t>
+            </a:r>
+          </a:p>
+          <a:p>
+            <a:r>
+              <a:rPr lang="sv-SE" dirty="0" err="1" smtClean="0"/>
+              <a:t>JavaOne</a:t>
+            </a:r>
+            <a:r>
+              <a:rPr lang="sv-SE" dirty="0" smtClean="0"/>
+              <a:t> 2008</a:t>
+            </a:r>
+            <a:endParaRPr lang="sv-SE" dirty="0" smtClean="0"/>
           </a:p>
         </p:txBody>
       </p:sp>
@@ -4153,6 +4277,13 @@
   <p:clrMapOvr>
     <a:masterClrMapping/>
   </p:clrMapOvr>
+  <p:timing>
+    <p:tnLst>
+      <p:par>
+        <p:cTn id="1" dur="indefinite" restart="never" nodeType="tmRoot"/>
+      </p:par>
+    </p:tnLst>
+  </p:timing>
 </p:sld>
 </file>
 
@@ -4190,7 +4321,7 @@
           <a:p>
             <a:r>
               <a:rPr lang="sv-SE" dirty="0" smtClean="0"/>
-              <a:t>Fördelar med dynamiska språk</a:t>
+              <a:t>Dynamiska språk</a:t>
             </a:r>
             <a:endParaRPr lang="sv-SE" dirty="0"/>
           </a:p>
@@ -4212,64 +4343,35 @@
           <a:lstStyle/>
           <a:p>
             <a:r>
-              <a:rPr lang="sv-SE" dirty="0" smtClean="0"/>
-              <a:t>Istället för att generera kod kan man skapa den när programmet körs</a:t>
-            </a:r>
-          </a:p>
-          <a:p>
-            <a:r>
-              <a:rPr lang="sv-SE" dirty="0" smtClean="0"/>
-              <a:t>Koden blir lättare att ändra</a:t>
-            </a:r>
-          </a:p>
-          <a:p>
-            <a:r>
-              <a:rPr lang="sv-SE" dirty="0" smtClean="0"/>
-              <a:t>Möjlighet att ändra hur språket </a:t>
-            </a:r>
-            <a:r>
-              <a:rPr lang="sv-SE" dirty="0" smtClean="0"/>
-              <a:t>fungerar</a:t>
-            </a:r>
-          </a:p>
-          <a:p>
-            <a:pPr lvl="1"/>
-            <a:r>
-              <a:rPr lang="sv-SE" dirty="0" smtClean="0"/>
-              <a:t>Lägg till metoder i vilka klasser vi vill, även om vi saknar källkod</a:t>
-            </a:r>
-          </a:p>
-          <a:p>
-            <a:pPr lvl="1"/>
-            <a:r>
-              <a:rPr lang="sv-SE" dirty="0" smtClean="0"/>
-              <a:t>Skapa DSL (</a:t>
+              <a:rPr lang="en-US" dirty="0" smtClean="0"/>
+              <a:t>Dynamic programming language is a term used broadly in computer science to describe a class of high level programming languages that execute at runtime many common behaviors that other languages might perform during </a:t>
+            </a:r>
+            <a:r>
+              <a:rPr lang="en-US" dirty="0" smtClean="0"/>
+              <a:t>compilation</a:t>
+            </a:r>
+            <a:r>
+              <a:rPr lang="sv-SE" dirty="0" smtClean="0"/>
+              <a:t>, </a:t>
             </a:r>
             <a:r>
               <a:rPr lang="sv-SE" dirty="0" err="1" smtClean="0"/>
-              <a:t>Domain</a:t>
-            </a:r>
-            <a:r>
-              <a:rPr lang="sv-SE" dirty="0" smtClean="0"/>
-              <a:t> </a:t>
-            </a:r>
-            <a:r>
-              <a:rPr lang="sv-SE" dirty="0" err="1" smtClean="0"/>
-              <a:t>Specific</a:t>
-            </a:r>
-            <a:r>
-              <a:rPr lang="sv-SE" dirty="0" smtClean="0"/>
-              <a:t> Language)</a:t>
-            </a:r>
-          </a:p>
-          <a:p>
-            <a:pPr lvl="1"/>
-            <a:endParaRPr lang="sv-SE" dirty="0" smtClean="0"/>
-          </a:p>
-          <a:p>
-            <a:pPr>
-              <a:buNone/>
-            </a:pPr>
+              <a:t>if</a:t>
+            </a:r>
+            <a:r>
+              <a:rPr lang="sv-SE" dirty="0" smtClean="0"/>
+              <a:t> at </a:t>
+            </a:r>
+            <a:r>
+              <a:rPr lang="sv-SE" dirty="0" smtClean="0"/>
+              <a:t>all.</a:t>
+            </a:r>
+          </a:p>
+          <a:p>
+            <a:r>
+              <a:rPr lang="sv-SE" dirty="0" smtClean="0"/>
+              <a:t>Många, men inte alla, dynamiska språk har dynamisk typning</a:t>
+            </a:r>
             <a:endParaRPr lang="sv-SE" dirty="0"/>
           </a:p>
         </p:txBody>
@@ -4279,13 +4381,6 @@
   <p:clrMapOvr>
     <a:masterClrMapping/>
   </p:clrMapOvr>
-  <p:timing>
-    <p:tnLst>
-      <p:par>
-        <p:cTn id="1" dur="indefinite" restart="never" nodeType="tmRoot"/>
-      </p:par>
-    </p:tnLst>
-  </p:timing>
 </p:sld>
 </file>
 
@@ -4323,7 +4418,7 @@
           <a:p>
             <a:r>
               <a:rPr lang="sv-SE" dirty="0" smtClean="0"/>
-              <a:t>Nackdelar med dynamiska språk</a:t>
+              <a:t>Fördelar med dynamiska språk</a:t>
             </a:r>
             <a:endParaRPr lang="sv-SE" dirty="0"/>
           </a:p>
@@ -4346,14 +4441,44 @@
           <a:p>
             <a:r>
               <a:rPr lang="sv-SE" dirty="0" smtClean="0"/>
-              <a:t>Kräver testning</a:t>
-            </a:r>
-          </a:p>
-          <a:p>
-            <a:r>
-              <a:rPr lang="sv-SE" dirty="0" smtClean="0"/>
-              <a:t>Risk att någon skriver ”oläslig” kod</a:t>
-            </a:r>
+              <a:t>Istället för att generera kod kan man skapa den när programmet körs</a:t>
+            </a:r>
+          </a:p>
+          <a:p>
+            <a:r>
+              <a:rPr lang="sv-SE" dirty="0" smtClean="0"/>
+              <a:t>Koden blir lättare att ändra</a:t>
+            </a:r>
+          </a:p>
+          <a:p>
+            <a:r>
+              <a:rPr lang="sv-SE" dirty="0" smtClean="0"/>
+              <a:t>Möjlighet att ändra hur språket </a:t>
+            </a:r>
+            <a:r>
+              <a:rPr lang="sv-SE" dirty="0" smtClean="0"/>
+              <a:t>fungerar</a:t>
+            </a:r>
+          </a:p>
+          <a:p>
+            <a:r>
+              <a:rPr lang="sv-SE" dirty="0" smtClean="0"/>
+              <a:t>Metaprogrammering</a:t>
+            </a:r>
+            <a:endParaRPr lang="sv-SE" dirty="0" smtClean="0"/>
+          </a:p>
+          <a:p>
+            <a:pPr lvl="1"/>
+            <a:endParaRPr lang="sv-SE" dirty="0" smtClean="0"/>
+          </a:p>
+          <a:p>
+            <a:pPr lvl="1"/>
+            <a:endParaRPr lang="sv-SE" dirty="0" smtClean="0"/>
+          </a:p>
+          <a:p>
+            <a:pPr>
+              <a:buNone/>
+            </a:pPr>
             <a:endParaRPr lang="sv-SE" dirty="0"/>
           </a:p>
         </p:txBody>
@@ -4402,89 +4527,99 @@
         </p:nvSpPr>
         <p:spPr/>
         <p:txBody>
-          <a:bodyPr>
-            <a:normAutofit fontScale="90000"/>
-          </a:bodyPr>
-          <a:lstStyle/>
-          <a:p>
-            <a:r>
-              <a:rPr lang="sv-SE" dirty="0" smtClean="0"/>
-              <a:t>Det finns ca 150 språk som kan köras på </a:t>
+          <a:bodyPr/>
+          <a:lstStyle/>
+          <a:p>
+            <a:r>
+              <a:rPr lang="sv-SE" dirty="0" smtClean="0"/>
+              <a:t>Metaprogrammering</a:t>
+            </a:r>
+            <a:endParaRPr lang="sv-SE" dirty="0"/>
+          </a:p>
+        </p:txBody>
+      </p:sp>
+      <p:sp>
+        <p:nvSpPr>
+          <p:cNvPr id="3" name="Platshållare för innehåll 2"/>
+          <p:cNvSpPr>
+            <a:spLocks noGrp="1"/>
+          </p:cNvSpPr>
+          <p:nvPr>
+            <p:ph idx="1"/>
+          </p:nvPr>
+        </p:nvSpPr>
+        <p:spPr/>
+        <p:txBody>
+          <a:bodyPr/>
+          <a:lstStyle/>
+          <a:p>
+            <a:r>
+              <a:rPr lang="sv-SE" dirty="0" smtClean="0"/>
+              <a:t>Program som ändrar program, inklusive sig själv</a:t>
+            </a:r>
+          </a:p>
+          <a:p>
+            <a:r>
+              <a:rPr lang="sv-SE" dirty="0" smtClean="0"/>
+              <a:t>Skapa klasser och metoder medan programmet körs</a:t>
+            </a:r>
+          </a:p>
+          <a:p>
+            <a:r>
+              <a:rPr lang="sv-SE" dirty="0" smtClean="0"/>
+              <a:t>Skapa </a:t>
             </a:r>
             <a:r>
               <a:rPr lang="sv-SE" dirty="0" err="1" smtClean="0"/>
-              <a:t>java-plattformen</a:t>
-            </a:r>
-            <a:r>
-              <a:rPr lang="sv-SE" dirty="0" smtClean="0"/>
-              <a:t>, till exempel:</a:t>
-            </a:r>
-          </a:p>
-        </p:txBody>
-      </p:sp>
-      <p:sp>
-        <p:nvSpPr>
-          <p:cNvPr id="3" name="Platshållare för innehåll 2"/>
-          <p:cNvSpPr>
-            <a:spLocks noGrp="1"/>
-          </p:cNvSpPr>
-          <p:nvPr>
-            <p:ph idx="1"/>
-          </p:nvPr>
-        </p:nvSpPr>
-        <p:spPr/>
-        <p:txBody>
-          <a:bodyPr/>
-          <a:lstStyle/>
-          <a:p>
-            <a:r>
-              <a:rPr lang="sv-SE" dirty="0" smtClean="0"/>
-              <a:t>Ruby (</a:t>
+              <a:t>mock-objekt</a:t>
+            </a:r>
+            <a:r>
+              <a:rPr lang="sv-SE" dirty="0" smtClean="0"/>
+              <a:t> </a:t>
+            </a:r>
+          </a:p>
+          <a:p>
+            <a:r>
+              <a:rPr lang="sv-SE" dirty="0" smtClean="0"/>
+              <a:t>Testa klasser som är tajt kopplade</a:t>
+            </a:r>
+          </a:p>
+          <a:p>
+            <a:r>
+              <a:rPr lang="sv-SE" dirty="0" smtClean="0"/>
+              <a:t>Skapa </a:t>
             </a:r>
             <a:r>
               <a:rPr lang="sv-SE" dirty="0" err="1" smtClean="0"/>
-              <a:t>jRuby</a:t>
+              <a:t>DSL:s</a:t>
+            </a:r>
+            <a:r>
+              <a:rPr lang="sv-SE" dirty="0" smtClean="0"/>
+              <a:t> (</a:t>
+            </a:r>
+            <a:r>
+              <a:rPr lang="sv-SE" dirty="0" err="1" smtClean="0"/>
+              <a:t>Domain</a:t>
+            </a:r>
+            <a:r>
+              <a:rPr lang="sv-SE" dirty="0" smtClean="0"/>
+              <a:t> </a:t>
+            </a:r>
+            <a:r>
+              <a:rPr lang="sv-SE" dirty="0" err="1" smtClean="0"/>
+              <a:t>specific</a:t>
+            </a:r>
+            <a:r>
+              <a:rPr lang="sv-SE" dirty="0" smtClean="0"/>
+              <a:t> </a:t>
+            </a:r>
+            <a:r>
+              <a:rPr lang="sv-SE" dirty="0" err="1" smtClean="0"/>
+              <a:t>languages</a:t>
             </a:r>
             <a:r>
               <a:rPr lang="sv-SE" dirty="0" smtClean="0"/>
               <a:t>)</a:t>
-            </a:r>
-          </a:p>
-          <a:p>
-            <a:r>
-              <a:rPr lang="sv-SE" dirty="0" err="1" smtClean="0"/>
-              <a:t>Python</a:t>
-            </a:r>
-            <a:r>
-              <a:rPr lang="sv-SE" dirty="0" smtClean="0"/>
-              <a:t> (</a:t>
-            </a:r>
-            <a:r>
-              <a:rPr lang="sv-SE" dirty="0" err="1" smtClean="0"/>
-              <a:t>Jython</a:t>
-            </a:r>
-            <a:r>
-              <a:rPr lang="sv-SE" dirty="0" smtClean="0"/>
-              <a:t>)</a:t>
-            </a:r>
-          </a:p>
-          <a:p>
-            <a:r>
-              <a:rPr lang="sv-SE" dirty="0" err="1" smtClean="0"/>
-              <a:t>BeanShell</a:t>
-            </a:r>
-            <a:endParaRPr lang="sv-SE" dirty="0" smtClean="0"/>
-          </a:p>
-          <a:p>
-            <a:r>
-              <a:rPr lang="sv-SE" dirty="0" smtClean="0"/>
-              <a:t>JavaScript</a:t>
-            </a:r>
-          </a:p>
-          <a:p>
-            <a:r>
-              <a:rPr lang="sv-SE" dirty="0" smtClean="0"/>
-              <a:t>…</a:t>
             </a:r>
             <a:endParaRPr lang="sv-SE" dirty="0"/>
           </a:p>
@@ -4495,13 +4630,6 @@
   <p:clrMapOvr>
     <a:masterClrMapping/>
   </p:clrMapOvr>
-  <p:timing>
-    <p:tnLst>
-      <p:par>
-        <p:cTn id="1" dur="indefinite" restart="never" nodeType="tmRoot"/>
-      </p:par>
-    </p:tnLst>
-  </p:timing>
 </p:sld>
 </file>
 
@@ -4539,78 +4667,75 @@
           <a:p>
             <a:r>
               <a:rPr lang="sv-SE" dirty="0" smtClean="0"/>
-              <a:t>Fördelar med </a:t>
+              <a:t>GPL(General </a:t>
+            </a:r>
+            <a:r>
+              <a:rPr lang="sv-SE" dirty="0" err="1" smtClean="0"/>
+              <a:t>Purpose</a:t>
+            </a:r>
+            <a:r>
+              <a:rPr lang="sv-SE" dirty="0" smtClean="0"/>
+              <a:t> Languages)</a:t>
+            </a:r>
+            <a:endParaRPr lang="sv-SE" dirty="0"/>
+          </a:p>
+        </p:txBody>
+      </p:sp>
+      <p:sp>
+        <p:nvSpPr>
+          <p:cNvPr id="3" name="Platshållare för innehåll 2"/>
+          <p:cNvSpPr>
+            <a:spLocks noGrp="1"/>
+          </p:cNvSpPr>
+          <p:nvPr>
+            <p:ph idx="1"/>
+          </p:nvPr>
+        </p:nvSpPr>
+        <p:spPr/>
+        <p:txBody>
+          <a:bodyPr/>
+          <a:lstStyle/>
+          <a:p>
+            <a:r>
+              <a:rPr lang="sv-SE" dirty="0" smtClean="0"/>
+              <a:t>Java, C, .NET, </a:t>
             </a:r>
             <a:r>
               <a:rPr lang="sv-SE" dirty="0" err="1" smtClean="0"/>
               <a:t>Groovy</a:t>
             </a:r>
-            <a:endParaRPr lang="sv-SE" dirty="0"/>
-          </a:p>
-        </p:txBody>
-      </p:sp>
-      <p:sp>
-        <p:nvSpPr>
-          <p:cNvPr id="3" name="Platshållare för innehåll 2"/>
-          <p:cNvSpPr>
-            <a:spLocks noGrp="1"/>
-          </p:cNvSpPr>
-          <p:nvPr>
-            <p:ph idx="1"/>
-          </p:nvPr>
-        </p:nvSpPr>
-        <p:spPr/>
-        <p:txBody>
-          <a:bodyPr/>
-          <a:lstStyle/>
-          <a:p>
-            <a:r>
-              <a:rPr lang="sv-SE" dirty="0" smtClean="0"/>
-              <a:t>Enkelt att lära för en Javaprogrammerare</a:t>
-            </a:r>
-          </a:p>
-          <a:p>
-            <a:r>
-              <a:rPr lang="sv-SE" dirty="0" smtClean="0"/>
-              <a:t>Helt kompatibelt med existerande Javaprojekt</a:t>
-            </a:r>
-          </a:p>
-          <a:p>
+            <a:r>
+              <a:rPr lang="sv-SE" dirty="0" smtClean="0"/>
+              <a:t> och liknande språk kallas GPL</a:t>
+            </a:r>
+            <a:r>
+              <a:rPr lang="sv-SE" dirty="0" smtClean="0"/>
+              <a:t>, General </a:t>
+            </a:r>
             <a:r>
               <a:rPr lang="sv-SE" dirty="0" err="1" smtClean="0"/>
-              <a:t>Groovy</a:t>
-            </a:r>
-            <a:r>
-              <a:rPr lang="sv-SE" dirty="0" smtClean="0"/>
-              <a:t> ÄR Java – kompileras till .</a:t>
-            </a:r>
-            <a:r>
-              <a:rPr lang="sv-SE" dirty="0" err="1" smtClean="0"/>
-              <a:t>class-filer</a:t>
+              <a:t>Purpose</a:t>
+            </a:r>
+            <a:r>
+              <a:rPr lang="sv-SE" dirty="0" smtClean="0"/>
+              <a:t> </a:t>
+            </a:r>
+            <a:r>
+              <a:rPr lang="sv-SE" dirty="0" smtClean="0"/>
+              <a:t>Languages. </a:t>
             </a:r>
             <a:endParaRPr lang="sv-SE" dirty="0" smtClean="0"/>
           </a:p>
           <a:p>
             <a:r>
               <a:rPr lang="sv-SE" dirty="0" smtClean="0"/>
-              <a:t>Lätt att börja med, man kan skriva Java istället om man är osäker på </a:t>
-            </a:r>
-            <a:r>
-              <a:rPr lang="sv-SE" dirty="0" err="1" smtClean="0"/>
-              <a:t>Groovy-syntax</a:t>
-            </a:r>
-            <a:endParaRPr lang="sv-SE" dirty="0" smtClean="0"/>
-          </a:p>
-          <a:p>
-            <a:r>
-              <a:rPr lang="sv-SE" dirty="0" smtClean="0"/>
-              <a:t>Dynamiskt</a:t>
-            </a:r>
-          </a:p>
-          <a:p>
-            <a:r>
-              <a:rPr lang="sv-SE" dirty="0" smtClean="0"/>
-              <a:t>Utökar JDK för att förenkla utveckling</a:t>
+              <a:t>Har en generell syntax, oberoende av område.</a:t>
+            </a:r>
+          </a:p>
+          <a:p>
+            <a:r>
+              <a:rPr lang="sv-SE" dirty="0" smtClean="0"/>
+              <a:t>Allt går att göra, men det är sällan det enklaste eller snabbaste sättet</a:t>
             </a:r>
             <a:endParaRPr lang="sv-SE" dirty="0"/>
           </a:p>
@@ -4655,27 +4780,86 @@
             <a:spLocks noGrp="1"/>
           </p:cNvSpPr>
           <p:nvPr>
-            <p:ph type="ctrTitle"/>
-          </p:nvPr>
-        </p:nvSpPr>
-        <p:spPr/>
-        <p:txBody>
-          <a:bodyPr/>
-          <a:lstStyle/>
-          <a:p>
-            <a:r>
-              <a:rPr lang="sv-SE" dirty="0" smtClean="0"/>
-              <a:t>[</a:t>
+            <p:ph type="title"/>
+          </p:nvPr>
+        </p:nvSpPr>
+        <p:spPr/>
+        <p:txBody>
+          <a:bodyPr/>
+          <a:lstStyle/>
+          <a:p>
+            <a:r>
+              <a:rPr lang="sv-SE" dirty="0" smtClean="0"/>
+              <a:t>DSL (</a:t>
             </a:r>
             <a:r>
               <a:rPr lang="sv-SE" dirty="0" err="1" smtClean="0"/>
-              <a:t>helloWorld.groovy</a:t>
-            </a:r>
-            <a:r>
-              <a:rPr lang="sv-SE" dirty="0" smtClean="0"/>
-              <a:t>]</a:t>
+              <a:t>Domain</a:t>
+            </a:r>
+            <a:r>
+              <a:rPr lang="sv-SE" dirty="0" smtClean="0"/>
+              <a:t> </a:t>
+            </a:r>
+            <a:r>
+              <a:rPr lang="sv-SE" dirty="0" err="1" smtClean="0"/>
+              <a:t>Specific</a:t>
+            </a:r>
+            <a:r>
+              <a:rPr lang="sv-SE" dirty="0" smtClean="0"/>
+              <a:t> Languages)</a:t>
             </a:r>
             <a:endParaRPr lang="sv-SE" dirty="0"/>
+          </a:p>
+        </p:txBody>
+      </p:sp>
+      <p:sp>
+        <p:nvSpPr>
+          <p:cNvPr id="3" name="Platshållare för innehåll 2"/>
+          <p:cNvSpPr>
+            <a:spLocks noGrp="1"/>
+          </p:cNvSpPr>
+          <p:nvPr>
+            <p:ph idx="1"/>
+          </p:nvPr>
+        </p:nvSpPr>
+        <p:spPr/>
+        <p:txBody>
+          <a:bodyPr>
+            <a:normAutofit/>
+          </a:bodyPr>
+          <a:lstStyle/>
+          <a:p>
+            <a:r>
+              <a:rPr lang="sv-SE" dirty="0" smtClean="0"/>
+              <a:t>Språket är designat utifrån domänen det används i.</a:t>
+            </a:r>
+          </a:p>
+          <a:p>
+            <a:r>
+              <a:rPr lang="sv-SE" dirty="0" smtClean="0"/>
+              <a:t>Koden blir lättläst</a:t>
+            </a:r>
+          </a:p>
+          <a:p>
+            <a:r>
+              <a:rPr lang="sv-SE" dirty="0" smtClean="0"/>
+              <a:t>Går snabbare att utveckla i ett språk som ligger nära problemdomänen</a:t>
+            </a:r>
+          </a:p>
+          <a:p>
+            <a:r>
+              <a:rPr lang="sv-SE" dirty="0" smtClean="0"/>
+              <a:t>Lätt att kommunicera med beställare och användare</a:t>
+            </a:r>
+          </a:p>
+          <a:p>
+            <a:r>
+              <a:rPr lang="sv-SE" dirty="0" smtClean="0"/>
+              <a:t>Lätt att skriva enhetstester</a:t>
+            </a:r>
+          </a:p>
+          <a:p>
+            <a:endParaRPr lang="sv-SE" dirty="0" smtClean="0"/>
           </a:p>
         </p:txBody>
       </p:sp>
@@ -4723,12 +4907,14 @@
         </p:nvSpPr>
         <p:spPr/>
         <p:txBody>
-          <a:bodyPr/>
-          <a:lstStyle/>
-          <a:p>
-            <a:r>
-              <a:rPr lang="sv-SE" dirty="0" smtClean="0"/>
-              <a:t>Metaprogrammering</a:t>
+          <a:bodyPr>
+            <a:normAutofit/>
+          </a:bodyPr>
+          <a:lstStyle/>
+          <a:p>
+            <a:r>
+              <a:rPr lang="sv-SE" dirty="0" smtClean="0"/>
+              <a:t>DSL</a:t>
             </a:r>
             <a:endParaRPr lang="sv-SE" dirty="0"/>
           </a:p>
@@ -4751,73 +4937,24 @@
           <a:p>
             <a:r>
               <a:rPr lang="sv-SE" dirty="0" smtClean="0"/>
-              <a:t>Program som ändrar program, inklusive sig själv</a:t>
-            </a:r>
-          </a:p>
-          <a:p>
-            <a:r>
-              <a:rPr lang="sv-SE" dirty="0" smtClean="0"/>
-              <a:t>Skapa klasser och metoder medan programmet körs</a:t>
-            </a:r>
-          </a:p>
-          <a:p>
-            <a:r>
-              <a:rPr lang="sv-SE" dirty="0" smtClean="0"/>
-              <a:t>Skapa </a:t>
-            </a:r>
-            <a:r>
-              <a:rPr lang="sv-SE" dirty="0" err="1" smtClean="0"/>
-              <a:t>mock-objekt</a:t>
-            </a:r>
-            <a:r>
-              <a:rPr lang="sv-SE" dirty="0" smtClean="0"/>
-              <a:t> </a:t>
-            </a:r>
-          </a:p>
-          <a:p>
-            <a:r>
-              <a:rPr lang="sv-SE" dirty="0" smtClean="0"/>
-              <a:t>Testa klasser som är tight kopplade</a:t>
-            </a:r>
-          </a:p>
-          <a:p>
-            <a:r>
-              <a:rPr lang="sv-SE" dirty="0" smtClean="0"/>
-              <a:t>Skapa </a:t>
-            </a:r>
-            <a:r>
-              <a:rPr lang="sv-SE" dirty="0" err="1" smtClean="0"/>
-              <a:t>DSL:s</a:t>
-            </a:r>
-            <a:r>
-              <a:rPr lang="sv-SE" dirty="0" smtClean="0"/>
-              <a:t> (</a:t>
-            </a:r>
-            <a:r>
-              <a:rPr lang="sv-SE" dirty="0" err="1" smtClean="0"/>
-              <a:t>Domain</a:t>
-            </a:r>
-            <a:r>
-              <a:rPr lang="sv-SE" dirty="0" smtClean="0"/>
-              <a:t> </a:t>
-            </a:r>
-            <a:r>
-              <a:rPr lang="sv-SE" dirty="0" err="1" smtClean="0"/>
-              <a:t>specific</a:t>
-            </a:r>
-            <a:r>
-              <a:rPr lang="sv-SE" dirty="0" smtClean="0"/>
-              <a:t> </a:t>
-            </a:r>
-            <a:r>
-              <a:rPr lang="sv-SE" dirty="0" err="1" smtClean="0"/>
-              <a:t>languages</a:t>
-            </a:r>
-            <a:r>
-              <a:rPr lang="sv-SE" dirty="0" smtClean="0"/>
-              <a:t>)</a:t>
-            </a:r>
-            <a:endParaRPr lang="sv-SE" dirty="0"/>
+              <a:t>Två typer:</a:t>
+            </a:r>
+          </a:p>
+          <a:p>
+            <a:pPr lvl="1"/>
+            <a:r>
+              <a:rPr lang="sv-SE" dirty="0" smtClean="0"/>
+              <a:t>Intern DSL</a:t>
+            </a:r>
+            <a:endParaRPr lang="sv-SE" dirty="0" smtClean="0"/>
+          </a:p>
+          <a:p>
+            <a:pPr lvl="1"/>
+            <a:r>
+              <a:rPr lang="sv-SE" dirty="0" smtClean="0"/>
+              <a:t>Extern DSL</a:t>
+            </a:r>
+            <a:endParaRPr lang="sv-SE" dirty="0" smtClean="0"/>
           </a:p>
         </p:txBody>
       </p:sp>
@@ -4826,6 +4963,13 @@
   <p:clrMapOvr>
     <a:masterClrMapping/>
   </p:clrMapOvr>
+  <p:timing>
+    <p:tnLst>
+      <p:par>
+        <p:cTn id="1" dur="indefinite" restart="never" nodeType="tmRoot"/>
+      </p:par>
+    </p:tnLst>
+  </p:timing>
 </p:sld>
 </file>
 

</xml_diff>

<commit_message>
lagt till conveniance methods
</commit_message>
<xml_diff>
--- a/groovyseminarie/dokument/groovyseminarium_source.pptx
+++ b/groovyseminarie/dokument/groovyseminarium_source.pptx
@@ -27,16 +27,25 @@
     <p:sldId id="283" r:id="rId21"/>
     <p:sldId id="284" r:id="rId22"/>
     <p:sldId id="285" r:id="rId23"/>
-    <p:sldId id="286" r:id="rId24"/>
-    <p:sldId id="287" r:id="rId25"/>
-    <p:sldId id="288" r:id="rId26"/>
-    <p:sldId id="295" r:id="rId27"/>
-    <p:sldId id="291" r:id="rId28"/>
-    <p:sldId id="294" r:id="rId29"/>
-    <p:sldId id="292" r:id="rId30"/>
-    <p:sldId id="293" r:id="rId31"/>
-    <p:sldId id="289" r:id="rId32"/>
-    <p:sldId id="290" r:id="rId33"/>
+    <p:sldId id="296" r:id="rId24"/>
+    <p:sldId id="286" r:id="rId25"/>
+    <p:sldId id="287" r:id="rId26"/>
+    <p:sldId id="288" r:id="rId27"/>
+    <p:sldId id="297" r:id="rId28"/>
+    <p:sldId id="291" r:id="rId29"/>
+    <p:sldId id="298" r:id="rId30"/>
+    <p:sldId id="299" r:id="rId31"/>
+    <p:sldId id="300" r:id="rId32"/>
+    <p:sldId id="301" r:id="rId33"/>
+    <p:sldId id="302" r:id="rId34"/>
+    <p:sldId id="303" r:id="rId35"/>
+    <p:sldId id="304" r:id="rId36"/>
+    <p:sldId id="295" r:id="rId37"/>
+    <p:sldId id="294" r:id="rId38"/>
+    <p:sldId id="292" r:id="rId39"/>
+    <p:sldId id="293" r:id="rId40"/>
+    <p:sldId id="289" r:id="rId41"/>
+    <p:sldId id="290" r:id="rId42"/>
   </p:sldIdLst>
   <p:sldSz cx="9144000" cy="6858000" type="screen4x3"/>
   <p:notesSz cx="6858000" cy="9144000"/>
@@ -320,7 +329,7 @@
             <a:fld id="{347BD319-C441-4740-BDB2-35E25C52CCE7}" type="datetimeFigureOut">
               <a:rPr lang="sv-SE" smtClean="0"/>
               <a:pPr/>
-              <a:t>2008-09-01</a:t>
+              <a:t>2008-09-02</a:t>
             </a:fld>
             <a:endParaRPr lang="sv-SE"/>
           </a:p>
@@ -487,7 +496,7 @@
             <a:fld id="{347BD319-C441-4740-BDB2-35E25C52CCE7}" type="datetimeFigureOut">
               <a:rPr lang="sv-SE" smtClean="0"/>
               <a:pPr/>
-              <a:t>2008-09-01</a:t>
+              <a:t>2008-09-02</a:t>
             </a:fld>
             <a:endParaRPr lang="sv-SE"/>
           </a:p>
@@ -664,7 +673,7 @@
             <a:fld id="{347BD319-C441-4740-BDB2-35E25C52CCE7}" type="datetimeFigureOut">
               <a:rPr lang="sv-SE" smtClean="0"/>
               <a:pPr/>
-              <a:t>2008-09-01</a:t>
+              <a:t>2008-09-02</a:t>
             </a:fld>
             <a:endParaRPr lang="sv-SE"/>
           </a:p>
@@ -831,7 +840,7 @@
             <a:fld id="{347BD319-C441-4740-BDB2-35E25C52CCE7}" type="datetimeFigureOut">
               <a:rPr lang="sv-SE" smtClean="0"/>
               <a:pPr/>
-              <a:t>2008-09-01</a:t>
+              <a:t>2008-09-02</a:t>
             </a:fld>
             <a:endParaRPr lang="sv-SE"/>
           </a:p>
@@ -1074,7 +1083,7 @@
             <a:fld id="{347BD319-C441-4740-BDB2-35E25C52CCE7}" type="datetimeFigureOut">
               <a:rPr lang="sv-SE" smtClean="0"/>
               <a:pPr/>
-              <a:t>2008-09-01</a:t>
+              <a:t>2008-09-02</a:t>
             </a:fld>
             <a:endParaRPr lang="sv-SE"/>
           </a:p>
@@ -1359,7 +1368,7 @@
             <a:fld id="{347BD319-C441-4740-BDB2-35E25C52CCE7}" type="datetimeFigureOut">
               <a:rPr lang="sv-SE" smtClean="0"/>
               <a:pPr/>
-              <a:t>2008-09-01</a:t>
+              <a:t>2008-09-02</a:t>
             </a:fld>
             <a:endParaRPr lang="sv-SE"/>
           </a:p>
@@ -1778,7 +1787,7 @@
             <a:fld id="{347BD319-C441-4740-BDB2-35E25C52CCE7}" type="datetimeFigureOut">
               <a:rPr lang="sv-SE" smtClean="0"/>
               <a:pPr/>
-              <a:t>2008-09-01</a:t>
+              <a:t>2008-09-02</a:t>
             </a:fld>
             <a:endParaRPr lang="sv-SE"/>
           </a:p>
@@ -1893,7 +1902,7 @@
             <a:fld id="{347BD319-C441-4740-BDB2-35E25C52CCE7}" type="datetimeFigureOut">
               <a:rPr lang="sv-SE" smtClean="0"/>
               <a:pPr/>
-              <a:t>2008-09-01</a:t>
+              <a:t>2008-09-02</a:t>
             </a:fld>
             <a:endParaRPr lang="sv-SE"/>
           </a:p>
@@ -1985,7 +1994,7 @@
             <a:fld id="{347BD319-C441-4740-BDB2-35E25C52CCE7}" type="datetimeFigureOut">
               <a:rPr lang="sv-SE" smtClean="0"/>
               <a:pPr/>
-              <a:t>2008-09-01</a:t>
+              <a:t>2008-09-02</a:t>
             </a:fld>
             <a:endParaRPr lang="sv-SE"/>
           </a:p>
@@ -2259,7 +2268,7 @@
             <a:fld id="{347BD319-C441-4740-BDB2-35E25C52CCE7}" type="datetimeFigureOut">
               <a:rPr lang="sv-SE" smtClean="0"/>
               <a:pPr/>
-              <a:t>2008-09-01</a:t>
+              <a:t>2008-09-02</a:t>
             </a:fld>
             <a:endParaRPr lang="sv-SE"/>
           </a:p>
@@ -2509,7 +2518,7 @@
             <a:fld id="{347BD319-C441-4740-BDB2-35E25C52CCE7}" type="datetimeFigureOut">
               <a:rPr lang="sv-SE" smtClean="0"/>
               <a:pPr/>
-              <a:t>2008-09-01</a:t>
+              <a:t>2008-09-02</a:t>
             </a:fld>
             <a:endParaRPr lang="sv-SE"/>
           </a:p>
@@ -2719,7 +2728,7 @@
             <a:fld id="{347BD319-C441-4740-BDB2-35E25C52CCE7}" type="datetimeFigureOut">
               <a:rPr lang="sv-SE" smtClean="0"/>
               <a:pPr/>
-              <a:t>2008-09-01</a:t>
+              <a:t>2008-09-02</a:t>
             </a:fld>
             <a:endParaRPr lang="sv-SE"/>
           </a:p>
@@ -4143,11 +4152,7 @@
           <a:p>
             <a:r>
               <a:rPr lang="sv-SE" dirty="0" smtClean="0"/>
-              <a:t>Utökar </a:t>
-            </a:r>
-            <a:r>
-              <a:rPr lang="sv-SE" dirty="0" smtClean="0"/>
-              <a:t>JDK för att förenkla utveckling</a:t>
+              <a:t>Utökar JDK för att förenkla utveckling</a:t>
             </a:r>
             <a:endParaRPr lang="sv-SE" dirty="0"/>
           </a:p>
@@ -4418,23 +4423,7 @@
           <a:p>
             <a:r>
               <a:rPr lang="sv-SE" dirty="0" smtClean="0"/>
-              <a:t>Ett javaprogram </a:t>
-            </a:r>
-            <a:r>
-              <a:rPr lang="sv-SE" dirty="0" smtClean="0"/>
-              <a:t>bryr </a:t>
-            </a:r>
-            <a:r>
-              <a:rPr lang="sv-SE" dirty="0" smtClean="0"/>
-              <a:t>sig </a:t>
-            </a:r>
-            <a:r>
-              <a:rPr lang="sv-SE" dirty="0" smtClean="0"/>
-              <a:t>inte om </a:t>
-            </a:r>
-            <a:r>
-              <a:rPr lang="sv-SE" dirty="0" smtClean="0"/>
-              <a:t>en klass är kompilerad från </a:t>
+              <a:t>Ett javaprogram bryr sig inte om en klass är kompilerad från </a:t>
             </a:r>
             <a:r>
               <a:rPr lang="sv-SE" dirty="0" err="1" smtClean="0"/>
@@ -4442,11 +4431,7 @@
             </a:r>
             <a:r>
               <a:rPr lang="sv-SE" dirty="0" smtClean="0"/>
-              <a:t> eller från </a:t>
-            </a:r>
-            <a:r>
-              <a:rPr lang="sv-SE" dirty="0" smtClean="0"/>
-              <a:t>Java. Det enda som behövs är </a:t>
+              <a:t> eller från Java. Det enda som behövs är </a:t>
             </a:r>
             <a:r>
               <a:rPr lang="sv-SE" dirty="0" err="1" smtClean="0"/>
@@ -4594,13 +4579,8 @@
           <a:p>
             <a:r>
               <a:rPr lang="sv-SE" dirty="0" smtClean="0"/>
-              <a:t>Ny grupp utvecklare tog över </a:t>
-            </a:r>
-            <a:r>
-              <a:rPr lang="sv-SE" dirty="0" smtClean="0"/>
-              <a:t>2004</a:t>
-            </a:r>
-            <a:endParaRPr lang="sv-SE" dirty="0" smtClean="0"/>
+              <a:t>Ny grupp utvecklare tog över 2004</a:t>
+            </a:r>
           </a:p>
           <a:p>
             <a:r>
@@ -4675,11 +4655,7 @@
           <a:p>
             <a:r>
               <a:rPr lang="sv-SE" dirty="0" smtClean="0"/>
-              <a:t>Utökar JDK för att förenkla </a:t>
-            </a:r>
-            <a:r>
-              <a:rPr lang="sv-SE" dirty="0" smtClean="0"/>
-              <a:t>utveckling</a:t>
+              <a:t>Utökar JDK för att förenkla utveckling</a:t>
             </a:r>
             <a:endParaRPr lang="sv-SE" dirty="0"/>
           </a:p>
@@ -4763,6 +4739,10 @@
               <a:rPr lang="sv-SE" dirty="0" err="1" smtClean="0"/>
               <a:t>Exceptions</a:t>
             </a:r>
+            <a:r>
+              <a:rPr lang="sv-SE" dirty="0" smtClean="0"/>
+              <a:t> i java</a:t>
+            </a:r>
             <a:endParaRPr lang="sv-SE" dirty="0"/>
           </a:p>
         </p:txBody>
@@ -4845,6 +4825,14 @@
               <a:rPr lang="sv-SE" dirty="0" err="1" smtClean="0"/>
               <a:t>Exceptions</a:t>
             </a:r>
+            <a:r>
+              <a:rPr lang="sv-SE" dirty="0" smtClean="0"/>
+              <a:t> i </a:t>
+            </a:r>
+            <a:r>
+              <a:rPr lang="sv-SE" dirty="0" err="1" smtClean="0"/>
+              <a:t>Groovy</a:t>
+            </a:r>
             <a:endParaRPr lang="sv-SE" dirty="0"/>
           </a:p>
         </p:txBody>
@@ -4920,18 +4908,12 @@
         </p:nvSpPr>
         <p:spPr/>
         <p:txBody>
-          <a:bodyPr>
-            <a:normAutofit fontScale="90000"/>
-          </a:bodyPr>
-          <a:lstStyle/>
-          <a:p>
-            <a:r>
-              <a:rPr lang="sv-SE" dirty="0" smtClean="0"/>
-              <a:t>Enkelt att slippa </a:t>
-            </a:r>
-            <a:r>
-              <a:rPr lang="sv-SE" dirty="0" err="1" smtClean="0"/>
-              <a:t>NullPointerExceptions</a:t>
+          <a:bodyPr/>
+          <a:lstStyle/>
+          <a:p>
+            <a:r>
+              <a:rPr lang="sv-SE" dirty="0" smtClean="0"/>
+              <a:t>Dynamisk/frivillig typning</a:t>
             </a:r>
             <a:endParaRPr lang="sv-SE" dirty="0"/>
           </a:p>
@@ -4961,7 +4943,7 @@
             </a:r>
             <a:r>
               <a:rPr lang="sv-SE" dirty="0" err="1" smtClean="0"/>
-              <a:t>Nullsafe.java</a:t>
+              <a:t>optionalTyping.groovy</a:t>
             </a:r>
             <a:r>
               <a:rPr lang="sv-SE" dirty="0" smtClean="0"/>
@@ -5009,17 +4991,21 @@
         <p:spPr/>
         <p:txBody>
           <a:bodyPr>
-            <a:normAutofit fontScale="90000"/>
+            <a:normAutofit/>
           </a:bodyPr>
           <a:lstStyle/>
           <a:p>
             <a:r>
               <a:rPr lang="sv-SE" dirty="0" smtClean="0"/>
-              <a:t>Enkelt att slippa </a:t>
-            </a:r>
-            <a:r>
-              <a:rPr lang="sv-SE" dirty="0" err="1" smtClean="0"/>
-              <a:t>NullPointerExceptions</a:t>
+              <a:t>Hantera </a:t>
+            </a:r>
+            <a:r>
+              <a:rPr lang="sv-SE" dirty="0" err="1" smtClean="0"/>
+              <a:t>null</a:t>
+            </a:r>
+            <a:r>
+              <a:rPr lang="sv-SE" dirty="0" smtClean="0"/>
+              <a:t> i Java</a:t>
             </a:r>
             <a:endParaRPr lang="sv-SE" dirty="0"/>
           </a:p>
@@ -5049,7 +5035,7 @@
             </a:r>
             <a:r>
               <a:rPr lang="sv-SE" dirty="0" err="1" smtClean="0"/>
-              <a:t>Nullsafe.groovy</a:t>
+              <a:t>Nullsafe.java</a:t>
             </a:r>
             <a:r>
               <a:rPr lang="sv-SE" dirty="0" smtClean="0"/>
@@ -5096,12 +5082,26 @@
         </p:nvSpPr>
         <p:spPr/>
         <p:txBody>
-          <a:bodyPr/>
-          <a:lstStyle/>
-          <a:p>
-            <a:r>
-              <a:rPr lang="sv-SE" dirty="0" smtClean="0"/>
-              <a:t>Slipp generera getters/setters</a:t>
+          <a:bodyPr>
+            <a:normAutofit/>
+          </a:bodyPr>
+          <a:lstStyle/>
+          <a:p>
+            <a:r>
+              <a:rPr lang="sv-SE" dirty="0" smtClean="0"/>
+              <a:t>Hantera </a:t>
+            </a:r>
+            <a:r>
+              <a:rPr lang="sv-SE" dirty="0" err="1" smtClean="0"/>
+              <a:t>null</a:t>
+            </a:r>
+            <a:r>
+              <a:rPr lang="sv-SE" dirty="0" smtClean="0"/>
+              <a:t> i </a:t>
+            </a:r>
+            <a:r>
+              <a:rPr lang="sv-SE" dirty="0" err="1" smtClean="0"/>
+              <a:t>Groovy</a:t>
             </a:r>
             <a:endParaRPr lang="sv-SE" dirty="0"/>
           </a:p>
@@ -5131,11 +5131,7 @@
             </a:r>
             <a:r>
               <a:rPr lang="sv-SE" dirty="0" err="1" smtClean="0"/>
-              <a:t>G</a:t>
-            </a:r>
-            <a:r>
-              <a:rPr lang="sv-SE" dirty="0" err="1" smtClean="0"/>
-              <a:t>ettersSetters.groovy</a:t>
+              <a:t>Nullsafe.groovy</a:t>
             </a:r>
             <a:r>
               <a:rPr lang="sv-SE" dirty="0" smtClean="0"/>
@@ -5187,11 +5183,7 @@
           <a:p>
             <a:r>
               <a:rPr lang="sv-SE" dirty="0" smtClean="0"/>
-              <a:t>Operator </a:t>
-            </a:r>
-            <a:r>
-              <a:rPr lang="sv-SE" dirty="0" err="1" smtClean="0"/>
-              <a:t>overloading</a:t>
+              <a:t>Getters/setters i Java</a:t>
             </a:r>
             <a:endParaRPr lang="sv-SE" dirty="0"/>
           </a:p>
@@ -5215,6 +5207,18 @@
             <a:pPr>
               <a:buNone/>
             </a:pPr>
+            <a:r>
+              <a:rPr lang="sv-SE" dirty="0" smtClean="0"/>
+              <a:t>[</a:t>
+            </a:r>
+            <a:r>
+              <a:rPr lang="sv-SE" dirty="0" err="1" smtClean="0"/>
+              <a:t>ClassWithGettersSetters.java</a:t>
+            </a:r>
+            <a:r>
+              <a:rPr lang="sv-SE" dirty="0" smtClean="0"/>
+              <a:t>]</a:t>
+            </a:r>
             <a:endParaRPr lang="sv-SE" dirty="0"/>
           </a:p>
         </p:txBody>
@@ -5261,15 +5265,11 @@
           <a:p>
             <a:r>
               <a:rPr lang="sv-SE" dirty="0" smtClean="0"/>
-              <a:t>Default </a:t>
-            </a:r>
-            <a:r>
-              <a:rPr lang="sv-SE" dirty="0" err="1" smtClean="0"/>
-              <a:t>konstruktor</a:t>
-            </a:r>
-            <a:r>
-              <a:rPr lang="sv-SE" dirty="0" smtClean="0"/>
-              <a:t> räcker oftast</a:t>
+              <a:t>Getters/setters i </a:t>
+            </a:r>
+            <a:r>
+              <a:rPr lang="sv-SE" dirty="0" err="1" smtClean="0"/>
+              <a:t>Groovy</a:t>
             </a:r>
             <a:endParaRPr lang="sv-SE" dirty="0"/>
           </a:p>
@@ -5299,7 +5299,7 @@
             </a:r>
             <a:r>
               <a:rPr lang="sv-SE" dirty="0" err="1" smtClean="0"/>
-              <a:t>UsingDefaultConstructor.groovy</a:t>
+              <a:t>ClassWithGettersSetters.groovy</a:t>
             </a:r>
             <a:r>
               <a:rPr lang="sv-SE" dirty="0" smtClean="0"/>
@@ -5350,16 +5350,16 @@
           <a:lstStyle/>
           <a:p>
             <a:r>
-              <a:rPr lang="sv-SE" dirty="0" err="1" smtClean="0"/>
-              <a:t>Groovy</a:t>
-            </a:r>
-            <a:r>
-              <a:rPr lang="sv-SE" dirty="0" smtClean="0"/>
-              <a:t> </a:t>
-            </a:r>
-            <a:r>
-              <a:rPr lang="sv-SE" dirty="0" err="1" smtClean="0"/>
-              <a:t>truth</a:t>
+              <a:rPr lang="sv-SE" dirty="0" smtClean="0"/>
+              <a:t>Default </a:t>
+            </a:r>
+            <a:r>
+              <a:rPr lang="sv-SE" dirty="0" err="1" smtClean="0"/>
+              <a:t>konstruktor</a:t>
+            </a:r>
+            <a:r>
+              <a:rPr lang="sv-SE" dirty="0" smtClean="0"/>
+              <a:t> i Java</a:t>
             </a:r>
             <a:endParaRPr lang="sv-SE" dirty="0"/>
           </a:p>
@@ -5389,7 +5389,7 @@
             </a:r>
             <a:r>
               <a:rPr lang="sv-SE" dirty="0" err="1" smtClean="0"/>
-              <a:t>TestGroovyTruth.groovy</a:t>
+              <a:t>UsingDefaultConstructor.java</a:t>
             </a:r>
             <a:r>
               <a:rPr lang="sv-SE" dirty="0" smtClean="0"/>
@@ -5440,17 +5440,21 @@
           <a:lstStyle/>
           <a:p>
             <a:r>
+              <a:rPr lang="sv-SE" dirty="0" smtClean="0"/>
+              <a:t>Default </a:t>
+            </a:r>
+            <a:r>
+              <a:rPr lang="sv-SE" dirty="0" err="1" smtClean="0"/>
+              <a:t>konstruktor</a:t>
+            </a:r>
+            <a:r>
+              <a:rPr lang="sv-SE" dirty="0" smtClean="0"/>
+              <a:t> i </a:t>
+            </a:r>
+            <a:r>
               <a:rPr lang="sv-SE" dirty="0" err="1" smtClean="0"/>
               <a:t>Groovy</a:t>
             </a:r>
-            <a:r>
-              <a:rPr lang="sv-SE" dirty="0" smtClean="0"/>
-              <a:t> </a:t>
-            </a:r>
-            <a:r>
-              <a:rPr lang="sv-SE" dirty="0" err="1" smtClean="0"/>
-              <a:t>truth</a:t>
-            </a:r>
             <a:endParaRPr lang="sv-SE" dirty="0"/>
           </a:p>
         </p:txBody>
@@ -5479,11 +5483,7 @@
             </a:r>
             <a:r>
               <a:rPr lang="sv-SE" dirty="0" err="1" smtClean="0"/>
-              <a:t>H</a:t>
-            </a:r>
-            <a:r>
-              <a:rPr lang="sv-SE" dirty="0" err="1" smtClean="0"/>
-              <a:t>elloWorldWithParameters.java</a:t>
+              <a:t>UsingDefaultConstructor.groovy</a:t>
             </a:r>
             <a:r>
               <a:rPr lang="sv-SE" dirty="0" smtClean="0"/>
@@ -5651,15 +5651,7 @@
           <a:p>
             <a:r>
               <a:rPr lang="sv-SE" dirty="0" err="1" smtClean="0"/>
-              <a:t>Groovy</a:t>
-            </a:r>
-            <a:r>
-              <a:rPr lang="sv-SE" dirty="0" smtClean="0"/>
-              <a:t> </a:t>
-            </a:r>
-            <a:r>
-              <a:rPr lang="sv-SE" dirty="0" err="1" smtClean="0"/>
-              <a:t>truth</a:t>
+              <a:t>Bekvämlighetsmetoder:List</a:t>
             </a:r>
             <a:endParaRPr lang="sv-SE" dirty="0"/>
           </a:p>
@@ -5689,7 +5681,7 @@
             </a:r>
             <a:r>
               <a:rPr lang="sv-SE" dirty="0" err="1" smtClean="0"/>
-              <a:t>helloWorldWithParameters.groovy</a:t>
+              <a:t>ArrayConveniance.groovy</a:t>
             </a:r>
             <a:r>
               <a:rPr lang="sv-SE" dirty="0" smtClean="0"/>
@@ -5741,11 +5733,7 @@
           <a:p>
             <a:r>
               <a:rPr lang="sv-SE" dirty="0" err="1" smtClean="0"/>
-              <a:t>Optional</a:t>
-            </a:r>
-            <a:r>
-              <a:rPr lang="sv-SE" dirty="0" smtClean="0"/>
-              <a:t> parameters</a:t>
+              <a:t>Bekvämlighetsmetoder:List</a:t>
             </a:r>
             <a:endParaRPr lang="sv-SE" dirty="0"/>
           </a:p>
@@ -5771,15 +5759,7 @@
             </a:pPr>
             <a:r>
               <a:rPr lang="sv-SE" dirty="0" smtClean="0"/>
-              <a:t>[</a:t>
-            </a:r>
-            <a:r>
-              <a:rPr lang="sv-SE" dirty="0" err="1" smtClean="0"/>
-              <a:t>optionalParameters.java</a:t>
-            </a:r>
-            <a:r>
-              <a:rPr lang="sv-SE" dirty="0" smtClean="0"/>
-              <a:t>]</a:t>
+              <a:t>[ArrayConveniance2.groovy]</a:t>
             </a:r>
             <a:endParaRPr lang="sv-SE" dirty="0"/>
           </a:p>
@@ -5827,11 +5807,7 @@
           <a:p>
             <a:r>
               <a:rPr lang="sv-SE" dirty="0" err="1" smtClean="0"/>
-              <a:t>Optional</a:t>
-            </a:r>
-            <a:r>
-              <a:rPr lang="sv-SE" dirty="0" smtClean="0"/>
-              <a:t> parameters</a:t>
+              <a:t>Bekvämlighetsmetoder:Map</a:t>
             </a:r>
             <a:endParaRPr lang="sv-SE" dirty="0"/>
           </a:p>
@@ -5847,7 +5823,12 @@
             <p:ph idx="1"/>
           </p:nvPr>
         </p:nvSpPr>
-        <p:spPr/>
+        <p:spPr>
+          <a:xfrm>
+            <a:off x="428596" y="1214422"/>
+            <a:ext cx="8229600" cy="4525963"/>
+          </a:xfrm>
+        </p:spPr>
         <p:txBody>
           <a:bodyPr/>
           <a:lstStyle/>
@@ -5861,7 +5842,591 @@
             </a:r>
             <a:r>
               <a:rPr lang="sv-SE" dirty="0" err="1" smtClean="0"/>
-              <a:t>optionalParameters.groovy</a:t>
+              <a:t>MapConveniance.groovy</a:t>
+            </a:r>
+            <a:r>
+              <a:rPr lang="sv-SE" dirty="0" smtClean="0"/>
+              <a:t>]</a:t>
+            </a:r>
+            <a:endParaRPr lang="sv-SE" dirty="0"/>
+          </a:p>
+        </p:txBody>
+      </p:sp>
+    </p:spTree>
+  </p:cSld>
+  <p:clrMapOvr>
+    <a:masterClrMapping/>
+  </p:clrMapOvr>
+</p:sld>
+</file>
+
+<file path=ppt/slides/slide33.xml><?xml version="1.0" encoding="utf-8"?>
+<p:sld xmlns:a="http://schemas.openxmlformats.org/drawingml/2006/main" xmlns:r="http://schemas.openxmlformats.org/officeDocument/2006/relationships" xmlns:p="http://schemas.openxmlformats.org/presentationml/2006/main">
+  <p:cSld>
+    <p:spTree>
+      <p:nvGrpSpPr>
+        <p:cNvPr id="1" name=""/>
+        <p:cNvGrpSpPr/>
+        <p:nvPr/>
+      </p:nvGrpSpPr>
+      <p:grpSpPr>
+        <a:xfrm>
+          <a:off x="0" y="0"/>
+          <a:ext cx="0" cy="0"/>
+          <a:chOff x="0" y="0"/>
+          <a:chExt cx="0" cy="0"/>
+        </a:xfrm>
+      </p:grpSpPr>
+      <p:sp>
+        <p:nvSpPr>
+          <p:cNvPr id="2" name="Rubrik 1"/>
+          <p:cNvSpPr>
+            <a:spLocks noGrp="1"/>
+          </p:cNvSpPr>
+          <p:nvPr>
+            <p:ph type="title"/>
+          </p:nvPr>
+        </p:nvSpPr>
+        <p:spPr/>
+        <p:txBody>
+          <a:bodyPr/>
+          <a:lstStyle/>
+          <a:p>
+            <a:endParaRPr lang="sv-SE" dirty="0"/>
+          </a:p>
+        </p:txBody>
+      </p:sp>
+    </p:spTree>
+  </p:cSld>
+  <p:clrMapOvr>
+    <a:masterClrMapping/>
+  </p:clrMapOvr>
+  <p:timing>
+    <p:tnLst>
+      <p:par>
+        <p:cTn id="1" dur="indefinite" restart="never" nodeType="tmRoot"/>
+      </p:par>
+    </p:tnLst>
+  </p:timing>
+</p:sld>
+</file>
+
+<file path=ppt/slides/slide34.xml><?xml version="1.0" encoding="utf-8"?>
+<p:sld xmlns:a="http://schemas.openxmlformats.org/drawingml/2006/main" xmlns:r="http://schemas.openxmlformats.org/officeDocument/2006/relationships" xmlns:p="http://schemas.openxmlformats.org/presentationml/2006/main">
+  <p:cSld>
+    <p:spTree>
+      <p:nvGrpSpPr>
+        <p:cNvPr id="1" name=""/>
+        <p:cNvGrpSpPr/>
+        <p:nvPr/>
+      </p:nvGrpSpPr>
+      <p:grpSpPr>
+        <a:xfrm>
+          <a:off x="0" y="0"/>
+          <a:ext cx="0" cy="0"/>
+          <a:chOff x="0" y="0"/>
+          <a:chExt cx="0" cy="0"/>
+        </a:xfrm>
+      </p:grpSpPr>
+      <p:sp>
+        <p:nvSpPr>
+          <p:cNvPr id="2" name="Rubrik 1"/>
+          <p:cNvSpPr>
+            <a:spLocks noGrp="1"/>
+          </p:cNvSpPr>
+          <p:nvPr>
+            <p:ph type="title"/>
+          </p:nvPr>
+        </p:nvSpPr>
+        <p:spPr/>
+        <p:txBody>
+          <a:bodyPr/>
+          <a:lstStyle/>
+          <a:p>
+            <a:r>
+              <a:rPr lang="sv-SE" dirty="0" smtClean="0"/>
+              <a:t>Operator </a:t>
+            </a:r>
+            <a:r>
+              <a:rPr lang="sv-SE" dirty="0" err="1" smtClean="0"/>
+              <a:t>overloading</a:t>
+            </a:r>
+            <a:endParaRPr lang="sv-SE" dirty="0"/>
+          </a:p>
+        </p:txBody>
+      </p:sp>
+      <p:sp>
+        <p:nvSpPr>
+          <p:cNvPr id="4" name="Platshållare för innehåll 3"/>
+          <p:cNvSpPr>
+            <a:spLocks noGrp="1"/>
+          </p:cNvSpPr>
+          <p:nvPr>
+            <p:ph idx="1"/>
+          </p:nvPr>
+        </p:nvSpPr>
+        <p:spPr/>
+        <p:txBody>
+          <a:bodyPr/>
+          <a:lstStyle/>
+          <a:p>
+            <a:pPr>
+              <a:buNone/>
+            </a:pPr>
+            <a:r>
+              <a:rPr lang="sv-SE" dirty="0" smtClean="0"/>
+              <a:t>[</a:t>
+            </a:r>
+            <a:r>
+              <a:rPr lang="sv-SE" dirty="0" err="1" smtClean="0"/>
+              <a:t>operatorOverload.groovy</a:t>
+            </a:r>
+            <a:r>
+              <a:rPr lang="sv-SE" dirty="0" smtClean="0"/>
+              <a:t>]</a:t>
+            </a:r>
+            <a:endParaRPr lang="sv-SE" dirty="0"/>
+          </a:p>
+        </p:txBody>
+      </p:sp>
+    </p:spTree>
+  </p:cSld>
+  <p:clrMapOvr>
+    <a:masterClrMapping/>
+  </p:clrMapOvr>
+  <p:timing>
+    <p:tnLst>
+      <p:par>
+        <p:cTn id="1" dur="indefinite" restart="never" nodeType="tmRoot"/>
+      </p:par>
+    </p:tnLst>
+  </p:timing>
+</p:sld>
+</file>
+
+<file path=ppt/slides/slide35.xml><?xml version="1.0" encoding="utf-8"?>
+<p:sld xmlns:a="http://schemas.openxmlformats.org/drawingml/2006/main" xmlns:r="http://schemas.openxmlformats.org/officeDocument/2006/relationships" xmlns:p="http://schemas.openxmlformats.org/presentationml/2006/main">
+  <p:cSld>
+    <p:spTree>
+      <p:nvGrpSpPr>
+        <p:cNvPr id="1" name=""/>
+        <p:cNvGrpSpPr/>
+        <p:nvPr/>
+      </p:nvGrpSpPr>
+      <p:grpSpPr>
+        <a:xfrm>
+          <a:off x="0" y="0"/>
+          <a:ext cx="0" cy="0"/>
+          <a:chOff x="0" y="0"/>
+          <a:chExt cx="0" cy="0"/>
+        </a:xfrm>
+      </p:grpSpPr>
+      <p:sp>
+        <p:nvSpPr>
+          <p:cNvPr id="2" name="Rubrik 1"/>
+          <p:cNvSpPr>
+            <a:spLocks noGrp="1"/>
+          </p:cNvSpPr>
+          <p:nvPr>
+            <p:ph type="title"/>
+          </p:nvPr>
+        </p:nvSpPr>
+        <p:spPr/>
+        <p:txBody>
+          <a:bodyPr/>
+          <a:lstStyle/>
+          <a:p>
+            <a:r>
+              <a:rPr lang="sv-SE" dirty="0" smtClean="0"/>
+              <a:t>Operator </a:t>
+            </a:r>
+            <a:r>
+              <a:rPr lang="sv-SE" dirty="0" err="1" smtClean="0"/>
+              <a:t>overloading</a:t>
+            </a:r>
+            <a:endParaRPr lang="sv-SE" dirty="0"/>
+          </a:p>
+        </p:txBody>
+      </p:sp>
+      <p:sp>
+        <p:nvSpPr>
+          <p:cNvPr id="4" name="Platshållare för innehåll 3"/>
+          <p:cNvSpPr>
+            <a:spLocks noGrp="1"/>
+          </p:cNvSpPr>
+          <p:nvPr>
+            <p:ph idx="1"/>
+          </p:nvPr>
+        </p:nvSpPr>
+        <p:spPr/>
+        <p:txBody>
+          <a:bodyPr/>
+          <a:lstStyle/>
+          <a:p>
+            <a:pPr>
+              <a:buNone/>
+            </a:pPr>
+            <a:r>
+              <a:rPr lang="sv-SE" smtClean="0"/>
+              <a:t>[operatorOverload2.groovy</a:t>
+            </a:r>
+            <a:r>
+              <a:rPr lang="sv-SE" dirty="0" smtClean="0"/>
+              <a:t>]</a:t>
+            </a:r>
+            <a:endParaRPr lang="sv-SE" dirty="0"/>
+          </a:p>
+        </p:txBody>
+      </p:sp>
+    </p:spTree>
+  </p:cSld>
+  <p:clrMapOvr>
+    <a:masterClrMapping/>
+  </p:clrMapOvr>
+  <p:timing>
+    <p:tnLst>
+      <p:par>
+        <p:cTn id="1" dur="indefinite" restart="never" nodeType="tmRoot"/>
+      </p:par>
+    </p:tnLst>
+  </p:timing>
+</p:sld>
+</file>
+
+<file path=ppt/slides/slide36.xml><?xml version="1.0" encoding="utf-8"?>
+<p:sld xmlns:a="http://schemas.openxmlformats.org/drawingml/2006/main" xmlns:r="http://schemas.openxmlformats.org/officeDocument/2006/relationships" xmlns:p="http://schemas.openxmlformats.org/presentationml/2006/main">
+  <p:cSld>
+    <p:spTree>
+      <p:nvGrpSpPr>
+        <p:cNvPr id="1" name=""/>
+        <p:cNvGrpSpPr/>
+        <p:nvPr/>
+      </p:nvGrpSpPr>
+      <p:grpSpPr>
+        <a:xfrm>
+          <a:off x="0" y="0"/>
+          <a:ext cx="0" cy="0"/>
+          <a:chOff x="0" y="0"/>
+          <a:chExt cx="0" cy="0"/>
+        </a:xfrm>
+      </p:grpSpPr>
+      <p:sp>
+        <p:nvSpPr>
+          <p:cNvPr id="2" name="Rubrik 1"/>
+          <p:cNvSpPr>
+            <a:spLocks noGrp="1"/>
+          </p:cNvSpPr>
+          <p:nvPr>
+            <p:ph type="title"/>
+          </p:nvPr>
+        </p:nvSpPr>
+        <p:spPr/>
+        <p:txBody>
+          <a:bodyPr/>
+          <a:lstStyle/>
+          <a:p>
+            <a:r>
+              <a:rPr lang="sv-SE" dirty="0" smtClean="0"/>
+              <a:t>Operator </a:t>
+            </a:r>
+            <a:r>
+              <a:rPr lang="sv-SE" dirty="0" err="1" smtClean="0"/>
+              <a:t>overloading</a:t>
+            </a:r>
+            <a:endParaRPr lang="sv-SE" dirty="0"/>
+          </a:p>
+        </p:txBody>
+      </p:sp>
+      <p:sp>
+        <p:nvSpPr>
+          <p:cNvPr id="3" name="Platshållare för innehåll 2"/>
+          <p:cNvSpPr>
+            <a:spLocks noGrp="1"/>
+          </p:cNvSpPr>
+          <p:nvPr>
+            <p:ph idx="1"/>
+          </p:nvPr>
+        </p:nvSpPr>
+        <p:spPr/>
+        <p:txBody>
+          <a:bodyPr/>
+          <a:lstStyle/>
+          <a:p>
+            <a:pPr>
+              <a:buNone/>
+            </a:pPr>
+            <a:endParaRPr lang="sv-SE" dirty="0"/>
+          </a:p>
+        </p:txBody>
+      </p:sp>
+    </p:spTree>
+  </p:cSld>
+  <p:clrMapOvr>
+    <a:masterClrMapping/>
+  </p:clrMapOvr>
+  <p:timing>
+    <p:tnLst>
+      <p:par>
+        <p:cTn id="1" dur="indefinite" restart="never" nodeType="tmRoot"/>
+      </p:par>
+    </p:tnLst>
+  </p:timing>
+</p:sld>
+</file>
+
+<file path=ppt/slides/slide37.xml><?xml version="1.0" encoding="utf-8"?>
+<p:sld xmlns:a="http://schemas.openxmlformats.org/drawingml/2006/main" xmlns:r="http://schemas.openxmlformats.org/officeDocument/2006/relationships" xmlns:p="http://schemas.openxmlformats.org/presentationml/2006/main">
+  <p:cSld>
+    <p:spTree>
+      <p:nvGrpSpPr>
+        <p:cNvPr id="1" name=""/>
+        <p:cNvGrpSpPr/>
+        <p:nvPr/>
+      </p:nvGrpSpPr>
+      <p:grpSpPr>
+        <a:xfrm>
+          <a:off x="0" y="0"/>
+          <a:ext cx="0" cy="0"/>
+          <a:chOff x="0" y="0"/>
+          <a:chExt cx="0" cy="0"/>
+        </a:xfrm>
+      </p:grpSpPr>
+      <p:sp>
+        <p:nvSpPr>
+          <p:cNvPr id="2" name="Rubrik 1"/>
+          <p:cNvSpPr>
+            <a:spLocks noGrp="1"/>
+          </p:cNvSpPr>
+          <p:nvPr>
+            <p:ph type="title"/>
+          </p:nvPr>
+        </p:nvSpPr>
+        <p:spPr/>
+        <p:txBody>
+          <a:bodyPr/>
+          <a:lstStyle/>
+          <a:p>
+            <a:r>
+              <a:rPr lang="sv-SE" dirty="0" err="1" smtClean="0"/>
+              <a:t>Groovy</a:t>
+            </a:r>
+            <a:r>
+              <a:rPr lang="sv-SE" dirty="0" smtClean="0"/>
+              <a:t> </a:t>
+            </a:r>
+            <a:r>
+              <a:rPr lang="sv-SE" dirty="0" err="1" smtClean="0"/>
+              <a:t>truth</a:t>
+            </a:r>
+            <a:endParaRPr lang="sv-SE" dirty="0"/>
+          </a:p>
+        </p:txBody>
+      </p:sp>
+      <p:sp>
+        <p:nvSpPr>
+          <p:cNvPr id="3" name="Platshållare för innehåll 2"/>
+          <p:cNvSpPr>
+            <a:spLocks noGrp="1"/>
+          </p:cNvSpPr>
+          <p:nvPr>
+            <p:ph idx="1"/>
+          </p:nvPr>
+        </p:nvSpPr>
+        <p:spPr/>
+        <p:txBody>
+          <a:bodyPr/>
+          <a:lstStyle/>
+          <a:p>
+            <a:pPr>
+              <a:buNone/>
+            </a:pPr>
+            <a:r>
+              <a:rPr lang="sv-SE" dirty="0" smtClean="0"/>
+              <a:t>[</a:t>
+            </a:r>
+            <a:r>
+              <a:rPr lang="sv-SE" dirty="0" err="1" smtClean="0"/>
+              <a:t>TestGroovyTruth.groovy</a:t>
+            </a:r>
+            <a:r>
+              <a:rPr lang="sv-SE" dirty="0" smtClean="0"/>
+              <a:t>]</a:t>
+            </a:r>
+            <a:endParaRPr lang="sv-SE" dirty="0"/>
+          </a:p>
+        </p:txBody>
+      </p:sp>
+    </p:spTree>
+  </p:cSld>
+  <p:clrMapOvr>
+    <a:masterClrMapping/>
+  </p:clrMapOvr>
+</p:sld>
+</file>
+
+<file path=ppt/slides/slide38.xml><?xml version="1.0" encoding="utf-8"?>
+<p:sld xmlns:a="http://schemas.openxmlformats.org/drawingml/2006/main" xmlns:r="http://schemas.openxmlformats.org/officeDocument/2006/relationships" xmlns:p="http://schemas.openxmlformats.org/presentationml/2006/main">
+  <p:cSld>
+    <p:spTree>
+      <p:nvGrpSpPr>
+        <p:cNvPr id="1" name=""/>
+        <p:cNvGrpSpPr/>
+        <p:nvPr/>
+      </p:nvGrpSpPr>
+      <p:grpSpPr>
+        <a:xfrm>
+          <a:off x="0" y="0"/>
+          <a:ext cx="0" cy="0"/>
+          <a:chOff x="0" y="0"/>
+          <a:chExt cx="0" cy="0"/>
+        </a:xfrm>
+      </p:grpSpPr>
+      <p:sp>
+        <p:nvSpPr>
+          <p:cNvPr id="2" name="Rubrik 1"/>
+          <p:cNvSpPr>
+            <a:spLocks noGrp="1"/>
+          </p:cNvSpPr>
+          <p:nvPr>
+            <p:ph type="title"/>
+          </p:nvPr>
+        </p:nvSpPr>
+        <p:spPr/>
+        <p:txBody>
+          <a:bodyPr/>
+          <a:lstStyle/>
+          <a:p>
+            <a:r>
+              <a:rPr lang="sv-SE" dirty="0" err="1" smtClean="0"/>
+              <a:t>Groovy</a:t>
+            </a:r>
+            <a:r>
+              <a:rPr lang="sv-SE" dirty="0" smtClean="0"/>
+              <a:t> </a:t>
+            </a:r>
+            <a:r>
+              <a:rPr lang="sv-SE" dirty="0" err="1" smtClean="0"/>
+              <a:t>truth</a:t>
+            </a:r>
+            <a:endParaRPr lang="sv-SE" dirty="0"/>
+          </a:p>
+        </p:txBody>
+      </p:sp>
+      <p:sp>
+        <p:nvSpPr>
+          <p:cNvPr id="3" name="Platshållare för innehåll 2"/>
+          <p:cNvSpPr>
+            <a:spLocks noGrp="1"/>
+          </p:cNvSpPr>
+          <p:nvPr>
+            <p:ph idx="1"/>
+          </p:nvPr>
+        </p:nvSpPr>
+        <p:spPr/>
+        <p:txBody>
+          <a:bodyPr/>
+          <a:lstStyle/>
+          <a:p>
+            <a:pPr>
+              <a:buNone/>
+            </a:pPr>
+            <a:r>
+              <a:rPr lang="sv-SE" dirty="0" smtClean="0"/>
+              <a:t>[</a:t>
+            </a:r>
+            <a:r>
+              <a:rPr lang="sv-SE" dirty="0" err="1" smtClean="0"/>
+              <a:t>HelloWorldWithParameters.java</a:t>
+            </a:r>
+            <a:r>
+              <a:rPr lang="sv-SE" dirty="0" smtClean="0"/>
+              <a:t>]</a:t>
+            </a:r>
+            <a:endParaRPr lang="sv-SE" dirty="0"/>
+          </a:p>
+        </p:txBody>
+      </p:sp>
+    </p:spTree>
+  </p:cSld>
+  <p:clrMapOvr>
+    <a:masterClrMapping/>
+  </p:clrMapOvr>
+</p:sld>
+</file>
+
+<file path=ppt/slides/slide39.xml><?xml version="1.0" encoding="utf-8"?>
+<p:sld xmlns:a="http://schemas.openxmlformats.org/drawingml/2006/main" xmlns:r="http://schemas.openxmlformats.org/officeDocument/2006/relationships" xmlns:p="http://schemas.openxmlformats.org/presentationml/2006/main">
+  <p:cSld>
+    <p:spTree>
+      <p:nvGrpSpPr>
+        <p:cNvPr id="1" name=""/>
+        <p:cNvGrpSpPr/>
+        <p:nvPr/>
+      </p:nvGrpSpPr>
+      <p:grpSpPr>
+        <a:xfrm>
+          <a:off x="0" y="0"/>
+          <a:ext cx="0" cy="0"/>
+          <a:chOff x="0" y="0"/>
+          <a:chExt cx="0" cy="0"/>
+        </a:xfrm>
+      </p:grpSpPr>
+      <p:sp>
+        <p:nvSpPr>
+          <p:cNvPr id="2" name="Rubrik 1"/>
+          <p:cNvSpPr>
+            <a:spLocks noGrp="1"/>
+          </p:cNvSpPr>
+          <p:nvPr>
+            <p:ph type="title"/>
+          </p:nvPr>
+        </p:nvSpPr>
+        <p:spPr/>
+        <p:txBody>
+          <a:bodyPr/>
+          <a:lstStyle/>
+          <a:p>
+            <a:r>
+              <a:rPr lang="sv-SE" dirty="0" err="1" smtClean="0"/>
+              <a:t>Groovy</a:t>
+            </a:r>
+            <a:r>
+              <a:rPr lang="sv-SE" dirty="0" smtClean="0"/>
+              <a:t> </a:t>
+            </a:r>
+            <a:r>
+              <a:rPr lang="sv-SE" dirty="0" err="1" smtClean="0"/>
+              <a:t>truth</a:t>
+            </a:r>
+            <a:endParaRPr lang="sv-SE" dirty="0"/>
+          </a:p>
+        </p:txBody>
+      </p:sp>
+      <p:sp>
+        <p:nvSpPr>
+          <p:cNvPr id="3" name="Platshållare för innehåll 2"/>
+          <p:cNvSpPr>
+            <a:spLocks noGrp="1"/>
+          </p:cNvSpPr>
+          <p:nvPr>
+            <p:ph idx="1"/>
+          </p:nvPr>
+        </p:nvSpPr>
+        <p:spPr/>
+        <p:txBody>
+          <a:bodyPr/>
+          <a:lstStyle/>
+          <a:p>
+            <a:pPr>
+              <a:buNone/>
+            </a:pPr>
+            <a:r>
+              <a:rPr lang="sv-SE" dirty="0" smtClean="0"/>
+              <a:t>[</a:t>
+            </a:r>
+            <a:r>
+              <a:rPr lang="sv-SE" dirty="0" err="1" smtClean="0"/>
+              <a:t>helloWorldWithParameters.groovy</a:t>
             </a:r>
             <a:r>
               <a:rPr lang="sv-SE" dirty="0" smtClean="0"/>
@@ -5962,6 +6527,178 @@
 </p:sld>
 </file>
 
+<file path=ppt/slides/slide40.xml><?xml version="1.0" encoding="utf-8"?>
+<p:sld xmlns:a="http://schemas.openxmlformats.org/drawingml/2006/main" xmlns:r="http://schemas.openxmlformats.org/officeDocument/2006/relationships" xmlns:p="http://schemas.openxmlformats.org/presentationml/2006/main">
+  <p:cSld>
+    <p:spTree>
+      <p:nvGrpSpPr>
+        <p:cNvPr id="1" name=""/>
+        <p:cNvGrpSpPr/>
+        <p:nvPr/>
+      </p:nvGrpSpPr>
+      <p:grpSpPr>
+        <a:xfrm>
+          <a:off x="0" y="0"/>
+          <a:ext cx="0" cy="0"/>
+          <a:chOff x="0" y="0"/>
+          <a:chExt cx="0" cy="0"/>
+        </a:xfrm>
+      </p:grpSpPr>
+      <p:sp>
+        <p:nvSpPr>
+          <p:cNvPr id="2" name="Rubrik 1"/>
+          <p:cNvSpPr>
+            <a:spLocks noGrp="1"/>
+          </p:cNvSpPr>
+          <p:nvPr>
+            <p:ph type="title"/>
+          </p:nvPr>
+        </p:nvSpPr>
+        <p:spPr/>
+        <p:txBody>
+          <a:bodyPr/>
+          <a:lstStyle/>
+          <a:p>
+            <a:r>
+              <a:rPr lang="sv-SE" dirty="0" err="1" smtClean="0"/>
+              <a:t>Optional</a:t>
+            </a:r>
+            <a:r>
+              <a:rPr lang="sv-SE" dirty="0" smtClean="0"/>
+              <a:t> parameters</a:t>
+            </a:r>
+            <a:endParaRPr lang="sv-SE" dirty="0"/>
+          </a:p>
+        </p:txBody>
+      </p:sp>
+      <p:sp>
+        <p:nvSpPr>
+          <p:cNvPr id="3" name="Platshållare för innehåll 2"/>
+          <p:cNvSpPr>
+            <a:spLocks noGrp="1"/>
+          </p:cNvSpPr>
+          <p:nvPr>
+            <p:ph idx="1"/>
+          </p:nvPr>
+        </p:nvSpPr>
+        <p:spPr/>
+        <p:txBody>
+          <a:bodyPr/>
+          <a:lstStyle/>
+          <a:p>
+            <a:pPr>
+              <a:buNone/>
+            </a:pPr>
+            <a:r>
+              <a:rPr lang="sv-SE" dirty="0" smtClean="0"/>
+              <a:t>[</a:t>
+            </a:r>
+            <a:r>
+              <a:rPr lang="sv-SE" dirty="0" err="1" smtClean="0"/>
+              <a:t>optionalParameters.java</a:t>
+            </a:r>
+            <a:r>
+              <a:rPr lang="sv-SE" dirty="0" smtClean="0"/>
+              <a:t>]</a:t>
+            </a:r>
+            <a:endParaRPr lang="sv-SE" dirty="0"/>
+          </a:p>
+        </p:txBody>
+      </p:sp>
+    </p:spTree>
+  </p:cSld>
+  <p:clrMapOvr>
+    <a:masterClrMapping/>
+  </p:clrMapOvr>
+</p:sld>
+</file>
+
+<file path=ppt/slides/slide41.xml><?xml version="1.0" encoding="utf-8"?>
+<p:sld xmlns:a="http://schemas.openxmlformats.org/drawingml/2006/main" xmlns:r="http://schemas.openxmlformats.org/officeDocument/2006/relationships" xmlns:p="http://schemas.openxmlformats.org/presentationml/2006/main">
+  <p:cSld>
+    <p:spTree>
+      <p:nvGrpSpPr>
+        <p:cNvPr id="1" name=""/>
+        <p:cNvGrpSpPr/>
+        <p:nvPr/>
+      </p:nvGrpSpPr>
+      <p:grpSpPr>
+        <a:xfrm>
+          <a:off x="0" y="0"/>
+          <a:ext cx="0" cy="0"/>
+          <a:chOff x="0" y="0"/>
+          <a:chExt cx="0" cy="0"/>
+        </a:xfrm>
+      </p:grpSpPr>
+      <p:sp>
+        <p:nvSpPr>
+          <p:cNvPr id="2" name="Rubrik 1"/>
+          <p:cNvSpPr>
+            <a:spLocks noGrp="1"/>
+          </p:cNvSpPr>
+          <p:nvPr>
+            <p:ph type="title"/>
+          </p:nvPr>
+        </p:nvSpPr>
+        <p:spPr/>
+        <p:txBody>
+          <a:bodyPr/>
+          <a:lstStyle/>
+          <a:p>
+            <a:r>
+              <a:rPr lang="sv-SE" dirty="0" err="1" smtClean="0"/>
+              <a:t>Optional</a:t>
+            </a:r>
+            <a:r>
+              <a:rPr lang="sv-SE" dirty="0" smtClean="0"/>
+              <a:t> parameters</a:t>
+            </a:r>
+            <a:endParaRPr lang="sv-SE" dirty="0"/>
+          </a:p>
+        </p:txBody>
+      </p:sp>
+      <p:sp>
+        <p:nvSpPr>
+          <p:cNvPr id="3" name="Platshållare för innehåll 2"/>
+          <p:cNvSpPr>
+            <a:spLocks noGrp="1"/>
+          </p:cNvSpPr>
+          <p:nvPr>
+            <p:ph idx="1"/>
+          </p:nvPr>
+        </p:nvSpPr>
+        <p:spPr/>
+        <p:txBody>
+          <a:bodyPr/>
+          <a:lstStyle/>
+          <a:p>
+            <a:pPr>
+              <a:buNone/>
+            </a:pPr>
+            <a:r>
+              <a:rPr lang="sv-SE" dirty="0" smtClean="0"/>
+              <a:t>[</a:t>
+            </a:r>
+            <a:r>
+              <a:rPr lang="sv-SE" dirty="0" err="1" smtClean="0"/>
+              <a:t>optionalParameters.groovy</a:t>
+            </a:r>
+            <a:r>
+              <a:rPr lang="sv-SE" dirty="0" smtClean="0"/>
+              <a:t>]</a:t>
+            </a:r>
+            <a:endParaRPr lang="sv-SE" dirty="0"/>
+          </a:p>
+        </p:txBody>
+      </p:sp>
+    </p:spTree>
+  </p:cSld>
+  <p:clrMapOvr>
+    <a:masterClrMapping/>
+  </p:clrMapOvr>
+</p:sld>
+</file>
+
 <file path=ppt/slides/slide5.xml><?xml version="1.0" encoding="utf-8"?>
 <p:sld xmlns:a="http://schemas.openxmlformats.org/drawingml/2006/main" xmlns:r="http://schemas.openxmlformats.org/officeDocument/2006/relationships" xmlns:p="http://schemas.openxmlformats.org/presentationml/2006/main">
   <p:cSld>
@@ -5996,11 +6733,7 @@
           <a:p>
             <a:r>
               <a:rPr lang="sv-SE" dirty="0" smtClean="0"/>
-              <a:t>Fördelar med dynamiska </a:t>
-            </a:r>
-            <a:r>
-              <a:rPr lang="sv-SE" dirty="0" smtClean="0"/>
-              <a:t>språk</a:t>
+              <a:t>Fördelar med dynamiska språk</a:t>
             </a:r>
             <a:endParaRPr lang="sv-SE" dirty="0"/>
           </a:p>
@@ -6029,16 +6762,11 @@
               <a:rPr lang="sv-SE" dirty="0" smtClean="0"/>
               <a:t> </a:t>
             </a:r>
-            <a:endParaRPr lang="sv-SE" dirty="0" smtClean="0"/>
-          </a:p>
-          <a:p>
-            <a:r>
-              <a:rPr lang="sv-SE" dirty="0" smtClean="0"/>
-              <a:t>Möjlighet att ändra hur språket </a:t>
-            </a:r>
-            <a:r>
-              <a:rPr lang="sv-SE" dirty="0" smtClean="0"/>
-              <a:t>fungerar (</a:t>
+          </a:p>
+          <a:p>
+            <a:r>
+              <a:rPr lang="sv-SE" dirty="0" smtClean="0"/>
+              <a:t>Möjlighet att ändra hur språket fungerar (</a:t>
             </a:r>
             <a:r>
               <a:rPr lang="sv-SE" dirty="0" err="1" smtClean="0"/>
@@ -6048,7 +6776,6 @@
               <a:rPr lang="sv-SE" dirty="0" smtClean="0"/>
               <a:t>)</a:t>
             </a:r>
-            <a:endParaRPr lang="sv-SE" dirty="0" smtClean="0"/>
           </a:p>
           <a:p>
             <a:r>
@@ -6168,7 +6895,6 @@
               <a:rPr lang="sv-SE" dirty="0" smtClean="0"/>
               <a:t> där kodblocket skapades</a:t>
             </a:r>
-            <a:endParaRPr lang="sv-SE" dirty="0" smtClean="0"/>
           </a:p>
           <a:p>
             <a:r>
@@ -6401,15 +7127,7 @@
           <a:p>
             <a:r>
               <a:rPr lang="sv-SE" dirty="0" smtClean="0"/>
-              <a:t>Java, C, </a:t>
-            </a:r>
-            <a:r>
-              <a:rPr lang="sv-SE" dirty="0" smtClean="0"/>
-              <a:t>Ruby</a:t>
-            </a:r>
-            <a:r>
-              <a:rPr lang="sv-SE" dirty="0" smtClean="0"/>
-              <a:t>, </a:t>
+              <a:t>Java, C, Ruby, </a:t>
             </a:r>
             <a:r>
               <a:rPr lang="sv-SE" dirty="0" err="1" smtClean="0"/>
@@ -6539,30 +7257,20 @@
           <a:p>
             <a:r>
               <a:rPr lang="sv-SE" dirty="0" smtClean="0"/>
-              <a:t>Går </a:t>
-            </a:r>
-            <a:r>
-              <a:rPr lang="sv-SE" dirty="0" smtClean="0"/>
-              <a:t>snabbare att utveckla i ett språk som ligger nära problemdomänen</a:t>
-            </a:r>
-          </a:p>
-          <a:p>
-            <a:r>
-              <a:rPr lang="sv-SE" dirty="0" smtClean="0"/>
-              <a:t>Lätt att kommunicera med beställare och </a:t>
-            </a:r>
-            <a:r>
-              <a:rPr lang="sv-SE" dirty="0" smtClean="0"/>
-              <a:t>användare</a:t>
-            </a:r>
-            <a:endParaRPr lang="sv-SE" dirty="0" smtClean="0"/>
+              <a:t>Går snabbare att utveckla i ett språk som ligger nära problemdomänen</a:t>
+            </a:r>
+          </a:p>
+          <a:p>
+            <a:r>
+              <a:rPr lang="sv-SE" dirty="0" smtClean="0"/>
+              <a:t>Lätt att kommunicera med beställare och användare</a:t>
+            </a:r>
           </a:p>
           <a:p>
             <a:r>
               <a:rPr lang="sv-SE" dirty="0" smtClean="0"/>
               <a:t>Koden läsbar även för icke-programmerare</a:t>
             </a:r>
-            <a:endParaRPr lang="sv-SE" dirty="0" smtClean="0"/>
           </a:p>
           <a:p>
             <a:endParaRPr lang="sv-SE" dirty="0" smtClean="0"/>

</xml_diff>

<commit_message>
lagt till filläsning i java
</commit_message>
<xml_diff>
--- a/groovyseminarie/dokument/groovyseminarium_source.pptx
+++ b/groovyseminarie/dokument/groovyseminarium_source.pptx
@@ -24,28 +24,30 @@
     <p:sldId id="276" r:id="rId18"/>
     <p:sldId id="275" r:id="rId19"/>
     <p:sldId id="273" r:id="rId20"/>
-    <p:sldId id="283" r:id="rId21"/>
-    <p:sldId id="284" r:id="rId22"/>
-    <p:sldId id="285" r:id="rId23"/>
-    <p:sldId id="296" r:id="rId24"/>
-    <p:sldId id="286" r:id="rId25"/>
-    <p:sldId id="287" r:id="rId26"/>
-    <p:sldId id="288" r:id="rId27"/>
-    <p:sldId id="297" r:id="rId28"/>
-    <p:sldId id="291" r:id="rId29"/>
-    <p:sldId id="298" r:id="rId30"/>
-    <p:sldId id="299" r:id="rId31"/>
-    <p:sldId id="300" r:id="rId32"/>
-    <p:sldId id="301" r:id="rId33"/>
-    <p:sldId id="302" r:id="rId34"/>
-    <p:sldId id="303" r:id="rId35"/>
-    <p:sldId id="304" r:id="rId36"/>
-    <p:sldId id="295" r:id="rId37"/>
-    <p:sldId id="294" r:id="rId38"/>
-    <p:sldId id="292" r:id="rId39"/>
-    <p:sldId id="293" r:id="rId40"/>
-    <p:sldId id="289" r:id="rId41"/>
-    <p:sldId id="290" r:id="rId42"/>
+    <p:sldId id="305" r:id="rId21"/>
+    <p:sldId id="307" r:id="rId22"/>
+    <p:sldId id="308" r:id="rId23"/>
+    <p:sldId id="306" r:id="rId24"/>
+    <p:sldId id="283" r:id="rId25"/>
+    <p:sldId id="284" r:id="rId26"/>
+    <p:sldId id="285" r:id="rId27"/>
+    <p:sldId id="296" r:id="rId28"/>
+    <p:sldId id="286" r:id="rId29"/>
+    <p:sldId id="287" r:id="rId30"/>
+    <p:sldId id="288" r:id="rId31"/>
+    <p:sldId id="297" r:id="rId32"/>
+    <p:sldId id="291" r:id="rId33"/>
+    <p:sldId id="298" r:id="rId34"/>
+    <p:sldId id="299" r:id="rId35"/>
+    <p:sldId id="300" r:id="rId36"/>
+    <p:sldId id="301" r:id="rId37"/>
+    <p:sldId id="303" r:id="rId38"/>
+    <p:sldId id="304" r:id="rId39"/>
+    <p:sldId id="292" r:id="rId40"/>
+    <p:sldId id="293" r:id="rId41"/>
+    <p:sldId id="294" r:id="rId42"/>
+    <p:sldId id="289" r:id="rId43"/>
+    <p:sldId id="290" r:id="rId44"/>
   </p:sldIdLst>
   <p:sldSz cx="9144000" cy="6858000" type="screen4x3"/>
   <p:notesSz cx="6858000" cy="9144000"/>
@@ -4671,7 +4673,12 @@
             <p:ph idx="1"/>
           </p:nvPr>
         </p:nvSpPr>
-        <p:spPr/>
+        <p:spPr>
+          <a:xfrm>
+            <a:off x="457200" y="1600201"/>
+            <a:ext cx="8229600" cy="1114420"/>
+          </a:xfrm>
+        </p:spPr>
         <p:txBody>
           <a:bodyPr/>
           <a:lstStyle/>
@@ -4685,13 +4692,80 @@
             </a:r>
             <a:r>
               <a:rPr lang="sv-SE" dirty="0" err="1" smtClean="0"/>
-              <a:t>helloWorld.groovy</a:t>
+              <a:t>helloWorld.java</a:t>
             </a:r>
             <a:r>
               <a:rPr lang="sv-SE" dirty="0" smtClean="0"/>
               <a:t>]</a:t>
             </a:r>
             <a:endParaRPr lang="sv-SE" dirty="0"/>
+          </a:p>
+        </p:txBody>
+      </p:sp>
+      <p:sp>
+        <p:nvSpPr>
+          <p:cNvPr id="4" name="Platshållare för innehåll 2"/>
+          <p:cNvSpPr txBox="1">
+            <a:spLocks/>
+          </p:cNvSpPr>
+          <p:nvPr/>
+        </p:nvSpPr>
+        <p:spPr>
+          <a:xfrm>
+            <a:off x="500034" y="3714752"/>
+            <a:ext cx="8229600" cy="1114420"/>
+          </a:xfrm>
+          <a:prstGeom prst="rect">
+            <a:avLst/>
+          </a:prstGeom>
+        </p:spPr>
+        <p:txBody>
+          <a:bodyPr vert="horz" lIns="91440" tIns="45720" rIns="91440" bIns="45720" rtlCol="0">
+            <a:normAutofit lnSpcReduction="10000"/>
+          </a:bodyPr>
+          <a:lstStyle/>
+          <a:p>
+            <a:pPr marL="342900" indent="-342900">
+              <a:spcBef>
+                <a:spcPct val="20000"/>
+              </a:spcBef>
+            </a:pPr>
+            <a:r>
+              <a:rPr lang="sv-SE" sz="3200" dirty="0" smtClean="0"/>
+              <a:t>Utmaning: Hur </a:t>
+            </a:r>
+            <a:r>
+              <a:rPr lang="sv-SE" sz="3200" dirty="0" smtClean="0"/>
+              <a:t>läser man </a:t>
+            </a:r>
+            <a:r>
+              <a:rPr lang="sv-SE" sz="3200" dirty="0" smtClean="0"/>
+              <a:t>en fil i Java?</a:t>
+            </a:r>
+            <a:endParaRPr lang="sv-SE" sz="3200" dirty="0" smtClean="0"/>
+          </a:p>
+          <a:p>
+            <a:pPr marL="342900" marR="0" lvl="0" indent="-342900" algn="l" defTabSz="914400" rtl="0" eaLnBrk="1" fontAlgn="auto" latinLnBrk="0" hangingPunct="1">
+              <a:lnSpc>
+                <a:spcPct val="100000"/>
+              </a:lnSpc>
+              <a:spcBef>
+                <a:spcPct val="20000"/>
+              </a:spcBef>
+              <a:spcAft>
+                <a:spcPts val="0"/>
+              </a:spcAft>
+              <a:buClrTx/>
+              <a:buSzTx/>
+              <a:buFont typeface="Arial" pitchFamily="34" charset="0"/>
+              <a:buNone/>
+              <a:tabLst/>
+              <a:defRPr/>
+            </a:pPr>
+            <a:r>
+              <a:rPr lang="sv-SE" sz="3200" dirty="0" smtClean="0"/>
+              <a:t> </a:t>
+            </a:r>
           </a:p>
         </p:txBody>
       </p:sp>
@@ -4736,12 +4810,8 @@
           <a:lstStyle/>
           <a:p>
             <a:r>
-              <a:rPr lang="sv-SE" dirty="0" err="1" smtClean="0"/>
-              <a:t>Exceptions</a:t>
-            </a:r>
-            <a:r>
-              <a:rPr lang="sv-SE" dirty="0" smtClean="0"/>
-              <a:t> i java</a:t>
+              <a:rPr lang="sv-SE" dirty="0" smtClean="0"/>
+              <a:t>Läsa fil i Java 1.4</a:t>
             </a:r>
             <a:endParaRPr lang="sv-SE" dirty="0"/>
           </a:p>
@@ -4767,15 +4837,7 @@
             </a:pPr>
             <a:r>
               <a:rPr lang="sv-SE" dirty="0" smtClean="0"/>
-              <a:t>[</a:t>
-            </a:r>
-            <a:r>
-              <a:rPr lang="sv-SE" dirty="0" err="1" smtClean="0"/>
-              <a:t>Exceptions.java</a:t>
-            </a:r>
-            <a:r>
-              <a:rPr lang="sv-SE" dirty="0" smtClean="0"/>
-              <a:t>]</a:t>
+              <a:t>[ReadFileJava14.java]</a:t>
             </a:r>
             <a:endParaRPr lang="sv-SE" dirty="0"/>
           </a:p>
@@ -4822,16 +4884,8 @@
           <a:lstStyle/>
           <a:p>
             <a:r>
-              <a:rPr lang="sv-SE" dirty="0" err="1" smtClean="0"/>
-              <a:t>Exceptions</a:t>
-            </a:r>
-            <a:r>
-              <a:rPr lang="sv-SE" dirty="0" smtClean="0"/>
-              <a:t> i </a:t>
-            </a:r>
-            <a:r>
-              <a:rPr lang="sv-SE" dirty="0" err="1" smtClean="0"/>
-              <a:t>Groovy</a:t>
+              <a:rPr lang="sv-SE" dirty="0" smtClean="0"/>
+              <a:t>Läsa fil i Java 5</a:t>
             </a:r>
             <a:endParaRPr lang="sv-SE" dirty="0"/>
           </a:p>
@@ -4856,12 +4910,8 @@
               <a:buNone/>
             </a:pPr>
             <a:r>
-              <a:rPr lang="sv-SE" dirty="0" smtClean="0"/>
-              <a:t>[</a:t>
-            </a:r>
-            <a:r>
-              <a:rPr lang="sv-SE" dirty="0" err="1" smtClean="0"/>
-              <a:t>Exceptions.groovy</a:t>
+              <a:rPr lang="sv-SE" smtClean="0"/>
+              <a:t>[ReadFileJava5.java</a:t>
             </a:r>
             <a:r>
               <a:rPr lang="sv-SE" dirty="0" smtClean="0"/>
@@ -4911,11 +4961,7 @@
           <a:bodyPr/>
           <a:lstStyle/>
           <a:p>
-            <a:r>
-              <a:rPr lang="sv-SE" dirty="0" smtClean="0"/>
-              <a:t>Dynamisk/frivillig typning</a:t>
-            </a:r>
-            <a:endParaRPr lang="sv-SE" dirty="0"/>
+            <a:endParaRPr lang="sv-SE"/>
           </a:p>
         </p:txBody>
       </p:sp>
@@ -4934,20 +4980,9 @@
           <a:bodyPr/>
           <a:lstStyle/>
           <a:p>
-            <a:pPr>
-              <a:buNone/>
-            </a:pPr>
-            <a:r>
-              <a:rPr lang="sv-SE" dirty="0" smtClean="0"/>
-              <a:t>[</a:t>
-            </a:r>
-            <a:r>
-              <a:rPr lang="sv-SE" dirty="0" err="1" smtClean="0"/>
-              <a:t>optionalTyping.groovy</a:t>
-            </a:r>
-            <a:r>
-              <a:rPr lang="sv-SE" dirty="0" smtClean="0"/>
-              <a:t>]</a:t>
+            <a:r>
+              <a:rPr lang="sv-SE" dirty="0" smtClean="0"/>
+              <a:t>Hur läser man från en fil</a:t>
             </a:r>
             <a:endParaRPr lang="sv-SE" dirty="0"/>
           </a:p>
@@ -4991,21 +5026,13 @@
         <p:spPr/>
         <p:txBody>
           <a:bodyPr>
-            <a:normAutofit/>
+            <a:normAutofit fontScale="90000"/>
           </a:bodyPr>
           <a:lstStyle/>
           <a:p>
             <a:r>
               <a:rPr lang="sv-SE" dirty="0" smtClean="0"/>
-              <a:t>Hantera </a:t>
-            </a:r>
-            <a:r>
-              <a:rPr lang="sv-SE" dirty="0" err="1" smtClean="0"/>
-              <a:t>null</a:t>
-            </a:r>
-            <a:r>
-              <a:rPr lang="sv-SE" dirty="0" smtClean="0"/>
-              <a:t> i Java</a:t>
+              <a:t>Utökar JDK för att förenkla utveckling</a:t>
             </a:r>
             <a:endParaRPr lang="sv-SE" dirty="0"/>
           </a:p>
@@ -5035,7 +5062,7 @@
             </a:r>
             <a:r>
               <a:rPr lang="sv-SE" dirty="0" err="1" smtClean="0"/>
-              <a:t>Nullsafe.java</a:t>
+              <a:t>helloWorld.groovy</a:t>
             </a:r>
             <a:r>
               <a:rPr lang="sv-SE" dirty="0" smtClean="0"/>
@@ -5082,26 +5109,16 @@
         </p:nvSpPr>
         <p:spPr/>
         <p:txBody>
-          <a:bodyPr>
-            <a:normAutofit/>
-          </a:bodyPr>
-          <a:lstStyle/>
-          <a:p>
-            <a:r>
-              <a:rPr lang="sv-SE" dirty="0" smtClean="0"/>
-              <a:t>Hantera </a:t>
-            </a:r>
-            <a:r>
-              <a:rPr lang="sv-SE" dirty="0" err="1" smtClean="0"/>
-              <a:t>null</a:t>
-            </a:r>
-            <a:r>
-              <a:rPr lang="sv-SE" dirty="0" smtClean="0"/>
-              <a:t> i </a:t>
-            </a:r>
-            <a:r>
-              <a:rPr lang="sv-SE" dirty="0" err="1" smtClean="0"/>
-              <a:t>Groovy</a:t>
+          <a:bodyPr/>
+          <a:lstStyle/>
+          <a:p>
+            <a:r>
+              <a:rPr lang="sv-SE" dirty="0" err="1" smtClean="0"/>
+              <a:t>Exceptions</a:t>
+            </a:r>
+            <a:r>
+              <a:rPr lang="sv-SE" dirty="0" smtClean="0"/>
+              <a:t> i java</a:t>
             </a:r>
             <a:endParaRPr lang="sv-SE" dirty="0"/>
           </a:p>
@@ -5131,7 +5148,7 @@
             </a:r>
             <a:r>
               <a:rPr lang="sv-SE" dirty="0" err="1" smtClean="0"/>
-              <a:t>Nullsafe.groovy</a:t>
+              <a:t>Exceptions.java</a:t>
             </a:r>
             <a:r>
               <a:rPr lang="sv-SE" dirty="0" smtClean="0"/>
@@ -5182,8 +5199,16 @@
           <a:lstStyle/>
           <a:p>
             <a:r>
-              <a:rPr lang="sv-SE" dirty="0" smtClean="0"/>
-              <a:t>Getters/setters i Java</a:t>
+              <a:rPr lang="sv-SE" dirty="0" err="1" smtClean="0"/>
+              <a:t>Exceptions</a:t>
+            </a:r>
+            <a:r>
+              <a:rPr lang="sv-SE" dirty="0" smtClean="0"/>
+              <a:t> i </a:t>
+            </a:r>
+            <a:r>
+              <a:rPr lang="sv-SE" dirty="0" err="1" smtClean="0"/>
+              <a:t>Groovy</a:t>
             </a:r>
             <a:endParaRPr lang="sv-SE" dirty="0"/>
           </a:p>
@@ -5213,7 +5238,7 @@
             </a:r>
             <a:r>
               <a:rPr lang="sv-SE" dirty="0" err="1" smtClean="0"/>
-              <a:t>ClassWithGettersSetters.java</a:t>
+              <a:t>Exceptions.groovy</a:t>
             </a:r>
             <a:r>
               <a:rPr lang="sv-SE" dirty="0" smtClean="0"/>
@@ -5265,11 +5290,7 @@
           <a:p>
             <a:r>
               <a:rPr lang="sv-SE" dirty="0" smtClean="0"/>
-              <a:t>Getters/setters i </a:t>
-            </a:r>
-            <a:r>
-              <a:rPr lang="sv-SE" dirty="0" err="1" smtClean="0"/>
-              <a:t>Groovy</a:t>
+              <a:t>Dynamisk/frivillig typning</a:t>
             </a:r>
             <a:endParaRPr lang="sv-SE" dirty="0"/>
           </a:p>
@@ -5299,7 +5320,7 @@
             </a:r>
             <a:r>
               <a:rPr lang="sv-SE" dirty="0" err="1" smtClean="0"/>
-              <a:t>ClassWithGettersSetters.groovy</a:t>
+              <a:t>optionalTyping.groovy</a:t>
             </a:r>
             <a:r>
               <a:rPr lang="sv-SE" dirty="0" smtClean="0"/>
@@ -5346,16 +5367,18 @@
         </p:nvSpPr>
         <p:spPr/>
         <p:txBody>
-          <a:bodyPr/>
-          <a:lstStyle/>
-          <a:p>
-            <a:r>
-              <a:rPr lang="sv-SE" dirty="0" smtClean="0"/>
-              <a:t>Default </a:t>
-            </a:r>
-            <a:r>
-              <a:rPr lang="sv-SE" dirty="0" err="1" smtClean="0"/>
-              <a:t>konstruktor</a:t>
+          <a:bodyPr>
+            <a:normAutofit/>
+          </a:bodyPr>
+          <a:lstStyle/>
+          <a:p>
+            <a:r>
+              <a:rPr lang="sv-SE" dirty="0" smtClean="0"/>
+              <a:t>Hantera </a:t>
+            </a:r>
+            <a:r>
+              <a:rPr lang="sv-SE" dirty="0" err="1" smtClean="0"/>
+              <a:t>null</a:t>
             </a:r>
             <a:r>
               <a:rPr lang="sv-SE" dirty="0" smtClean="0"/>
@@ -5389,7 +5412,7 @@
             </a:r>
             <a:r>
               <a:rPr lang="sv-SE" dirty="0" err="1" smtClean="0"/>
-              <a:t>UsingDefaultConstructor.java</a:t>
+              <a:t>Nullsafe.java</a:t>
             </a:r>
             <a:r>
               <a:rPr lang="sv-SE" dirty="0" smtClean="0"/>
@@ -5436,16 +5459,18 @@
         </p:nvSpPr>
         <p:spPr/>
         <p:txBody>
-          <a:bodyPr/>
-          <a:lstStyle/>
-          <a:p>
-            <a:r>
-              <a:rPr lang="sv-SE" dirty="0" smtClean="0"/>
-              <a:t>Default </a:t>
-            </a:r>
-            <a:r>
-              <a:rPr lang="sv-SE" dirty="0" err="1" smtClean="0"/>
-              <a:t>konstruktor</a:t>
+          <a:bodyPr>
+            <a:normAutofit/>
+          </a:bodyPr>
+          <a:lstStyle/>
+          <a:p>
+            <a:r>
+              <a:rPr lang="sv-SE" dirty="0" smtClean="0"/>
+              <a:t>Hantera </a:t>
+            </a:r>
+            <a:r>
+              <a:rPr lang="sv-SE" dirty="0" err="1" smtClean="0"/>
+              <a:t>null</a:t>
             </a:r>
             <a:r>
               <a:rPr lang="sv-SE" dirty="0" smtClean="0"/>
@@ -5483,7 +5508,7 @@
             </a:r>
             <a:r>
               <a:rPr lang="sv-SE" dirty="0" err="1" smtClean="0"/>
-              <a:t>UsingDefaultConstructor.groovy</a:t>
+              <a:t>Nullsafe.groovy</a:t>
             </a:r>
             <a:r>
               <a:rPr lang="sv-SE" dirty="0" smtClean="0"/>
@@ -5650,8 +5675,8 @@
           <a:lstStyle/>
           <a:p>
             <a:r>
-              <a:rPr lang="sv-SE" dirty="0" err="1" smtClean="0"/>
-              <a:t>Bekvämlighetsmetoder:List</a:t>
+              <a:rPr lang="sv-SE" dirty="0" smtClean="0"/>
+              <a:t>Getters/setters i Java</a:t>
             </a:r>
             <a:endParaRPr lang="sv-SE" dirty="0"/>
           </a:p>
@@ -5681,7 +5706,7 @@
             </a:r>
             <a:r>
               <a:rPr lang="sv-SE" dirty="0" err="1" smtClean="0"/>
-              <a:t>ArrayConveniance.groovy</a:t>
+              <a:t>ClassWithGettersSetters.java</a:t>
             </a:r>
             <a:r>
               <a:rPr lang="sv-SE" dirty="0" smtClean="0"/>
@@ -5732,8 +5757,12 @@
           <a:lstStyle/>
           <a:p>
             <a:r>
-              <a:rPr lang="sv-SE" dirty="0" err="1" smtClean="0"/>
-              <a:t>Bekvämlighetsmetoder:List</a:t>
+              <a:rPr lang="sv-SE" dirty="0" smtClean="0"/>
+              <a:t>Getters/setters i </a:t>
+            </a:r>
+            <a:r>
+              <a:rPr lang="sv-SE" dirty="0" err="1" smtClean="0"/>
+              <a:t>Groovy</a:t>
             </a:r>
             <a:endParaRPr lang="sv-SE" dirty="0"/>
           </a:p>
@@ -5759,7 +5788,15 @@
             </a:pPr>
             <a:r>
               <a:rPr lang="sv-SE" dirty="0" smtClean="0"/>
-              <a:t>[ArrayConveniance2.groovy]</a:t>
+              <a:t>[</a:t>
+            </a:r>
+            <a:r>
+              <a:rPr lang="sv-SE" dirty="0" err="1" smtClean="0"/>
+              <a:t>ClassWithGettersSetters.groovy</a:t>
+            </a:r>
+            <a:r>
+              <a:rPr lang="sv-SE" dirty="0" smtClean="0"/>
+              <a:t>]</a:t>
             </a:r>
             <a:endParaRPr lang="sv-SE" dirty="0"/>
           </a:p>
@@ -5806,8 +5843,16 @@
           <a:lstStyle/>
           <a:p>
             <a:r>
-              <a:rPr lang="sv-SE" dirty="0" err="1" smtClean="0"/>
-              <a:t>Bekvämlighetsmetoder:Map</a:t>
+              <a:rPr lang="sv-SE" dirty="0" smtClean="0"/>
+              <a:t>Default </a:t>
+            </a:r>
+            <a:r>
+              <a:rPr lang="sv-SE" dirty="0" err="1" smtClean="0"/>
+              <a:t>konstruktor</a:t>
+            </a:r>
+            <a:r>
+              <a:rPr lang="sv-SE" dirty="0" smtClean="0"/>
+              <a:t> i Java</a:t>
             </a:r>
             <a:endParaRPr lang="sv-SE" dirty="0"/>
           </a:p>
@@ -5823,12 +5868,7 @@
             <p:ph idx="1"/>
           </p:nvPr>
         </p:nvSpPr>
-        <p:spPr>
-          <a:xfrm>
-            <a:off x="428596" y="1214422"/>
-            <a:ext cx="8229600" cy="4525963"/>
-          </a:xfrm>
-        </p:spPr>
+        <p:spPr/>
         <p:txBody>
           <a:bodyPr/>
           <a:lstStyle/>
@@ -5842,7 +5882,7 @@
             </a:r>
             <a:r>
               <a:rPr lang="sv-SE" dirty="0" err="1" smtClean="0"/>
-              <a:t>MapConveniance.groovy</a:t>
+              <a:t>UsingDefaultConstructor.java</a:t>
             </a:r>
             <a:r>
               <a:rPr lang="sv-SE" dirty="0" smtClean="0"/>
@@ -5892,6 +5932,56 @@
           <a:bodyPr/>
           <a:lstStyle/>
           <a:p>
+            <a:r>
+              <a:rPr lang="sv-SE" dirty="0" smtClean="0"/>
+              <a:t>Default </a:t>
+            </a:r>
+            <a:r>
+              <a:rPr lang="sv-SE" dirty="0" err="1" smtClean="0"/>
+              <a:t>konstruktor</a:t>
+            </a:r>
+            <a:r>
+              <a:rPr lang="sv-SE" dirty="0" smtClean="0"/>
+              <a:t> i </a:t>
+            </a:r>
+            <a:r>
+              <a:rPr lang="sv-SE" dirty="0" err="1" smtClean="0"/>
+              <a:t>Groovy</a:t>
+            </a:r>
+            <a:endParaRPr lang="sv-SE" dirty="0"/>
+          </a:p>
+        </p:txBody>
+      </p:sp>
+      <p:sp>
+        <p:nvSpPr>
+          <p:cNvPr id="3" name="Platshållare för innehåll 2"/>
+          <p:cNvSpPr>
+            <a:spLocks noGrp="1"/>
+          </p:cNvSpPr>
+          <p:nvPr>
+            <p:ph idx="1"/>
+          </p:nvPr>
+        </p:nvSpPr>
+        <p:spPr/>
+        <p:txBody>
+          <a:bodyPr/>
+          <a:lstStyle/>
+          <a:p>
+            <a:pPr>
+              <a:buNone/>
+            </a:pPr>
+            <a:r>
+              <a:rPr lang="sv-SE" dirty="0" smtClean="0"/>
+              <a:t>[</a:t>
+            </a:r>
+            <a:r>
+              <a:rPr lang="sv-SE" dirty="0" err="1" smtClean="0"/>
+              <a:t>UsingDefaultConstructor.groovy</a:t>
+            </a:r>
+            <a:r>
+              <a:rPr lang="sv-SE" dirty="0" smtClean="0"/>
+              <a:t>]</a:t>
+            </a:r>
             <a:endParaRPr lang="sv-SE" dirty="0"/>
           </a:p>
         </p:txBody>
@@ -5901,13 +5991,6 @@
   <p:clrMapOvr>
     <a:masterClrMapping/>
   </p:clrMapOvr>
-  <p:timing>
-    <p:tnLst>
-      <p:par>
-        <p:cTn id="1" dur="indefinite" restart="never" nodeType="tmRoot"/>
-      </p:par>
-    </p:tnLst>
-  </p:timing>
 </p:sld>
 </file>
 
@@ -5944,12 +6027,8 @@
           <a:lstStyle/>
           <a:p>
             <a:r>
-              <a:rPr lang="sv-SE" dirty="0" smtClean="0"/>
-              <a:t>Operator </a:t>
-            </a:r>
-            <a:r>
-              <a:rPr lang="sv-SE" dirty="0" err="1" smtClean="0"/>
-              <a:t>overloading</a:t>
+              <a:rPr lang="sv-SE" dirty="0" err="1" smtClean="0"/>
+              <a:t>Bekvämlighetsmetoder:List</a:t>
             </a:r>
             <a:endParaRPr lang="sv-SE" dirty="0"/>
           </a:p>
@@ -5957,7 +6036,7 @@
       </p:sp>
       <p:sp>
         <p:nvSpPr>
-          <p:cNvPr id="4" name="Platshållare för innehåll 3"/>
+          <p:cNvPr id="3" name="Platshållare för innehåll 2"/>
           <p:cNvSpPr>
             <a:spLocks noGrp="1"/>
           </p:cNvSpPr>
@@ -5979,7 +6058,7 @@
             </a:r>
             <a:r>
               <a:rPr lang="sv-SE" dirty="0" err="1" smtClean="0"/>
-              <a:t>operatorOverload.groovy</a:t>
+              <a:t>ArrayConveniance.groovy</a:t>
             </a:r>
             <a:r>
               <a:rPr lang="sv-SE" dirty="0" smtClean="0"/>
@@ -5994,13 +6073,6 @@
   <p:clrMapOvr>
     <a:masterClrMapping/>
   </p:clrMapOvr>
-  <p:timing>
-    <p:tnLst>
-      <p:par>
-        <p:cTn id="1" dur="indefinite" restart="never" nodeType="tmRoot"/>
-      </p:par>
-    </p:tnLst>
-  </p:timing>
 </p:sld>
 </file>
 
@@ -6037,12 +6109,8 @@
           <a:lstStyle/>
           <a:p>
             <a:r>
-              <a:rPr lang="sv-SE" dirty="0" smtClean="0"/>
-              <a:t>Operator </a:t>
-            </a:r>
-            <a:r>
-              <a:rPr lang="sv-SE" dirty="0" err="1" smtClean="0"/>
-              <a:t>overloading</a:t>
+              <a:rPr lang="sv-SE" dirty="0" err="1" smtClean="0"/>
+              <a:t>Bekvämlighetsmetoder:List</a:t>
             </a:r>
             <a:endParaRPr lang="sv-SE" dirty="0"/>
           </a:p>
@@ -6050,7 +6118,7 @@
       </p:sp>
       <p:sp>
         <p:nvSpPr>
-          <p:cNvPr id="4" name="Platshållare för innehåll 3"/>
+          <p:cNvPr id="3" name="Platshållare för innehåll 2"/>
           <p:cNvSpPr>
             <a:spLocks noGrp="1"/>
           </p:cNvSpPr>
@@ -6067,12 +6135,8 @@
               <a:buNone/>
             </a:pPr>
             <a:r>
-              <a:rPr lang="sv-SE" smtClean="0"/>
-              <a:t>[operatorOverload2.groovy</a:t>
-            </a:r>
-            <a:r>
-              <a:rPr lang="sv-SE" dirty="0" smtClean="0"/>
-              <a:t>]</a:t>
+              <a:rPr lang="sv-SE" dirty="0" smtClean="0"/>
+              <a:t>[ArrayConveniance2.groovy]</a:t>
             </a:r>
             <a:endParaRPr lang="sv-SE" dirty="0"/>
           </a:p>
@@ -6083,13 +6147,6 @@
   <p:clrMapOvr>
     <a:masterClrMapping/>
   </p:clrMapOvr>
-  <p:timing>
-    <p:tnLst>
-      <p:par>
-        <p:cTn id="1" dur="indefinite" restart="never" nodeType="tmRoot"/>
-      </p:par>
-    </p:tnLst>
-  </p:timing>
 </p:sld>
 </file>
 
@@ -6126,12 +6183,8 @@
           <a:lstStyle/>
           <a:p>
             <a:r>
-              <a:rPr lang="sv-SE" dirty="0" smtClean="0"/>
-              <a:t>Operator </a:t>
-            </a:r>
-            <a:r>
-              <a:rPr lang="sv-SE" dirty="0" err="1" smtClean="0"/>
-              <a:t>overloading</a:t>
+              <a:rPr lang="sv-SE" dirty="0" err="1" smtClean="0"/>
+              <a:t>Bekvämlighetsmetoder:Map</a:t>
             </a:r>
             <a:endParaRPr lang="sv-SE" dirty="0"/>
           </a:p>
@@ -6147,7 +6200,12 @@
             <p:ph idx="1"/>
           </p:nvPr>
         </p:nvSpPr>
-        <p:spPr/>
+        <p:spPr>
+          <a:xfrm>
+            <a:off x="428596" y="1214422"/>
+            <a:ext cx="8229600" cy="4525963"/>
+          </a:xfrm>
+        </p:spPr>
         <p:txBody>
           <a:bodyPr/>
           <a:lstStyle/>
@@ -6155,6 +6213,18 @@
             <a:pPr>
               <a:buNone/>
             </a:pPr>
+            <a:r>
+              <a:rPr lang="sv-SE" dirty="0" smtClean="0"/>
+              <a:t>[</a:t>
+            </a:r>
+            <a:r>
+              <a:rPr lang="sv-SE" dirty="0" err="1" smtClean="0"/>
+              <a:t>MapConveniance.groovy</a:t>
+            </a:r>
+            <a:r>
+              <a:rPr lang="sv-SE" dirty="0" smtClean="0"/>
+              <a:t>]</a:t>
+            </a:r>
             <a:endParaRPr lang="sv-SE" dirty="0"/>
           </a:p>
         </p:txBody>
@@ -6164,13 +6234,6 @@
   <p:clrMapOvr>
     <a:masterClrMapping/>
   </p:clrMapOvr>
-  <p:timing>
-    <p:tnLst>
-      <p:par>
-        <p:cTn id="1" dur="indefinite" restart="never" nodeType="tmRoot"/>
-      </p:par>
-    </p:tnLst>
-  </p:timing>
 </p:sld>
 </file>
 
@@ -6207,16 +6270,12 @@
           <a:lstStyle/>
           <a:p>
             <a:r>
-              <a:rPr lang="sv-SE" dirty="0" err="1" smtClean="0"/>
-              <a:t>Groovy</a:t>
-            </a:r>
-            <a:r>
-              <a:rPr lang="sv-SE" dirty="0" smtClean="0"/>
-              <a:t> </a:t>
-            </a:r>
-            <a:r>
-              <a:rPr lang="sv-SE" dirty="0" err="1" smtClean="0"/>
-              <a:t>truth</a:t>
+              <a:rPr lang="sv-SE" dirty="0" smtClean="0"/>
+              <a:t>Operator </a:t>
+            </a:r>
+            <a:r>
+              <a:rPr lang="sv-SE" dirty="0" err="1" smtClean="0"/>
+              <a:t>overloading</a:t>
             </a:r>
             <a:endParaRPr lang="sv-SE" dirty="0"/>
           </a:p>
@@ -6224,7 +6283,7 @@
       </p:sp>
       <p:sp>
         <p:nvSpPr>
-          <p:cNvPr id="3" name="Platshållare för innehåll 2"/>
+          <p:cNvPr id="4" name="Platshållare för innehåll 3"/>
           <p:cNvSpPr>
             <a:spLocks noGrp="1"/>
           </p:cNvSpPr>
@@ -6246,7 +6305,7 @@
             </a:r>
             <a:r>
               <a:rPr lang="sv-SE" dirty="0" err="1" smtClean="0"/>
-              <a:t>TestGroovyTruth.groovy</a:t>
+              <a:t>operatorOverload.groovy</a:t>
             </a:r>
             <a:r>
               <a:rPr lang="sv-SE" dirty="0" smtClean="0"/>
@@ -6261,6 +6320,13 @@
   <p:clrMapOvr>
     <a:masterClrMapping/>
   </p:clrMapOvr>
+  <p:timing>
+    <p:tnLst>
+      <p:par>
+        <p:cTn id="1" dur="indefinite" restart="never" nodeType="tmRoot"/>
+      </p:par>
+    </p:tnLst>
+  </p:timing>
 </p:sld>
 </file>
 
@@ -6297,16 +6363,12 @@
           <a:lstStyle/>
           <a:p>
             <a:r>
-              <a:rPr lang="sv-SE" dirty="0" err="1" smtClean="0"/>
-              <a:t>Groovy</a:t>
-            </a:r>
-            <a:r>
-              <a:rPr lang="sv-SE" dirty="0" smtClean="0"/>
-              <a:t> </a:t>
-            </a:r>
-            <a:r>
-              <a:rPr lang="sv-SE" dirty="0" err="1" smtClean="0"/>
-              <a:t>truth</a:t>
+              <a:rPr lang="sv-SE" dirty="0" smtClean="0"/>
+              <a:t>Operator </a:t>
+            </a:r>
+            <a:r>
+              <a:rPr lang="sv-SE" dirty="0" err="1" smtClean="0"/>
+              <a:t>overloading</a:t>
             </a:r>
             <a:endParaRPr lang="sv-SE" dirty="0"/>
           </a:p>
@@ -6314,7 +6376,7 @@
       </p:sp>
       <p:sp>
         <p:nvSpPr>
-          <p:cNvPr id="3" name="Platshållare för innehåll 2"/>
+          <p:cNvPr id="4" name="Platshållare för innehåll 3"/>
           <p:cNvSpPr>
             <a:spLocks noGrp="1"/>
           </p:cNvSpPr>
@@ -6332,15 +6394,7 @@
             </a:pPr>
             <a:r>
               <a:rPr lang="sv-SE" dirty="0" smtClean="0"/>
-              <a:t>[</a:t>
-            </a:r>
-            <a:r>
-              <a:rPr lang="sv-SE" dirty="0" err="1" smtClean="0"/>
-              <a:t>HelloWorldWithParameters.java</a:t>
-            </a:r>
-            <a:r>
-              <a:rPr lang="sv-SE" dirty="0" smtClean="0"/>
-              <a:t>]</a:t>
+              <a:t>[operatorOverload2.groovy]</a:t>
             </a:r>
             <a:endParaRPr lang="sv-SE" dirty="0"/>
           </a:p>
@@ -6351,6 +6405,13 @@
   <p:clrMapOvr>
     <a:masterClrMapping/>
   </p:clrMapOvr>
+  <p:timing>
+    <p:tnLst>
+      <p:par>
+        <p:cTn id="1" dur="indefinite" restart="never" nodeType="tmRoot"/>
+      </p:par>
+    </p:tnLst>
+  </p:timing>
 </p:sld>
 </file>
 
@@ -6426,7 +6487,7 @@
             </a:r>
             <a:r>
               <a:rPr lang="sv-SE" dirty="0" err="1" smtClean="0"/>
-              <a:t>helloWorldWithParameters.groovy</a:t>
+              <a:t>HelloWorldWithParameters.java</a:t>
             </a:r>
             <a:r>
               <a:rPr lang="sv-SE" dirty="0" smtClean="0"/>
@@ -6561,11 +6622,15 @@
           <a:p>
             <a:r>
               <a:rPr lang="sv-SE" dirty="0" err="1" smtClean="0"/>
-              <a:t>Optional</a:t>
-            </a:r>
-            <a:r>
-              <a:rPr lang="sv-SE" dirty="0" smtClean="0"/>
-              <a:t> parameters</a:t>
+              <a:t>Groovy</a:t>
+            </a:r>
+            <a:r>
+              <a:rPr lang="sv-SE" dirty="0" smtClean="0"/>
+              <a:t> </a:t>
+            </a:r>
+            <a:r>
+              <a:rPr lang="sv-SE" dirty="0" err="1" smtClean="0"/>
+              <a:t>truth</a:t>
             </a:r>
             <a:endParaRPr lang="sv-SE" dirty="0"/>
           </a:p>
@@ -6595,7 +6660,7 @@
             </a:r>
             <a:r>
               <a:rPr lang="sv-SE" dirty="0" err="1" smtClean="0"/>
-              <a:t>optionalParameters.java</a:t>
+              <a:t>helloWorldWithParameters.groovy</a:t>
             </a:r>
             <a:r>
               <a:rPr lang="sv-SE" dirty="0" smtClean="0"/>
@@ -6614,6 +6679,182 @@
 </file>
 
 <file path=ppt/slides/slide41.xml><?xml version="1.0" encoding="utf-8"?>
+<p:sld xmlns:a="http://schemas.openxmlformats.org/drawingml/2006/main" xmlns:r="http://schemas.openxmlformats.org/officeDocument/2006/relationships" xmlns:p="http://schemas.openxmlformats.org/presentationml/2006/main">
+  <p:cSld>
+    <p:spTree>
+      <p:nvGrpSpPr>
+        <p:cNvPr id="1" name=""/>
+        <p:cNvGrpSpPr/>
+        <p:nvPr/>
+      </p:nvGrpSpPr>
+      <p:grpSpPr>
+        <a:xfrm>
+          <a:off x="0" y="0"/>
+          <a:ext cx="0" cy="0"/>
+          <a:chOff x="0" y="0"/>
+          <a:chExt cx="0" cy="0"/>
+        </a:xfrm>
+      </p:grpSpPr>
+      <p:sp>
+        <p:nvSpPr>
+          <p:cNvPr id="2" name="Rubrik 1"/>
+          <p:cNvSpPr>
+            <a:spLocks noGrp="1"/>
+          </p:cNvSpPr>
+          <p:nvPr>
+            <p:ph type="title"/>
+          </p:nvPr>
+        </p:nvSpPr>
+        <p:spPr/>
+        <p:txBody>
+          <a:bodyPr/>
+          <a:lstStyle/>
+          <a:p>
+            <a:r>
+              <a:rPr lang="sv-SE" dirty="0" err="1" smtClean="0"/>
+              <a:t>Groovy</a:t>
+            </a:r>
+            <a:r>
+              <a:rPr lang="sv-SE" dirty="0" smtClean="0"/>
+              <a:t> </a:t>
+            </a:r>
+            <a:r>
+              <a:rPr lang="sv-SE" dirty="0" err="1" smtClean="0"/>
+              <a:t>truth</a:t>
+            </a:r>
+            <a:endParaRPr lang="sv-SE" dirty="0"/>
+          </a:p>
+        </p:txBody>
+      </p:sp>
+      <p:sp>
+        <p:nvSpPr>
+          <p:cNvPr id="3" name="Platshållare för innehåll 2"/>
+          <p:cNvSpPr>
+            <a:spLocks noGrp="1"/>
+          </p:cNvSpPr>
+          <p:nvPr>
+            <p:ph idx="1"/>
+          </p:nvPr>
+        </p:nvSpPr>
+        <p:spPr/>
+        <p:txBody>
+          <a:bodyPr/>
+          <a:lstStyle/>
+          <a:p>
+            <a:pPr>
+              <a:buNone/>
+            </a:pPr>
+            <a:r>
+              <a:rPr lang="sv-SE" dirty="0" smtClean="0"/>
+              <a:t>[</a:t>
+            </a:r>
+            <a:r>
+              <a:rPr lang="sv-SE" dirty="0" err="1" smtClean="0"/>
+              <a:t>TestGroovyTruth.groovy</a:t>
+            </a:r>
+            <a:r>
+              <a:rPr lang="sv-SE" dirty="0" smtClean="0"/>
+              <a:t>]</a:t>
+            </a:r>
+            <a:endParaRPr lang="sv-SE" dirty="0"/>
+          </a:p>
+        </p:txBody>
+      </p:sp>
+    </p:spTree>
+  </p:cSld>
+  <p:clrMapOvr>
+    <a:masterClrMapping/>
+  </p:clrMapOvr>
+</p:sld>
+</file>
+
+<file path=ppt/slides/slide42.xml><?xml version="1.0" encoding="utf-8"?>
+<p:sld xmlns:a="http://schemas.openxmlformats.org/drawingml/2006/main" xmlns:r="http://schemas.openxmlformats.org/officeDocument/2006/relationships" xmlns:p="http://schemas.openxmlformats.org/presentationml/2006/main">
+  <p:cSld>
+    <p:spTree>
+      <p:nvGrpSpPr>
+        <p:cNvPr id="1" name=""/>
+        <p:cNvGrpSpPr/>
+        <p:nvPr/>
+      </p:nvGrpSpPr>
+      <p:grpSpPr>
+        <a:xfrm>
+          <a:off x="0" y="0"/>
+          <a:ext cx="0" cy="0"/>
+          <a:chOff x="0" y="0"/>
+          <a:chExt cx="0" cy="0"/>
+        </a:xfrm>
+      </p:grpSpPr>
+      <p:sp>
+        <p:nvSpPr>
+          <p:cNvPr id="2" name="Rubrik 1"/>
+          <p:cNvSpPr>
+            <a:spLocks noGrp="1"/>
+          </p:cNvSpPr>
+          <p:nvPr>
+            <p:ph type="title"/>
+          </p:nvPr>
+        </p:nvSpPr>
+        <p:spPr/>
+        <p:txBody>
+          <a:bodyPr/>
+          <a:lstStyle/>
+          <a:p>
+            <a:r>
+              <a:rPr lang="sv-SE" dirty="0" err="1" smtClean="0"/>
+              <a:t>Optional</a:t>
+            </a:r>
+            <a:r>
+              <a:rPr lang="sv-SE" dirty="0" smtClean="0"/>
+              <a:t> parameters</a:t>
+            </a:r>
+            <a:endParaRPr lang="sv-SE" dirty="0"/>
+          </a:p>
+        </p:txBody>
+      </p:sp>
+      <p:sp>
+        <p:nvSpPr>
+          <p:cNvPr id="3" name="Platshållare för innehåll 2"/>
+          <p:cNvSpPr>
+            <a:spLocks noGrp="1"/>
+          </p:cNvSpPr>
+          <p:nvPr>
+            <p:ph idx="1"/>
+          </p:nvPr>
+        </p:nvSpPr>
+        <p:spPr/>
+        <p:txBody>
+          <a:bodyPr/>
+          <a:lstStyle/>
+          <a:p>
+            <a:pPr>
+              <a:buNone/>
+            </a:pPr>
+            <a:r>
+              <a:rPr lang="sv-SE" dirty="0" smtClean="0"/>
+              <a:t>[</a:t>
+            </a:r>
+            <a:r>
+              <a:rPr lang="sv-SE" dirty="0" err="1" smtClean="0"/>
+              <a:t>optionalParameters.java</a:t>
+            </a:r>
+            <a:r>
+              <a:rPr lang="sv-SE" dirty="0" smtClean="0"/>
+              <a:t>]</a:t>
+            </a:r>
+            <a:endParaRPr lang="sv-SE" dirty="0"/>
+          </a:p>
+        </p:txBody>
+      </p:sp>
+    </p:spTree>
+  </p:cSld>
+  <p:clrMapOvr>
+    <a:masterClrMapping/>
+  </p:clrMapOvr>
+</p:sld>
+</file>
+
+<file path=ppt/slides/slide43.xml><?xml version="1.0" encoding="utf-8"?>
 <p:sld xmlns:a="http://schemas.openxmlformats.org/drawingml/2006/main" xmlns:r="http://schemas.openxmlformats.org/officeDocument/2006/relationships" xmlns:p="http://schemas.openxmlformats.org/presentationml/2006/main">
   <p:cSld>
     <p:spTree>

</xml_diff>

<commit_message>
lagt till Closure-klasser i groovy o java
</commit_message>
<xml_diff>
--- a/groovyseminarie/dokument/groovyseminarium_source.pptx
+++ b/groovyseminarie/dokument/groovyseminarium_source.pptx
@@ -50,6 +50,17 @@
     <p:sldId id="310" r:id="rId44"/>
     <p:sldId id="311" r:id="rId45"/>
     <p:sldId id="312" r:id="rId46"/>
+    <p:sldId id="313" r:id="rId47"/>
+    <p:sldId id="314" r:id="rId48"/>
+    <p:sldId id="315" r:id="rId49"/>
+    <p:sldId id="316" r:id="rId50"/>
+    <p:sldId id="317" r:id="rId51"/>
+    <p:sldId id="318" r:id="rId52"/>
+    <p:sldId id="319" r:id="rId53"/>
+    <p:sldId id="320" r:id="rId54"/>
+    <p:sldId id="321" r:id="rId55"/>
+    <p:sldId id="322" r:id="rId56"/>
+    <p:sldId id="323" r:id="rId57"/>
   </p:sldIdLst>
   <p:sldSz cx="9144000" cy="6858000" type="screen4x3"/>
   <p:notesSz cx="6858000" cy="9144000"/>
@@ -7193,8 +7204,391 @@
               <a:t>[</a:t>
             </a:r>
             <a:r>
-              <a:rPr lang="sv-SE" smtClean="0"/>
-              <a:t>Gstrings.groovy]</a:t>
+              <a:rPr lang="sv-SE" dirty="0" err="1" smtClean="0"/>
+              <a:t>Gstrings.groovy</a:t>
+            </a:r>
+            <a:r>
+              <a:rPr lang="sv-SE" dirty="0" smtClean="0"/>
+              <a:t>]</a:t>
+            </a:r>
+            <a:endParaRPr lang="sv-SE" dirty="0"/>
+          </a:p>
+        </p:txBody>
+      </p:sp>
+    </p:spTree>
+  </p:cSld>
+  <p:clrMapOvr>
+    <a:masterClrMapping/>
+  </p:clrMapOvr>
+</p:sld>
+</file>
+
+<file path=ppt/slides/slide46.xml><?xml version="1.0" encoding="utf-8"?>
+<p:sld xmlns:a="http://schemas.openxmlformats.org/drawingml/2006/main" xmlns:r="http://schemas.openxmlformats.org/officeDocument/2006/relationships" xmlns:p="http://schemas.openxmlformats.org/presentationml/2006/main">
+  <p:cSld>
+    <p:spTree>
+      <p:nvGrpSpPr>
+        <p:cNvPr id="1" name=""/>
+        <p:cNvGrpSpPr/>
+        <p:nvPr/>
+      </p:nvGrpSpPr>
+      <p:grpSpPr>
+        <a:xfrm>
+          <a:off x="0" y="0"/>
+          <a:ext cx="0" cy="0"/>
+          <a:chOff x="0" y="0"/>
+          <a:chExt cx="0" cy="0"/>
+        </a:xfrm>
+      </p:grpSpPr>
+      <p:sp>
+        <p:nvSpPr>
+          <p:cNvPr id="2" name="Rubrik 1"/>
+          <p:cNvSpPr>
+            <a:spLocks noGrp="1"/>
+          </p:cNvSpPr>
+          <p:nvPr>
+            <p:ph type="title"/>
+          </p:nvPr>
+        </p:nvSpPr>
+        <p:spPr/>
+        <p:txBody>
+          <a:bodyPr/>
+          <a:lstStyle/>
+          <a:p>
+            <a:r>
+              <a:rPr lang="sv-SE" dirty="0" err="1" smtClean="0"/>
+              <a:t>Regular</a:t>
+            </a:r>
+            <a:r>
+              <a:rPr lang="sv-SE" dirty="0" smtClean="0"/>
+              <a:t> expressions</a:t>
+            </a:r>
+            <a:endParaRPr lang="sv-SE" dirty="0"/>
+          </a:p>
+        </p:txBody>
+      </p:sp>
+      <p:sp>
+        <p:nvSpPr>
+          <p:cNvPr id="3" name="Platshållare för innehåll 2"/>
+          <p:cNvSpPr>
+            <a:spLocks noGrp="1"/>
+          </p:cNvSpPr>
+          <p:nvPr>
+            <p:ph idx="1"/>
+          </p:nvPr>
+        </p:nvSpPr>
+        <p:spPr/>
+        <p:txBody>
+          <a:bodyPr/>
+          <a:lstStyle/>
+          <a:p>
+            <a:pPr>
+              <a:buNone/>
+            </a:pPr>
+            <a:r>
+              <a:rPr lang="sv-SE" dirty="0" smtClean="0"/>
+              <a:t>[</a:t>
+            </a:r>
+            <a:r>
+              <a:rPr lang="sv-SE" dirty="0" err="1" smtClean="0"/>
+              <a:t>TestRegExp.groovy</a:t>
+            </a:r>
+            <a:r>
+              <a:rPr lang="sv-SE" dirty="0" smtClean="0"/>
+              <a:t>]</a:t>
+            </a:r>
+            <a:endParaRPr lang="sv-SE" dirty="0"/>
+          </a:p>
+        </p:txBody>
+      </p:sp>
+    </p:spTree>
+  </p:cSld>
+  <p:clrMapOvr>
+    <a:masterClrMapping/>
+  </p:clrMapOvr>
+</p:sld>
+</file>
+
+<file path=ppt/slides/slide47.xml><?xml version="1.0" encoding="utf-8"?>
+<p:sld xmlns:a="http://schemas.openxmlformats.org/drawingml/2006/main" xmlns:r="http://schemas.openxmlformats.org/officeDocument/2006/relationships" xmlns:p="http://schemas.openxmlformats.org/presentationml/2006/main">
+  <p:cSld>
+    <p:spTree>
+      <p:nvGrpSpPr>
+        <p:cNvPr id="1" name=""/>
+        <p:cNvGrpSpPr/>
+        <p:nvPr/>
+      </p:nvGrpSpPr>
+      <p:grpSpPr>
+        <a:xfrm>
+          <a:off x="0" y="0"/>
+          <a:ext cx="0" cy="0"/>
+          <a:chOff x="0" y="0"/>
+          <a:chExt cx="0" cy="0"/>
+        </a:xfrm>
+      </p:grpSpPr>
+      <p:sp>
+        <p:nvSpPr>
+          <p:cNvPr id="2" name="Rubrik 1"/>
+          <p:cNvSpPr>
+            <a:spLocks noGrp="1"/>
+          </p:cNvSpPr>
+          <p:nvPr>
+            <p:ph type="title"/>
+          </p:nvPr>
+        </p:nvSpPr>
+        <p:spPr/>
+        <p:txBody>
+          <a:bodyPr/>
+          <a:lstStyle/>
+          <a:p>
+            <a:r>
+              <a:rPr lang="sv-SE" dirty="0" smtClean="0"/>
+              <a:t>Primitives</a:t>
+            </a:r>
+            <a:endParaRPr lang="sv-SE" dirty="0"/>
+          </a:p>
+        </p:txBody>
+      </p:sp>
+      <p:sp>
+        <p:nvSpPr>
+          <p:cNvPr id="3" name="Platshållare för innehåll 2"/>
+          <p:cNvSpPr>
+            <a:spLocks noGrp="1"/>
+          </p:cNvSpPr>
+          <p:nvPr>
+            <p:ph idx="1"/>
+          </p:nvPr>
+        </p:nvSpPr>
+        <p:spPr/>
+        <p:txBody>
+          <a:bodyPr/>
+          <a:lstStyle/>
+          <a:p>
+            <a:pPr>
+              <a:buNone/>
+            </a:pPr>
+            <a:r>
+              <a:rPr lang="sv-SE" dirty="0" smtClean="0"/>
+              <a:t>[</a:t>
+            </a:r>
+            <a:r>
+              <a:rPr lang="sv-SE" dirty="0" err="1" smtClean="0"/>
+              <a:t>Primitives.groovy</a:t>
+            </a:r>
+            <a:r>
+              <a:rPr lang="sv-SE" dirty="0" smtClean="0"/>
+              <a:t>]</a:t>
+            </a:r>
+            <a:endParaRPr lang="sv-SE" dirty="0"/>
+          </a:p>
+        </p:txBody>
+      </p:sp>
+    </p:spTree>
+  </p:cSld>
+  <p:clrMapOvr>
+    <a:masterClrMapping/>
+  </p:clrMapOvr>
+</p:sld>
+</file>
+
+<file path=ppt/slides/slide48.xml><?xml version="1.0" encoding="utf-8"?>
+<p:sld xmlns:a="http://schemas.openxmlformats.org/drawingml/2006/main" xmlns:r="http://schemas.openxmlformats.org/officeDocument/2006/relationships" xmlns:p="http://schemas.openxmlformats.org/presentationml/2006/main">
+  <p:cSld>
+    <p:spTree>
+      <p:nvGrpSpPr>
+        <p:cNvPr id="1" name=""/>
+        <p:cNvGrpSpPr/>
+        <p:nvPr/>
+      </p:nvGrpSpPr>
+      <p:grpSpPr>
+        <a:xfrm>
+          <a:off x="0" y="0"/>
+          <a:ext cx="0" cy="0"/>
+          <a:chOff x="0" y="0"/>
+          <a:chExt cx="0" cy="0"/>
+        </a:xfrm>
+      </p:grpSpPr>
+      <p:sp>
+        <p:nvSpPr>
+          <p:cNvPr id="2" name="Rubrik 1"/>
+          <p:cNvSpPr>
+            <a:spLocks noGrp="1"/>
+          </p:cNvSpPr>
+          <p:nvPr>
+            <p:ph type="title"/>
+          </p:nvPr>
+        </p:nvSpPr>
+        <p:spPr/>
+        <p:txBody>
+          <a:bodyPr>
+            <a:normAutofit fontScale="90000"/>
+          </a:bodyPr>
+          <a:lstStyle/>
+          <a:p>
+            <a:r>
+              <a:rPr lang="sv-SE" dirty="0" err="1" smtClean="0"/>
+              <a:t>Groovy</a:t>
+            </a:r>
+            <a:r>
+              <a:rPr lang="sv-SE" dirty="0" smtClean="0"/>
+              <a:t> har stöd för samtliga Java 5-features:</a:t>
+            </a:r>
+          </a:p>
+        </p:txBody>
+      </p:sp>
+      <p:sp>
+        <p:nvSpPr>
+          <p:cNvPr id="3" name="Platshållare för innehåll 2"/>
+          <p:cNvSpPr>
+            <a:spLocks noGrp="1"/>
+          </p:cNvSpPr>
+          <p:nvPr>
+            <p:ph idx="1"/>
+          </p:nvPr>
+        </p:nvSpPr>
+        <p:spPr/>
+        <p:txBody>
+          <a:bodyPr>
+            <a:normAutofit fontScale="92500"/>
+          </a:bodyPr>
+          <a:lstStyle/>
+          <a:p>
+            <a:r>
+              <a:rPr lang="sv-SE" dirty="0" err="1" smtClean="0"/>
+              <a:t>Generics</a:t>
+            </a:r>
+            <a:endParaRPr lang="sv-SE" dirty="0" smtClean="0"/>
+          </a:p>
+          <a:p>
+            <a:r>
+              <a:rPr lang="sv-SE" dirty="0" err="1" smtClean="0"/>
+              <a:t>For-each</a:t>
+            </a:r>
+            <a:endParaRPr lang="sv-SE" dirty="0" smtClean="0"/>
+          </a:p>
+          <a:p>
+            <a:r>
+              <a:rPr lang="sv-SE" dirty="0" err="1" smtClean="0"/>
+              <a:t>Autoboxing</a:t>
+            </a:r>
+            <a:r>
+              <a:rPr lang="sv-SE" dirty="0" smtClean="0"/>
+              <a:t> (fungerar även om man kör java 1.4)</a:t>
+            </a:r>
+          </a:p>
+          <a:p>
+            <a:r>
+              <a:rPr lang="sv-SE" dirty="0" err="1" smtClean="0"/>
+              <a:t>Enum</a:t>
+            </a:r>
+            <a:endParaRPr lang="sv-SE" dirty="0" smtClean="0"/>
+          </a:p>
+          <a:p>
+            <a:r>
+              <a:rPr lang="sv-SE" dirty="0" smtClean="0"/>
+              <a:t>Annotations (fungerar dock ej att skapa egna i </a:t>
+            </a:r>
+            <a:r>
+              <a:rPr lang="sv-SE" dirty="0" err="1" smtClean="0"/>
+              <a:t>Groovy</a:t>
+            </a:r>
+            <a:r>
+              <a:rPr lang="sv-SE" dirty="0" smtClean="0"/>
+              <a:t>)</a:t>
+            </a:r>
+          </a:p>
+          <a:p>
+            <a:r>
+              <a:rPr lang="sv-SE" dirty="0" err="1" smtClean="0"/>
+              <a:t>Varargs</a:t>
+            </a:r>
+            <a:endParaRPr lang="sv-SE" dirty="0" smtClean="0"/>
+          </a:p>
+          <a:p>
+            <a:r>
+              <a:rPr lang="sv-SE" dirty="0" err="1" smtClean="0"/>
+              <a:t>Static</a:t>
+            </a:r>
+            <a:r>
+              <a:rPr lang="sv-SE" dirty="0" smtClean="0"/>
+              <a:t> import</a:t>
+            </a:r>
+          </a:p>
+        </p:txBody>
+      </p:sp>
+    </p:spTree>
+  </p:cSld>
+  <p:clrMapOvr>
+    <a:masterClrMapping/>
+  </p:clrMapOvr>
+</p:sld>
+</file>
+
+<file path=ppt/slides/slide49.xml><?xml version="1.0" encoding="utf-8"?>
+<p:sld xmlns:a="http://schemas.openxmlformats.org/drawingml/2006/main" xmlns:r="http://schemas.openxmlformats.org/officeDocument/2006/relationships" xmlns:p="http://schemas.openxmlformats.org/presentationml/2006/main">
+  <p:cSld>
+    <p:spTree>
+      <p:nvGrpSpPr>
+        <p:cNvPr id="1" name=""/>
+        <p:cNvGrpSpPr/>
+        <p:nvPr/>
+      </p:nvGrpSpPr>
+      <p:grpSpPr>
+        <a:xfrm>
+          <a:off x="0" y="0"/>
+          <a:ext cx="0" cy="0"/>
+          <a:chOff x="0" y="0"/>
+          <a:chExt cx="0" cy="0"/>
+        </a:xfrm>
+      </p:grpSpPr>
+      <p:sp>
+        <p:nvSpPr>
+          <p:cNvPr id="2" name="Rubrik 1"/>
+          <p:cNvSpPr>
+            <a:spLocks noGrp="1"/>
+          </p:cNvSpPr>
+          <p:nvPr>
+            <p:ph type="title"/>
+          </p:nvPr>
+        </p:nvSpPr>
+        <p:spPr/>
+        <p:txBody>
+          <a:bodyPr/>
+          <a:lstStyle/>
+          <a:p>
+            <a:r>
+              <a:rPr lang="sv-SE" dirty="0" smtClean="0"/>
+              <a:t>Java 5 i </a:t>
+            </a:r>
+            <a:r>
+              <a:rPr lang="sv-SE" dirty="0" err="1" smtClean="0"/>
+              <a:t>Groovy</a:t>
+            </a:r>
+            <a:endParaRPr lang="sv-SE" dirty="0"/>
+          </a:p>
+        </p:txBody>
+      </p:sp>
+      <p:sp>
+        <p:nvSpPr>
+          <p:cNvPr id="3" name="Platshållare för innehåll 2"/>
+          <p:cNvSpPr>
+            <a:spLocks noGrp="1"/>
+          </p:cNvSpPr>
+          <p:nvPr>
+            <p:ph idx="1"/>
+          </p:nvPr>
+        </p:nvSpPr>
+        <p:spPr/>
+        <p:txBody>
+          <a:bodyPr/>
+          <a:lstStyle/>
+          <a:p>
+            <a:pPr>
+              <a:buNone/>
+            </a:pPr>
+            <a:r>
+              <a:rPr lang="sv-SE" dirty="0" smtClean="0"/>
+              <a:t>[GroovyWithJava5.groovy]</a:t>
             </a:r>
             <a:endParaRPr lang="sv-SE" dirty="0"/>
           </a:p>
@@ -7320,6 +7714,592 @@
       </p:par>
     </p:tnLst>
   </p:timing>
+</p:sld>
+</file>
+
+<file path=ppt/slides/slide50.xml><?xml version="1.0" encoding="utf-8"?>
+<p:sld xmlns:a="http://schemas.openxmlformats.org/drawingml/2006/main" xmlns:r="http://schemas.openxmlformats.org/officeDocument/2006/relationships" xmlns:p="http://schemas.openxmlformats.org/presentationml/2006/main">
+  <p:cSld>
+    <p:spTree>
+      <p:nvGrpSpPr>
+        <p:cNvPr id="1" name=""/>
+        <p:cNvGrpSpPr/>
+        <p:nvPr/>
+      </p:nvGrpSpPr>
+      <p:grpSpPr>
+        <a:xfrm>
+          <a:off x="0" y="0"/>
+          <a:ext cx="0" cy="0"/>
+          <a:chOff x="0" y="0"/>
+          <a:chExt cx="0" cy="0"/>
+        </a:xfrm>
+      </p:grpSpPr>
+      <p:sp>
+        <p:nvSpPr>
+          <p:cNvPr id="2" name="Rubrik 1"/>
+          <p:cNvSpPr>
+            <a:spLocks noGrp="1"/>
+          </p:cNvSpPr>
+          <p:nvPr>
+            <p:ph type="title"/>
+          </p:nvPr>
+        </p:nvSpPr>
+        <p:spPr/>
+        <p:txBody>
+          <a:bodyPr/>
+          <a:lstStyle/>
+          <a:p>
+            <a:r>
+              <a:rPr lang="sv-SE" dirty="0" err="1" smtClean="0"/>
+              <a:t>Closures</a:t>
+            </a:r>
+            <a:r>
+              <a:rPr lang="sv-SE" dirty="0" smtClean="0"/>
+              <a:t>: fördjupning</a:t>
+            </a:r>
+            <a:endParaRPr lang="sv-SE" dirty="0"/>
+          </a:p>
+        </p:txBody>
+      </p:sp>
+      <p:sp>
+        <p:nvSpPr>
+          <p:cNvPr id="3" name="Platshållare för innehåll 2"/>
+          <p:cNvSpPr>
+            <a:spLocks noGrp="1"/>
+          </p:cNvSpPr>
+          <p:nvPr>
+            <p:ph idx="1"/>
+          </p:nvPr>
+        </p:nvSpPr>
+        <p:spPr/>
+        <p:txBody>
+          <a:bodyPr/>
+          <a:lstStyle/>
+          <a:p>
+            <a:r>
+              <a:rPr lang="sv-SE" dirty="0" smtClean="0"/>
+              <a:t>Exempel: </a:t>
+            </a:r>
+            <a:r>
+              <a:rPr lang="sv-SE" dirty="0" smtClean="0"/>
+              <a:t>Summera alla jämna tal från 1 till 10</a:t>
+            </a:r>
+            <a:endParaRPr lang="sv-SE" dirty="0"/>
+          </a:p>
+        </p:txBody>
+      </p:sp>
+    </p:spTree>
+  </p:cSld>
+  <p:clrMapOvr>
+    <a:masterClrMapping/>
+  </p:clrMapOvr>
+</p:sld>
+</file>
+
+<file path=ppt/slides/slide51.xml><?xml version="1.0" encoding="utf-8"?>
+<p:sld xmlns:a="http://schemas.openxmlformats.org/drawingml/2006/main" xmlns:r="http://schemas.openxmlformats.org/officeDocument/2006/relationships" xmlns:p="http://schemas.openxmlformats.org/presentationml/2006/main">
+  <p:cSld>
+    <p:spTree>
+      <p:nvGrpSpPr>
+        <p:cNvPr id="1" name=""/>
+        <p:cNvGrpSpPr/>
+        <p:nvPr/>
+      </p:nvGrpSpPr>
+      <p:grpSpPr>
+        <a:xfrm>
+          <a:off x="0" y="0"/>
+          <a:ext cx="0" cy="0"/>
+          <a:chOff x="0" y="0"/>
+          <a:chExt cx="0" cy="0"/>
+        </a:xfrm>
+      </p:grpSpPr>
+      <p:sp>
+        <p:nvSpPr>
+          <p:cNvPr id="2" name="Rubrik 1"/>
+          <p:cNvSpPr>
+            <a:spLocks noGrp="1"/>
+          </p:cNvSpPr>
+          <p:nvPr>
+            <p:ph type="title"/>
+          </p:nvPr>
+        </p:nvSpPr>
+        <p:spPr/>
+        <p:txBody>
+          <a:bodyPr>
+            <a:normAutofit fontScale="90000"/>
+          </a:bodyPr>
+          <a:lstStyle/>
+          <a:p>
+            <a:r>
+              <a:rPr lang="sv-SE" dirty="0" smtClean="0"/>
+              <a:t>Summera alla jämna tal från 1 till 10</a:t>
+            </a:r>
+            <a:endParaRPr lang="sv-SE" dirty="0"/>
+          </a:p>
+        </p:txBody>
+      </p:sp>
+      <p:sp>
+        <p:nvSpPr>
+          <p:cNvPr id="3" name="Platshållare för innehåll 2"/>
+          <p:cNvSpPr>
+            <a:spLocks noGrp="1"/>
+          </p:cNvSpPr>
+          <p:nvPr>
+            <p:ph idx="1"/>
+          </p:nvPr>
+        </p:nvSpPr>
+        <p:spPr/>
+        <p:txBody>
+          <a:bodyPr/>
+          <a:lstStyle/>
+          <a:p>
+            <a:pPr>
+              <a:buNone/>
+            </a:pPr>
+            <a:r>
+              <a:rPr lang="sv-SE" dirty="0" smtClean="0"/>
+              <a:t>[</a:t>
+            </a:r>
+            <a:r>
+              <a:rPr lang="sv-SE" dirty="0" err="1" smtClean="0"/>
+              <a:t>sumEvenNumbers.java</a:t>
+            </a:r>
+            <a:r>
+              <a:rPr lang="sv-SE" dirty="0" smtClean="0"/>
+              <a:t>]</a:t>
+            </a:r>
+            <a:endParaRPr lang="sv-SE" dirty="0"/>
+          </a:p>
+        </p:txBody>
+      </p:sp>
+    </p:spTree>
+  </p:cSld>
+  <p:clrMapOvr>
+    <a:masterClrMapping/>
+  </p:clrMapOvr>
+</p:sld>
+</file>
+
+<file path=ppt/slides/slide52.xml><?xml version="1.0" encoding="utf-8"?>
+<p:sld xmlns:a="http://schemas.openxmlformats.org/drawingml/2006/main" xmlns:r="http://schemas.openxmlformats.org/officeDocument/2006/relationships" xmlns:p="http://schemas.openxmlformats.org/presentationml/2006/main">
+  <p:cSld>
+    <p:spTree>
+      <p:nvGrpSpPr>
+        <p:cNvPr id="1" name=""/>
+        <p:cNvGrpSpPr/>
+        <p:nvPr/>
+      </p:nvGrpSpPr>
+      <p:grpSpPr>
+        <a:xfrm>
+          <a:off x="0" y="0"/>
+          <a:ext cx="0" cy="0"/>
+          <a:chOff x="0" y="0"/>
+          <a:chExt cx="0" cy="0"/>
+        </a:xfrm>
+      </p:grpSpPr>
+      <p:sp>
+        <p:nvSpPr>
+          <p:cNvPr id="2" name="Rubrik 1"/>
+          <p:cNvSpPr>
+            <a:spLocks noGrp="1"/>
+          </p:cNvSpPr>
+          <p:nvPr>
+            <p:ph type="title"/>
+          </p:nvPr>
+        </p:nvSpPr>
+        <p:spPr/>
+        <p:txBody>
+          <a:bodyPr>
+            <a:normAutofit/>
+          </a:bodyPr>
+          <a:lstStyle/>
+          <a:p>
+            <a:r>
+              <a:rPr lang="sv-SE" dirty="0" smtClean="0"/>
+              <a:t>Multiplicera jämna tal 1 till 10</a:t>
+            </a:r>
+            <a:endParaRPr lang="sv-SE" dirty="0"/>
+          </a:p>
+        </p:txBody>
+      </p:sp>
+      <p:sp>
+        <p:nvSpPr>
+          <p:cNvPr id="3" name="Platshållare för innehåll 2"/>
+          <p:cNvSpPr>
+            <a:spLocks noGrp="1"/>
+          </p:cNvSpPr>
+          <p:nvPr>
+            <p:ph idx="1"/>
+          </p:nvPr>
+        </p:nvSpPr>
+        <p:spPr/>
+        <p:txBody>
+          <a:bodyPr/>
+          <a:lstStyle/>
+          <a:p>
+            <a:pPr>
+              <a:buNone/>
+            </a:pPr>
+            <a:r>
+              <a:rPr lang="sv-SE" dirty="0" smtClean="0"/>
+              <a:t>[</a:t>
+            </a:r>
+            <a:r>
+              <a:rPr lang="sv-SE" dirty="0" err="1" smtClean="0"/>
+              <a:t>MultiplyEvenNumbers.java</a:t>
+            </a:r>
+            <a:r>
+              <a:rPr lang="sv-SE" dirty="0" smtClean="0"/>
+              <a:t>]</a:t>
+            </a:r>
+            <a:endParaRPr lang="sv-SE" dirty="0"/>
+          </a:p>
+        </p:txBody>
+      </p:sp>
+    </p:spTree>
+  </p:cSld>
+  <p:clrMapOvr>
+    <a:masterClrMapping/>
+  </p:clrMapOvr>
+</p:sld>
+</file>
+
+<file path=ppt/slides/slide53.xml><?xml version="1.0" encoding="utf-8"?>
+<p:sld xmlns:a="http://schemas.openxmlformats.org/drawingml/2006/main" xmlns:r="http://schemas.openxmlformats.org/officeDocument/2006/relationships" xmlns:p="http://schemas.openxmlformats.org/presentationml/2006/main">
+  <p:cSld>
+    <p:spTree>
+      <p:nvGrpSpPr>
+        <p:cNvPr id="1" name=""/>
+        <p:cNvGrpSpPr/>
+        <p:nvPr/>
+      </p:nvGrpSpPr>
+      <p:grpSpPr>
+        <a:xfrm>
+          <a:off x="0" y="0"/>
+          <a:ext cx="0" cy="0"/>
+          <a:chOff x="0" y="0"/>
+          <a:chExt cx="0" cy="0"/>
+        </a:xfrm>
+      </p:grpSpPr>
+      <p:sp>
+        <p:nvSpPr>
+          <p:cNvPr id="2" name="Rubrik 1"/>
+          <p:cNvSpPr>
+            <a:spLocks noGrp="1"/>
+          </p:cNvSpPr>
+          <p:nvPr>
+            <p:ph type="title"/>
+          </p:nvPr>
+        </p:nvSpPr>
+        <p:spPr/>
+        <p:txBody>
+          <a:bodyPr>
+            <a:normAutofit fontScale="90000"/>
+          </a:bodyPr>
+          <a:lstStyle/>
+          <a:p>
+            <a:r>
+              <a:rPr lang="sv-SE" dirty="0" smtClean="0"/>
+              <a:t>Skapa en lista med kvadraten av alla jämna tal 1 till 10</a:t>
+            </a:r>
+            <a:endParaRPr lang="sv-SE" dirty="0"/>
+          </a:p>
+        </p:txBody>
+      </p:sp>
+      <p:sp>
+        <p:nvSpPr>
+          <p:cNvPr id="3" name="Platshållare för innehåll 2"/>
+          <p:cNvSpPr>
+            <a:spLocks noGrp="1"/>
+          </p:cNvSpPr>
+          <p:nvPr>
+            <p:ph idx="1"/>
+          </p:nvPr>
+        </p:nvSpPr>
+        <p:spPr/>
+        <p:txBody>
+          <a:bodyPr/>
+          <a:lstStyle/>
+          <a:p>
+            <a:pPr>
+              <a:buNone/>
+            </a:pPr>
+            <a:r>
+              <a:rPr lang="sv-SE" dirty="0" smtClean="0"/>
+              <a:t>[</a:t>
+            </a:r>
+            <a:r>
+              <a:rPr lang="sv-SE" dirty="0" err="1" smtClean="0"/>
+              <a:t>squareEvenNumbers.java</a:t>
+            </a:r>
+            <a:r>
+              <a:rPr lang="sv-SE" dirty="0" smtClean="0"/>
+              <a:t>]</a:t>
+            </a:r>
+            <a:endParaRPr lang="sv-SE" dirty="0"/>
+          </a:p>
+        </p:txBody>
+      </p:sp>
+    </p:spTree>
+  </p:cSld>
+  <p:clrMapOvr>
+    <a:masterClrMapping/>
+  </p:clrMapOvr>
+</p:sld>
+</file>
+
+<file path=ppt/slides/slide54.xml><?xml version="1.0" encoding="utf-8"?>
+<p:sld xmlns:a="http://schemas.openxmlformats.org/drawingml/2006/main" xmlns:r="http://schemas.openxmlformats.org/officeDocument/2006/relationships" xmlns:p="http://schemas.openxmlformats.org/presentationml/2006/main">
+  <p:cSld>
+    <p:spTree>
+      <p:nvGrpSpPr>
+        <p:cNvPr id="1" name=""/>
+        <p:cNvGrpSpPr/>
+        <p:nvPr/>
+      </p:nvGrpSpPr>
+      <p:grpSpPr>
+        <a:xfrm>
+          <a:off x="0" y="0"/>
+          <a:ext cx="0" cy="0"/>
+          <a:chOff x="0" y="0"/>
+          <a:chExt cx="0" cy="0"/>
+        </a:xfrm>
+      </p:grpSpPr>
+      <p:sp>
+        <p:nvSpPr>
+          <p:cNvPr id="2" name="Rubrik 1"/>
+          <p:cNvSpPr>
+            <a:spLocks noGrp="1"/>
+          </p:cNvSpPr>
+          <p:nvPr>
+            <p:ph type="title"/>
+          </p:nvPr>
+        </p:nvSpPr>
+        <p:spPr/>
+        <p:txBody>
+          <a:bodyPr/>
+          <a:lstStyle/>
+          <a:p>
+            <a:r>
+              <a:rPr lang="sv-SE" dirty="0" smtClean="0"/>
+              <a:t>DRY </a:t>
+            </a:r>
+            <a:r>
+              <a:rPr lang="sv-SE" dirty="0" err="1" smtClean="0"/>
+              <a:t>principle</a:t>
+            </a:r>
+            <a:r>
+              <a:rPr lang="sv-SE" dirty="0" smtClean="0"/>
+              <a:t>:</a:t>
+            </a:r>
+            <a:endParaRPr lang="sv-SE" dirty="0"/>
+          </a:p>
+        </p:txBody>
+      </p:sp>
+      <p:sp>
+        <p:nvSpPr>
+          <p:cNvPr id="3" name="Platshållare för innehåll 2"/>
+          <p:cNvSpPr>
+            <a:spLocks noGrp="1"/>
+          </p:cNvSpPr>
+          <p:nvPr>
+            <p:ph idx="1"/>
+          </p:nvPr>
+        </p:nvSpPr>
+        <p:spPr/>
+        <p:txBody>
+          <a:bodyPr/>
+          <a:lstStyle/>
+          <a:p>
+            <a:r>
+              <a:rPr lang="sv-SE" dirty="0" err="1" smtClean="0"/>
+              <a:t>Don't</a:t>
+            </a:r>
+            <a:r>
+              <a:rPr lang="sv-SE" dirty="0" smtClean="0"/>
+              <a:t> </a:t>
+            </a:r>
+            <a:r>
+              <a:rPr lang="sv-SE" dirty="0" err="1" smtClean="0"/>
+              <a:t>repeat</a:t>
+            </a:r>
+            <a:r>
+              <a:rPr lang="sv-SE" dirty="0" smtClean="0"/>
+              <a:t> </a:t>
+            </a:r>
+            <a:r>
+              <a:rPr lang="sv-SE" dirty="0" err="1" smtClean="0"/>
+              <a:t>yourself</a:t>
+            </a:r>
+            <a:endParaRPr lang="sv-SE" dirty="0"/>
+          </a:p>
+        </p:txBody>
+      </p:sp>
+    </p:spTree>
+  </p:cSld>
+  <p:clrMapOvr>
+    <a:masterClrMapping/>
+  </p:clrMapOvr>
+</p:sld>
+</file>
+
+<file path=ppt/slides/slide55.xml><?xml version="1.0" encoding="utf-8"?>
+<p:sld xmlns:a="http://schemas.openxmlformats.org/drawingml/2006/main" xmlns:r="http://schemas.openxmlformats.org/officeDocument/2006/relationships" xmlns:p="http://schemas.openxmlformats.org/presentationml/2006/main">
+  <p:cSld>
+    <p:spTree>
+      <p:nvGrpSpPr>
+        <p:cNvPr id="1" name=""/>
+        <p:cNvGrpSpPr/>
+        <p:nvPr/>
+      </p:nvGrpSpPr>
+      <p:grpSpPr>
+        <a:xfrm>
+          <a:off x="0" y="0"/>
+          <a:ext cx="0" cy="0"/>
+          <a:chOff x="0" y="0"/>
+          <a:chExt cx="0" cy="0"/>
+        </a:xfrm>
+      </p:grpSpPr>
+      <p:sp>
+        <p:nvSpPr>
+          <p:cNvPr id="2" name="Rubrik 1"/>
+          <p:cNvSpPr>
+            <a:spLocks noGrp="1"/>
+          </p:cNvSpPr>
+          <p:nvPr>
+            <p:ph type="title"/>
+          </p:nvPr>
+        </p:nvSpPr>
+        <p:spPr/>
+        <p:txBody>
+          <a:bodyPr/>
+          <a:lstStyle/>
+          <a:p>
+            <a:r>
+              <a:rPr lang="sv-SE" dirty="0" smtClean="0"/>
+              <a:t>Kan man återanvända loopen?</a:t>
+            </a:r>
+            <a:endParaRPr lang="sv-SE" dirty="0"/>
+          </a:p>
+        </p:txBody>
+      </p:sp>
+      <p:sp>
+        <p:nvSpPr>
+          <p:cNvPr id="3" name="Platshållare för innehåll 2"/>
+          <p:cNvSpPr>
+            <a:spLocks noGrp="1"/>
+          </p:cNvSpPr>
+          <p:nvPr>
+            <p:ph idx="1"/>
+          </p:nvPr>
+        </p:nvSpPr>
+        <p:spPr/>
+        <p:txBody>
+          <a:bodyPr/>
+          <a:lstStyle/>
+          <a:p>
+            <a:pPr>
+              <a:buNone/>
+            </a:pPr>
+            <a:r>
+              <a:rPr lang="sv-SE" dirty="0" smtClean="0"/>
+              <a:t>[</a:t>
+            </a:r>
+            <a:r>
+              <a:rPr lang="sv-SE" dirty="0" err="1" smtClean="0"/>
+              <a:t>LoopEvenNumbers.groovy</a:t>
+            </a:r>
+            <a:r>
+              <a:rPr lang="sv-SE" dirty="0" smtClean="0"/>
+              <a:t>]</a:t>
+            </a:r>
+            <a:endParaRPr lang="sv-SE" dirty="0"/>
+          </a:p>
+        </p:txBody>
+      </p:sp>
+    </p:spTree>
+  </p:cSld>
+  <p:clrMapOvr>
+    <a:masterClrMapping/>
+  </p:clrMapOvr>
+</p:sld>
+</file>
+
+<file path=ppt/slides/slide56.xml><?xml version="1.0" encoding="utf-8"?>
+<p:sld xmlns:a="http://schemas.openxmlformats.org/drawingml/2006/main" xmlns:r="http://schemas.openxmlformats.org/officeDocument/2006/relationships" xmlns:p="http://schemas.openxmlformats.org/presentationml/2006/main">
+  <p:cSld>
+    <p:spTree>
+      <p:nvGrpSpPr>
+        <p:cNvPr id="1" name=""/>
+        <p:cNvGrpSpPr/>
+        <p:nvPr/>
+      </p:nvGrpSpPr>
+      <p:grpSpPr>
+        <a:xfrm>
+          <a:off x="0" y="0"/>
+          <a:ext cx="0" cy="0"/>
+          <a:chOff x="0" y="0"/>
+          <a:chExt cx="0" cy="0"/>
+        </a:xfrm>
+      </p:grpSpPr>
+      <p:sp>
+        <p:nvSpPr>
+          <p:cNvPr id="2" name="Rubrik 1"/>
+          <p:cNvSpPr>
+            <a:spLocks noGrp="1"/>
+          </p:cNvSpPr>
+          <p:nvPr>
+            <p:ph type="title"/>
+          </p:nvPr>
+        </p:nvSpPr>
+        <p:spPr/>
+        <p:txBody>
+          <a:bodyPr/>
+          <a:lstStyle/>
+          <a:p>
+            <a:r>
+              <a:rPr lang="sv-SE" dirty="0" smtClean="0"/>
+              <a:t>Anonyma inre klasser i Java</a:t>
+            </a:r>
+            <a:endParaRPr lang="sv-SE" dirty="0"/>
+          </a:p>
+        </p:txBody>
+      </p:sp>
+      <p:sp>
+        <p:nvSpPr>
+          <p:cNvPr id="3" name="Platshållare för innehåll 2"/>
+          <p:cNvSpPr>
+            <a:spLocks noGrp="1"/>
+          </p:cNvSpPr>
+          <p:nvPr>
+            <p:ph idx="1"/>
+          </p:nvPr>
+        </p:nvSpPr>
+        <p:spPr/>
+        <p:txBody>
+          <a:bodyPr/>
+          <a:lstStyle/>
+          <a:p>
+            <a:pPr>
+              <a:buNone/>
+            </a:pPr>
+            <a:r>
+              <a:rPr lang="sv-SE" dirty="0" smtClean="0"/>
+              <a:t>[</a:t>
+            </a:r>
+            <a:r>
+              <a:rPr lang="sv-SE" smtClean="0"/>
+              <a:t>ClosureInJava.java]</a:t>
+            </a:r>
+            <a:endParaRPr lang="sv-SE"/>
+          </a:p>
+        </p:txBody>
+      </p:sp>
+    </p:spTree>
+  </p:cSld>
+  <p:clrMapOvr>
+    <a:masterClrMapping/>
+  </p:clrMapOvr>
 </p:sld>
 </file>
 

</xml_diff>